<commit_message>
Samll improvements on the underpassage
</commit_message>
<xml_diff>
--- a/Logic/MM Rooms.pptx
+++ b/Logic/MM Rooms.pptx
@@ -259,7 +259,7 @@
           <a:p>
             <a:fld id="{F507AA02-389D-4D6E-9F55-4109D7FF027D}" type="datetimeFigureOut">
               <a:rPr lang="en-US" smtClean="0"/>
-              <a:t>10/26/2020</a:t>
+              <a:t>11/4/2020</a:t>
             </a:fld>
             <a:endParaRPr lang="en-US"/>
           </a:p>
@@ -457,7 +457,7 @@
           <a:p>
             <a:fld id="{F507AA02-389D-4D6E-9F55-4109D7FF027D}" type="datetimeFigureOut">
               <a:rPr lang="en-US" smtClean="0"/>
-              <a:t>10/26/2020</a:t>
+              <a:t>11/4/2020</a:t>
             </a:fld>
             <a:endParaRPr lang="en-US"/>
           </a:p>
@@ -665,7 +665,7 @@
           <a:p>
             <a:fld id="{F507AA02-389D-4D6E-9F55-4109D7FF027D}" type="datetimeFigureOut">
               <a:rPr lang="en-US" smtClean="0"/>
-              <a:t>10/26/2020</a:t>
+              <a:t>11/4/2020</a:t>
             </a:fld>
             <a:endParaRPr lang="en-US"/>
           </a:p>
@@ -863,7 +863,7 @@
           <a:p>
             <a:fld id="{F507AA02-389D-4D6E-9F55-4109D7FF027D}" type="datetimeFigureOut">
               <a:rPr lang="en-US" smtClean="0"/>
-              <a:t>10/26/2020</a:t>
+              <a:t>11/4/2020</a:t>
             </a:fld>
             <a:endParaRPr lang="en-US"/>
           </a:p>
@@ -1138,7 +1138,7 @@
           <a:p>
             <a:fld id="{F507AA02-389D-4D6E-9F55-4109D7FF027D}" type="datetimeFigureOut">
               <a:rPr lang="en-US" smtClean="0"/>
-              <a:t>10/26/2020</a:t>
+              <a:t>11/4/2020</a:t>
             </a:fld>
             <a:endParaRPr lang="en-US"/>
           </a:p>
@@ -1403,7 +1403,7 @@
           <a:p>
             <a:fld id="{F507AA02-389D-4D6E-9F55-4109D7FF027D}" type="datetimeFigureOut">
               <a:rPr lang="en-US" smtClean="0"/>
-              <a:t>10/26/2020</a:t>
+              <a:t>11/4/2020</a:t>
             </a:fld>
             <a:endParaRPr lang="en-US"/>
           </a:p>
@@ -1815,7 +1815,7 @@
           <a:p>
             <a:fld id="{F507AA02-389D-4D6E-9F55-4109D7FF027D}" type="datetimeFigureOut">
               <a:rPr lang="en-US" smtClean="0"/>
-              <a:t>10/26/2020</a:t>
+              <a:t>11/4/2020</a:t>
             </a:fld>
             <a:endParaRPr lang="en-US"/>
           </a:p>
@@ -1956,7 +1956,7 @@
           <a:p>
             <a:fld id="{F507AA02-389D-4D6E-9F55-4109D7FF027D}" type="datetimeFigureOut">
               <a:rPr lang="en-US" smtClean="0"/>
-              <a:t>10/26/2020</a:t>
+              <a:t>11/4/2020</a:t>
             </a:fld>
             <a:endParaRPr lang="en-US"/>
           </a:p>
@@ -2069,7 +2069,7 @@
           <a:p>
             <a:fld id="{F507AA02-389D-4D6E-9F55-4109D7FF027D}" type="datetimeFigureOut">
               <a:rPr lang="en-US" smtClean="0"/>
-              <a:t>10/26/2020</a:t>
+              <a:t>11/4/2020</a:t>
             </a:fld>
             <a:endParaRPr lang="en-US"/>
           </a:p>
@@ -2380,7 +2380,7 @@
           <a:p>
             <a:fld id="{F507AA02-389D-4D6E-9F55-4109D7FF027D}" type="datetimeFigureOut">
               <a:rPr lang="en-US" smtClean="0"/>
-              <a:t>10/26/2020</a:t>
+              <a:t>11/4/2020</a:t>
             </a:fld>
             <a:endParaRPr lang="en-US"/>
           </a:p>
@@ -2668,7 +2668,7 @@
           <a:p>
             <a:fld id="{F507AA02-389D-4D6E-9F55-4109D7FF027D}" type="datetimeFigureOut">
               <a:rPr lang="en-US" smtClean="0"/>
-              <a:t>10/26/2020</a:t>
+              <a:t>11/4/2020</a:t>
             </a:fld>
             <a:endParaRPr lang="en-US"/>
           </a:p>
@@ -2909,7 +2909,7 @@
           <a:p>
             <a:fld id="{F507AA02-389D-4D6E-9F55-4109D7FF027D}" type="datetimeFigureOut">
               <a:rPr lang="en-US" smtClean="0"/>
-              <a:t>10/26/2020</a:t>
+              <a:t>11/4/2020</a:t>
             </a:fld>
             <a:endParaRPr lang="en-US"/>
           </a:p>
@@ -4560,6 +4560,332 @@
           </a:prstGeom>
         </p:spPr>
       </p:pic>
+      <p:sp>
+        <p:nvSpPr>
+          <p:cNvPr id="5" name="TextBox 4">
+            <a:extLst>
+              <a:ext uri="{FF2B5EF4-FFF2-40B4-BE49-F238E27FC236}">
+                <a16:creationId xmlns:a16="http://schemas.microsoft.com/office/drawing/2014/main" id="{44BF0BED-4690-4D35-ABA6-D007843331A1}"/>
+              </a:ext>
+            </a:extLst>
+          </p:cNvPr>
+          <p:cNvSpPr txBox="1"/>
+          <p:nvPr/>
+        </p:nvSpPr>
+        <p:spPr>
+          <a:xfrm>
+            <a:off x="2427513" y="5401319"/>
+            <a:ext cx="951140" cy="246221"/>
+          </a:xfrm>
+          <a:prstGeom prst="rect">
+            <a:avLst/>
+          </a:prstGeom>
+          <a:noFill/>
+          <a:ln>
+            <a:solidFill>
+              <a:schemeClr val="accent1"/>
+            </a:solidFill>
+          </a:ln>
+        </p:spPr>
+        <p:txBody>
+          <a:bodyPr wrap="square" rtlCol="0">
+            <a:spAutoFit/>
+          </a:bodyPr>
+          <a:lstStyle/>
+          <a:p>
+            <a:r>
+              <a:rPr lang="en-US" sz="1000" dirty="0" err="1"/>
+              <a:t>Underpassage</a:t>
+            </a:r>
+            <a:endParaRPr lang="en-US" sz="1000" dirty="0"/>
+          </a:p>
+        </p:txBody>
+      </p:sp>
+      <p:sp>
+        <p:nvSpPr>
+          <p:cNvPr id="7" name="TextBox 6">
+            <a:extLst>
+              <a:ext uri="{FF2B5EF4-FFF2-40B4-BE49-F238E27FC236}">
+                <a16:creationId xmlns:a16="http://schemas.microsoft.com/office/drawing/2014/main" id="{0AD17667-D19E-4DE1-8AEF-1A4E44411AF8}"/>
+              </a:ext>
+            </a:extLst>
+          </p:cNvPr>
+          <p:cNvSpPr txBox="1"/>
+          <p:nvPr/>
+        </p:nvSpPr>
+        <p:spPr>
+          <a:xfrm>
+            <a:off x="5133975" y="5401320"/>
+            <a:ext cx="751114" cy="246221"/>
+          </a:xfrm>
+          <a:prstGeom prst="rect">
+            <a:avLst/>
+          </a:prstGeom>
+          <a:noFill/>
+          <a:ln>
+            <a:solidFill>
+              <a:schemeClr val="accent1"/>
+            </a:solidFill>
+          </a:ln>
+        </p:spPr>
+        <p:txBody>
+          <a:bodyPr wrap="square" rtlCol="0">
+            <a:spAutoFit/>
+          </a:bodyPr>
+          <a:lstStyle/>
+          <a:p>
+            <a:r>
+              <a:rPr lang="en-US" sz="1000" dirty="0"/>
+              <a:t>Basement</a:t>
+            </a:r>
+          </a:p>
+        </p:txBody>
+      </p:sp>
+      <p:sp>
+        <p:nvSpPr>
+          <p:cNvPr id="9" name="TextBox 8">
+            <a:extLst>
+              <a:ext uri="{FF2B5EF4-FFF2-40B4-BE49-F238E27FC236}">
+                <a16:creationId xmlns:a16="http://schemas.microsoft.com/office/drawing/2014/main" id="{1D50D3D1-1347-46BF-B5A1-71F7C39E5CF9}"/>
+              </a:ext>
+            </a:extLst>
+          </p:cNvPr>
+          <p:cNvSpPr txBox="1"/>
+          <p:nvPr/>
+        </p:nvSpPr>
+        <p:spPr>
+          <a:xfrm>
+            <a:off x="4072618" y="5391861"/>
+            <a:ext cx="751114" cy="246221"/>
+          </a:xfrm>
+          <a:prstGeom prst="rect">
+            <a:avLst/>
+          </a:prstGeom>
+          <a:noFill/>
+          <a:ln>
+            <a:solidFill>
+              <a:schemeClr val="accent1"/>
+            </a:solidFill>
+          </a:ln>
+        </p:spPr>
+        <p:txBody>
+          <a:bodyPr wrap="square" rtlCol="0">
+            <a:spAutoFit/>
+          </a:bodyPr>
+          <a:lstStyle/>
+          <a:p>
+            <a:r>
+              <a:rPr lang="en-US" sz="1000" dirty="0"/>
+              <a:t>Dungeon</a:t>
+            </a:r>
+          </a:p>
+        </p:txBody>
+      </p:sp>
+      <p:cxnSp>
+        <p:nvCxnSpPr>
+          <p:cNvPr id="39" name="Straight Connector 38">
+            <a:extLst>
+              <a:ext uri="{FF2B5EF4-FFF2-40B4-BE49-F238E27FC236}">
+                <a16:creationId xmlns:a16="http://schemas.microsoft.com/office/drawing/2014/main" id="{6C39E9B1-ADAE-4C7E-9147-A4E79F54A3FF}"/>
+              </a:ext>
+            </a:extLst>
+          </p:cNvPr>
+          <p:cNvCxnSpPr>
+            <a:cxnSpLocks/>
+            <a:stCxn id="5" idx="0"/>
+            <a:endCxn id="12" idx="1"/>
+          </p:cNvCxnSpPr>
+          <p:nvPr/>
+        </p:nvCxnSpPr>
+        <p:spPr>
+          <a:xfrm flipV="1">
+            <a:off x="2903083" y="4959089"/>
+            <a:ext cx="1452564" cy="442230"/>
+          </a:xfrm>
+          <a:prstGeom prst="line">
+            <a:avLst/>
+          </a:prstGeom>
+        </p:spPr>
+        <p:style>
+          <a:lnRef idx="1">
+            <a:schemeClr val="accent1"/>
+          </a:lnRef>
+          <a:fillRef idx="0">
+            <a:schemeClr val="accent1"/>
+          </a:fillRef>
+          <a:effectRef idx="0">
+            <a:schemeClr val="accent1"/>
+          </a:effectRef>
+          <a:fontRef idx="minor">
+            <a:schemeClr val="tx1"/>
+          </a:fontRef>
+        </p:style>
+      </p:cxnSp>
+      <p:cxnSp>
+        <p:nvCxnSpPr>
+          <p:cNvPr id="42" name="Straight Connector 41">
+            <a:extLst>
+              <a:ext uri="{FF2B5EF4-FFF2-40B4-BE49-F238E27FC236}">
+                <a16:creationId xmlns:a16="http://schemas.microsoft.com/office/drawing/2014/main" id="{9A85ACA4-F14B-44A1-B428-965C75C92212}"/>
+              </a:ext>
+            </a:extLst>
+          </p:cNvPr>
+          <p:cNvCxnSpPr>
+            <a:cxnSpLocks/>
+            <a:stCxn id="7" idx="1"/>
+            <a:endCxn id="9" idx="3"/>
+          </p:cNvCxnSpPr>
+          <p:nvPr/>
+        </p:nvCxnSpPr>
+        <p:spPr>
+          <a:xfrm flipH="1" flipV="1">
+            <a:off x="4823732" y="5514972"/>
+            <a:ext cx="310243" cy="9459"/>
+          </a:xfrm>
+          <a:prstGeom prst="line">
+            <a:avLst/>
+          </a:prstGeom>
+        </p:spPr>
+        <p:style>
+          <a:lnRef idx="1">
+            <a:schemeClr val="accent1"/>
+          </a:lnRef>
+          <a:fillRef idx="0">
+            <a:schemeClr val="accent1"/>
+          </a:fillRef>
+          <a:effectRef idx="0">
+            <a:schemeClr val="accent1"/>
+          </a:effectRef>
+          <a:fontRef idx="minor">
+            <a:schemeClr val="tx1"/>
+          </a:fontRef>
+        </p:style>
+      </p:cxnSp>
+      <p:sp>
+        <p:nvSpPr>
+          <p:cNvPr id="22" name="TextBox 21">
+            <a:extLst>
+              <a:ext uri="{FF2B5EF4-FFF2-40B4-BE49-F238E27FC236}">
+                <a16:creationId xmlns:a16="http://schemas.microsoft.com/office/drawing/2014/main" id="{0AE12E67-8710-414A-A685-AC037B2D3F1F}"/>
+              </a:ext>
+            </a:extLst>
+          </p:cNvPr>
+          <p:cNvSpPr txBox="1"/>
+          <p:nvPr/>
+        </p:nvSpPr>
+        <p:spPr>
+          <a:xfrm>
+            <a:off x="7379154" y="1544410"/>
+            <a:ext cx="789213" cy="246221"/>
+          </a:xfrm>
+          <a:prstGeom prst="rect">
+            <a:avLst/>
+          </a:prstGeom>
+          <a:noFill/>
+          <a:ln>
+            <a:solidFill>
+              <a:schemeClr val="accent1"/>
+            </a:solidFill>
+          </a:ln>
+        </p:spPr>
+        <p:txBody>
+          <a:bodyPr wrap="square" rtlCol="0">
+            <a:spAutoFit/>
+          </a:bodyPr>
+          <a:lstStyle/>
+          <a:p>
+            <a:r>
+              <a:rPr lang="en-US" sz="1000" dirty="0" err="1"/>
+              <a:t>Tmp</a:t>
+            </a:r>
+            <a:r>
+              <a:rPr lang="en-US" sz="1000" dirty="0"/>
+              <a:t> Room</a:t>
+            </a:r>
+          </a:p>
+        </p:txBody>
+      </p:sp>
+      <p:cxnSp>
+        <p:nvCxnSpPr>
+          <p:cNvPr id="51" name="Straight Connector 50">
+            <a:extLst>
+              <a:ext uri="{FF2B5EF4-FFF2-40B4-BE49-F238E27FC236}">
+                <a16:creationId xmlns:a16="http://schemas.microsoft.com/office/drawing/2014/main" id="{1C64ED4C-AA4A-4798-9106-DDC5EEB2765D}"/>
+              </a:ext>
+            </a:extLst>
+          </p:cNvPr>
+          <p:cNvCxnSpPr>
+            <a:cxnSpLocks/>
+            <a:stCxn id="22" idx="2"/>
+          </p:cNvCxnSpPr>
+          <p:nvPr/>
+        </p:nvCxnSpPr>
+        <p:spPr>
+          <a:xfrm flipH="1">
+            <a:off x="7278461" y="1790631"/>
+            <a:ext cx="495300" cy="412365"/>
+          </a:xfrm>
+          <a:prstGeom prst="line">
+            <a:avLst/>
+          </a:prstGeom>
+        </p:spPr>
+        <p:style>
+          <a:lnRef idx="1">
+            <a:schemeClr val="accent1"/>
+          </a:lnRef>
+          <a:fillRef idx="0">
+            <a:schemeClr val="accent1"/>
+          </a:fillRef>
+          <a:effectRef idx="0">
+            <a:schemeClr val="accent1"/>
+          </a:effectRef>
+          <a:fontRef idx="minor">
+            <a:schemeClr val="tx1"/>
+          </a:fontRef>
+        </p:style>
+      </p:cxnSp>
+      <p:cxnSp>
+        <p:nvCxnSpPr>
+          <p:cNvPr id="53" name="Straight Connector 19">
+            <a:extLst>
+              <a:ext uri="{FF2B5EF4-FFF2-40B4-BE49-F238E27FC236}">
+                <a16:creationId xmlns:a16="http://schemas.microsoft.com/office/drawing/2014/main" id="{0F3AD53C-7AB2-448A-B6D4-3F65BE6DB4EB}"/>
+              </a:ext>
+            </a:extLst>
+          </p:cNvPr>
+          <p:cNvCxnSpPr>
+            <a:cxnSpLocks/>
+            <a:stCxn id="2" idx="2"/>
+            <a:endCxn id="7" idx="0"/>
+          </p:cNvCxnSpPr>
+          <p:nvPr/>
+        </p:nvCxnSpPr>
+        <p:spPr>
+          <a:xfrm rot="16200000" flipH="1">
+            <a:off x="4696148" y="4587936"/>
+            <a:ext cx="877014" cy="749753"/>
+          </a:xfrm>
+          <a:prstGeom prst="curvedConnector3">
+            <a:avLst>
+              <a:gd name="adj1" fmla="val 20211"/>
+            </a:avLst>
+          </a:prstGeom>
+        </p:spPr>
+        <p:style>
+          <a:lnRef idx="1">
+            <a:schemeClr val="accent1"/>
+          </a:lnRef>
+          <a:fillRef idx="0">
+            <a:schemeClr val="accent1"/>
+          </a:fillRef>
+          <a:effectRef idx="0">
+            <a:schemeClr val="accent1"/>
+          </a:effectRef>
+          <a:fontRef idx="minor">
+            <a:schemeClr val="tx1"/>
+          </a:fontRef>
+        </p:style>
+      </p:cxnSp>
     </p:spTree>
     <p:extLst>
       <p:ext uri="{BB962C8B-B14F-4D97-AF65-F5344CB8AC3E}">

</xml_diff>

<commit_message>
Updated the ppt with the schema of the rooms
</commit_message>
<xml_diff>
--- a/Logic/MM Rooms.pptx
+++ b/Logic/MM Rooms.pptx
@@ -259,7 +259,7 @@
           <a:p>
             <a:fld id="{F507AA02-389D-4D6E-9F55-4109D7FF027D}" type="datetimeFigureOut">
               <a:rPr lang="en-US" smtClean="0"/>
-              <a:t>11/4/2020</a:t>
+              <a:t>11/8/2020</a:t>
             </a:fld>
             <a:endParaRPr lang="en-US"/>
           </a:p>
@@ -457,7 +457,7 @@
           <a:p>
             <a:fld id="{F507AA02-389D-4D6E-9F55-4109D7FF027D}" type="datetimeFigureOut">
               <a:rPr lang="en-US" smtClean="0"/>
-              <a:t>11/4/2020</a:t>
+              <a:t>11/8/2020</a:t>
             </a:fld>
             <a:endParaRPr lang="en-US"/>
           </a:p>
@@ -665,7 +665,7 @@
           <a:p>
             <a:fld id="{F507AA02-389D-4D6E-9F55-4109D7FF027D}" type="datetimeFigureOut">
               <a:rPr lang="en-US" smtClean="0"/>
-              <a:t>11/4/2020</a:t>
+              <a:t>11/8/2020</a:t>
             </a:fld>
             <a:endParaRPr lang="en-US"/>
           </a:p>
@@ -863,7 +863,7 @@
           <a:p>
             <a:fld id="{F507AA02-389D-4D6E-9F55-4109D7FF027D}" type="datetimeFigureOut">
               <a:rPr lang="en-US" smtClean="0"/>
-              <a:t>11/4/2020</a:t>
+              <a:t>11/8/2020</a:t>
             </a:fld>
             <a:endParaRPr lang="en-US"/>
           </a:p>
@@ -1138,7 +1138,7 @@
           <a:p>
             <a:fld id="{F507AA02-389D-4D6E-9F55-4109D7FF027D}" type="datetimeFigureOut">
               <a:rPr lang="en-US" smtClean="0"/>
-              <a:t>11/4/2020</a:t>
+              <a:t>11/8/2020</a:t>
             </a:fld>
             <a:endParaRPr lang="en-US"/>
           </a:p>
@@ -1403,7 +1403,7 @@
           <a:p>
             <a:fld id="{F507AA02-389D-4D6E-9F55-4109D7FF027D}" type="datetimeFigureOut">
               <a:rPr lang="en-US" smtClean="0"/>
-              <a:t>11/4/2020</a:t>
+              <a:t>11/8/2020</a:t>
             </a:fld>
             <a:endParaRPr lang="en-US"/>
           </a:p>
@@ -1815,7 +1815,7 @@
           <a:p>
             <a:fld id="{F507AA02-389D-4D6E-9F55-4109D7FF027D}" type="datetimeFigureOut">
               <a:rPr lang="en-US" smtClean="0"/>
-              <a:t>11/4/2020</a:t>
+              <a:t>11/8/2020</a:t>
             </a:fld>
             <a:endParaRPr lang="en-US"/>
           </a:p>
@@ -1956,7 +1956,7 @@
           <a:p>
             <a:fld id="{F507AA02-389D-4D6E-9F55-4109D7FF027D}" type="datetimeFigureOut">
               <a:rPr lang="en-US" smtClean="0"/>
-              <a:t>11/4/2020</a:t>
+              <a:t>11/8/2020</a:t>
             </a:fld>
             <a:endParaRPr lang="en-US"/>
           </a:p>
@@ -2069,7 +2069,7 @@
           <a:p>
             <a:fld id="{F507AA02-389D-4D6E-9F55-4109D7FF027D}" type="datetimeFigureOut">
               <a:rPr lang="en-US" smtClean="0"/>
-              <a:t>11/4/2020</a:t>
+              <a:t>11/8/2020</a:t>
             </a:fld>
             <a:endParaRPr lang="en-US"/>
           </a:p>
@@ -2380,7 +2380,7 @@
           <a:p>
             <a:fld id="{F507AA02-389D-4D6E-9F55-4109D7FF027D}" type="datetimeFigureOut">
               <a:rPr lang="en-US" smtClean="0"/>
-              <a:t>11/4/2020</a:t>
+              <a:t>11/8/2020</a:t>
             </a:fld>
             <a:endParaRPr lang="en-US"/>
           </a:p>
@@ -2668,7 +2668,7 @@
           <a:p>
             <a:fld id="{F507AA02-389D-4D6E-9F55-4109D7FF027D}" type="datetimeFigureOut">
               <a:rPr lang="en-US" smtClean="0"/>
-              <a:t>11/4/2020</a:t>
+              <a:t>11/8/2020</a:t>
             </a:fld>
             <a:endParaRPr lang="en-US"/>
           </a:p>
@@ -2909,7 +2909,7 @@
           <a:p>
             <a:fld id="{F507AA02-389D-4D6E-9F55-4109D7FF027D}" type="datetimeFigureOut">
               <a:rPr lang="en-US" smtClean="0"/>
-              <a:t>11/4/2020</a:t>
+              <a:t>11/8/2020</a:t>
             </a:fld>
             <a:endParaRPr lang="en-US"/>
           </a:p>
@@ -3420,7 +3420,7 @@
         </p:nvSpPr>
         <p:spPr>
           <a:xfrm>
-            <a:off x="5976257" y="3767817"/>
+            <a:off x="6890654" y="3767817"/>
             <a:ext cx="693965" cy="246221"/>
           </a:xfrm>
           <a:prstGeom prst="rect">
@@ -3460,7 +3460,7 @@
         </p:nvSpPr>
         <p:spPr>
           <a:xfrm>
-            <a:off x="5063218" y="2818176"/>
+            <a:off x="4597856" y="2517610"/>
             <a:ext cx="1145721" cy="246221"/>
           </a:xfrm>
           <a:prstGeom prst="rect">
@@ -3500,7 +3500,7 @@
         </p:nvSpPr>
         <p:spPr>
           <a:xfrm>
-            <a:off x="7017203" y="2202996"/>
+            <a:off x="8058599" y="1661586"/>
             <a:ext cx="1055915" cy="246221"/>
           </a:xfrm>
           <a:prstGeom prst="rect">
@@ -3622,11 +3622,11 @@
           <p:nvPr/>
         </p:nvCxnSpPr>
         <p:spPr>
-          <a:xfrm flipH="1" flipV="1">
-            <a:off x="5636079" y="3064397"/>
-            <a:ext cx="340178" cy="826531"/>
-          </a:xfrm>
-          <a:prstGeom prst="line">
+          <a:xfrm rot="10800000">
+            <a:off x="5170718" y="2763832"/>
+            <a:ext cx="1719937" cy="1127097"/>
+          </a:xfrm>
+          <a:prstGeom prst="curvedConnector2">
             <a:avLst/>
           </a:prstGeom>
         </p:spPr>
@@ -3663,8 +3663,8 @@
         </p:nvCxnSpPr>
         <p:spPr>
           <a:xfrm rot="16200000" flipH="1">
-            <a:off x="5553755" y="2998333"/>
-            <a:ext cx="2721" cy="1536247"/>
+            <a:off x="6010954" y="2541134"/>
+            <a:ext cx="2721" cy="2450644"/>
           </a:xfrm>
           <a:prstGeom prst="curvedConnector3">
             <a:avLst>
@@ -3818,7 +3818,7 @@
         </p:nvSpPr>
         <p:spPr>
           <a:xfrm>
-            <a:off x="6670222" y="2839879"/>
+            <a:off x="7711618" y="2539313"/>
             <a:ext cx="1055915" cy="246221"/>
           </a:xfrm>
           <a:prstGeom prst="rect">
@@ -3861,8 +3861,8 @@
         </p:nvCxnSpPr>
         <p:spPr>
           <a:xfrm flipV="1">
-            <a:off x="6670222" y="3086100"/>
-            <a:ext cx="527958" cy="804828"/>
+            <a:off x="7584619" y="2785534"/>
+            <a:ext cx="654957" cy="1105394"/>
           </a:xfrm>
           <a:prstGeom prst="line">
             <a:avLst/>
@@ -3912,7 +3912,7 @@
         </p:blipFill>
         <p:spPr bwMode="auto">
           <a:xfrm>
-            <a:off x="7523322" y="2861582"/>
+            <a:off x="8564718" y="2561016"/>
             <a:ext cx="202815" cy="202815"/>
           </a:xfrm>
           <a:prstGeom prst="rect">
@@ -3947,8 +3947,8 @@
         </p:nvCxnSpPr>
         <p:spPr>
           <a:xfrm flipV="1">
-            <a:off x="7198180" y="2449217"/>
-            <a:ext cx="346981" cy="390662"/>
+            <a:off x="8239576" y="1907807"/>
+            <a:ext cx="346981" cy="631506"/>
           </a:xfrm>
           <a:prstGeom prst="line">
             <a:avLst/>
@@ -4062,7 +4062,7 @@
         </p:nvSpPr>
         <p:spPr>
           <a:xfrm>
-            <a:off x="4155621" y="2247899"/>
+            <a:off x="3690259" y="1947333"/>
             <a:ext cx="693965" cy="246221"/>
           </a:xfrm>
           <a:prstGeom prst="rect">
@@ -4102,7 +4102,7 @@
         </p:nvSpPr>
         <p:spPr>
           <a:xfrm>
-            <a:off x="5743574" y="2234719"/>
+            <a:off x="5278212" y="1934153"/>
             <a:ext cx="693965" cy="246221"/>
           </a:xfrm>
           <a:prstGeom prst="rect">
@@ -4142,7 +4142,7 @@
         </p:nvSpPr>
         <p:spPr>
           <a:xfrm>
-            <a:off x="4982935" y="2244244"/>
+            <a:off x="4517573" y="1943678"/>
             <a:ext cx="693965" cy="246221"/>
           </a:xfrm>
           <a:prstGeom prst="rect">
@@ -4186,7 +4186,7 @@
         </p:nvCxnSpPr>
         <p:spPr>
           <a:xfrm flipH="1" flipV="1">
-            <a:off x="4502604" y="2494120"/>
+            <a:off x="4037242" y="2193554"/>
             <a:ext cx="1133475" cy="324056"/>
           </a:xfrm>
           <a:prstGeom prst="line">
@@ -4225,7 +4225,7 @@
         </p:nvCxnSpPr>
         <p:spPr>
           <a:xfrm flipH="1" flipV="1">
-            <a:off x="5329918" y="2490465"/>
+            <a:off x="4864556" y="2189899"/>
             <a:ext cx="306161" cy="327711"/>
           </a:xfrm>
           <a:prstGeom prst="line">
@@ -4265,7 +4265,7 @@
         </p:nvCxnSpPr>
         <p:spPr>
           <a:xfrm flipV="1">
-            <a:off x="5636079" y="2480940"/>
+            <a:off x="5170717" y="2180374"/>
             <a:ext cx="454478" cy="337236"/>
           </a:xfrm>
           <a:prstGeom prst="line">
@@ -4459,7 +4459,7 @@
         </p:nvSpPr>
         <p:spPr>
           <a:xfrm>
-            <a:off x="6406244" y="1553002"/>
+            <a:off x="7173228" y="1006727"/>
             <a:ext cx="693964" cy="246221"/>
           </a:xfrm>
           <a:prstGeom prst="rect">
@@ -4502,8 +4502,8 @@
         </p:nvCxnSpPr>
         <p:spPr>
           <a:xfrm>
-            <a:off x="6753226" y="1799223"/>
-            <a:ext cx="390524" cy="403774"/>
+            <a:off x="7520210" y="1252948"/>
+            <a:ext cx="709841" cy="404657"/>
           </a:xfrm>
           <a:prstGeom prst="line">
             <a:avLst/>
@@ -4552,7 +4552,7 @@
         </p:blipFill>
         <p:spPr>
           <a:xfrm>
-            <a:off x="6944408" y="1596851"/>
+            <a:off x="7708671" y="1044336"/>
             <a:ext cx="158521" cy="158521"/>
           </a:xfrm>
           <a:prstGeom prst="rect">
@@ -4775,7 +4775,7 @@
         </p:nvSpPr>
         <p:spPr>
           <a:xfrm>
-            <a:off x="7379154" y="1544410"/>
+            <a:off x="8045445" y="996002"/>
             <a:ext cx="789213" cy="246221"/>
           </a:xfrm>
           <a:prstGeom prst="rect">
@@ -4822,8 +4822,8 @@
         </p:nvCxnSpPr>
         <p:spPr>
           <a:xfrm flipH="1">
-            <a:off x="7278461" y="1790631"/>
-            <a:ext cx="495300" cy="412365"/>
+            <a:off x="8408304" y="1242223"/>
+            <a:ext cx="31748" cy="426360"/>
           </a:xfrm>
           <a:prstGeom prst="line">
             <a:avLst/>
@@ -4869,6 +4869,2046 @@
             <a:avLst>
               <a:gd name="adj1" fmla="val 20211"/>
             </a:avLst>
+          </a:prstGeom>
+        </p:spPr>
+        <p:style>
+          <a:lnRef idx="1">
+            <a:schemeClr val="accent1"/>
+          </a:lnRef>
+          <a:fillRef idx="0">
+            <a:schemeClr val="accent1"/>
+          </a:fillRef>
+          <a:effectRef idx="0">
+            <a:schemeClr val="accent1"/>
+          </a:effectRef>
+          <a:fontRef idx="minor">
+            <a:schemeClr val="tx1"/>
+          </a:fontRef>
+        </p:style>
+      </p:cxnSp>
+      <p:sp>
+        <p:nvSpPr>
+          <p:cNvPr id="13" name="TextBox 12">
+            <a:extLst>
+              <a:ext uri="{FF2B5EF4-FFF2-40B4-BE49-F238E27FC236}">
+                <a16:creationId xmlns:a16="http://schemas.microsoft.com/office/drawing/2014/main" id="{ACF458B9-F32B-44E8-8F34-8C23AB8B5E56}"/>
+              </a:ext>
+            </a:extLst>
+          </p:cNvPr>
+          <p:cNvSpPr txBox="1"/>
+          <p:nvPr/>
+        </p:nvSpPr>
+        <p:spPr>
+          <a:xfrm>
+            <a:off x="4489684" y="3190191"/>
+            <a:ext cx="693965" cy="246221"/>
+          </a:xfrm>
+          <a:prstGeom prst="rect">
+            <a:avLst/>
+          </a:prstGeom>
+          <a:noFill/>
+          <a:ln>
+            <a:solidFill>
+              <a:schemeClr val="accent1"/>
+            </a:solidFill>
+          </a:ln>
+        </p:spPr>
+        <p:txBody>
+          <a:bodyPr wrap="square" rtlCol="0">
+            <a:spAutoFit/>
+          </a:bodyPr>
+          <a:lstStyle/>
+          <a:p>
+            <a:r>
+              <a:rPr lang="en-US" sz="1000" dirty="0"/>
+              <a:t>?</a:t>
+            </a:r>
+          </a:p>
+        </p:txBody>
+      </p:sp>
+      <p:sp>
+        <p:nvSpPr>
+          <p:cNvPr id="15" name="TextBox 14">
+            <a:extLst>
+              <a:ext uri="{FF2B5EF4-FFF2-40B4-BE49-F238E27FC236}">
+                <a16:creationId xmlns:a16="http://schemas.microsoft.com/office/drawing/2014/main" id="{06C7179C-76AA-4332-AFF7-A46E86082E7D}"/>
+              </a:ext>
+            </a:extLst>
+          </p:cNvPr>
+          <p:cNvSpPr txBox="1"/>
+          <p:nvPr/>
+        </p:nvSpPr>
+        <p:spPr>
+          <a:xfrm>
+            <a:off x="3384838" y="3190191"/>
+            <a:ext cx="693965" cy="246221"/>
+          </a:xfrm>
+          <a:prstGeom prst="rect">
+            <a:avLst/>
+          </a:prstGeom>
+          <a:noFill/>
+          <a:ln>
+            <a:solidFill>
+              <a:schemeClr val="accent1"/>
+            </a:solidFill>
+          </a:ln>
+        </p:spPr>
+        <p:txBody>
+          <a:bodyPr wrap="square" rtlCol="0">
+            <a:spAutoFit/>
+          </a:bodyPr>
+          <a:lstStyle/>
+          <a:p>
+            <a:r>
+              <a:rPr lang="en-US" sz="1000" dirty="0"/>
+              <a:t>?</a:t>
+            </a:r>
+          </a:p>
+        </p:txBody>
+      </p:sp>
+      <p:sp>
+        <p:nvSpPr>
+          <p:cNvPr id="17" name="TextBox 16">
+            <a:extLst>
+              <a:ext uri="{FF2B5EF4-FFF2-40B4-BE49-F238E27FC236}">
+                <a16:creationId xmlns:a16="http://schemas.microsoft.com/office/drawing/2014/main" id="{20FAB8E5-B97E-4E53-BA2E-D9BF1C85BA3A}"/>
+              </a:ext>
+            </a:extLst>
+          </p:cNvPr>
+          <p:cNvSpPr txBox="1"/>
+          <p:nvPr/>
+        </p:nvSpPr>
+        <p:spPr>
+          <a:xfrm>
+            <a:off x="2343487" y="3190191"/>
+            <a:ext cx="693965" cy="246221"/>
+          </a:xfrm>
+          <a:prstGeom prst="rect">
+            <a:avLst/>
+          </a:prstGeom>
+          <a:noFill/>
+          <a:ln>
+            <a:solidFill>
+              <a:schemeClr val="accent1"/>
+            </a:solidFill>
+          </a:ln>
+        </p:spPr>
+        <p:txBody>
+          <a:bodyPr wrap="square" rtlCol="0">
+            <a:spAutoFit/>
+          </a:bodyPr>
+          <a:lstStyle/>
+          <a:p>
+            <a:r>
+              <a:rPr lang="en-US" sz="1000" dirty="0"/>
+              <a:t>?</a:t>
+            </a:r>
+          </a:p>
+        </p:txBody>
+      </p:sp>
+      <p:cxnSp>
+        <p:nvCxnSpPr>
+          <p:cNvPr id="49" name="Straight Connector 48">
+            <a:extLst>
+              <a:ext uri="{FF2B5EF4-FFF2-40B4-BE49-F238E27FC236}">
+                <a16:creationId xmlns:a16="http://schemas.microsoft.com/office/drawing/2014/main" id="{8FB8B322-11D4-4E9E-81BA-B89D051D967E}"/>
+              </a:ext>
+            </a:extLst>
+          </p:cNvPr>
+          <p:cNvCxnSpPr>
+            <a:cxnSpLocks/>
+            <a:stCxn id="15" idx="2"/>
+            <a:endCxn id="4" idx="0"/>
+          </p:cNvCxnSpPr>
+          <p:nvPr/>
+        </p:nvCxnSpPr>
+        <p:spPr>
+          <a:xfrm>
+            <a:off x="3731821" y="3436412"/>
+            <a:ext cx="1055172" cy="328684"/>
+          </a:xfrm>
+          <a:prstGeom prst="line">
+            <a:avLst/>
+          </a:prstGeom>
+        </p:spPr>
+        <p:style>
+          <a:lnRef idx="1">
+            <a:schemeClr val="accent1"/>
+          </a:lnRef>
+          <a:fillRef idx="0">
+            <a:schemeClr val="accent1"/>
+          </a:fillRef>
+          <a:effectRef idx="0">
+            <a:schemeClr val="accent1"/>
+          </a:effectRef>
+          <a:fontRef idx="minor">
+            <a:schemeClr val="tx1"/>
+          </a:fontRef>
+        </p:style>
+      </p:cxnSp>
+      <p:cxnSp>
+        <p:nvCxnSpPr>
+          <p:cNvPr id="54" name="Straight Connector 53">
+            <a:extLst>
+              <a:ext uri="{FF2B5EF4-FFF2-40B4-BE49-F238E27FC236}">
+                <a16:creationId xmlns:a16="http://schemas.microsoft.com/office/drawing/2014/main" id="{814626D9-44CB-4B86-833A-906202DB222D}"/>
+              </a:ext>
+            </a:extLst>
+          </p:cNvPr>
+          <p:cNvCxnSpPr>
+            <a:cxnSpLocks/>
+            <a:stCxn id="13" idx="2"/>
+          </p:cNvCxnSpPr>
+          <p:nvPr/>
+        </p:nvCxnSpPr>
+        <p:spPr>
+          <a:xfrm>
+            <a:off x="4836667" y="3436412"/>
+            <a:ext cx="135468" cy="325165"/>
+          </a:xfrm>
+          <a:prstGeom prst="line">
+            <a:avLst/>
+          </a:prstGeom>
+        </p:spPr>
+        <p:style>
+          <a:lnRef idx="1">
+            <a:schemeClr val="accent1"/>
+          </a:lnRef>
+          <a:fillRef idx="0">
+            <a:schemeClr val="accent1"/>
+          </a:fillRef>
+          <a:effectRef idx="0">
+            <a:schemeClr val="accent1"/>
+          </a:effectRef>
+          <a:fontRef idx="minor">
+            <a:schemeClr val="tx1"/>
+          </a:fontRef>
+        </p:style>
+      </p:cxnSp>
+      <p:cxnSp>
+        <p:nvCxnSpPr>
+          <p:cNvPr id="55" name="Straight Connector 54">
+            <a:extLst>
+              <a:ext uri="{FF2B5EF4-FFF2-40B4-BE49-F238E27FC236}">
+                <a16:creationId xmlns:a16="http://schemas.microsoft.com/office/drawing/2014/main" id="{30404B9D-9867-4F5E-828C-744D37A608E3}"/>
+              </a:ext>
+            </a:extLst>
+          </p:cNvPr>
+          <p:cNvCxnSpPr>
+            <a:cxnSpLocks/>
+            <a:endCxn id="17" idx="2"/>
+          </p:cNvCxnSpPr>
+          <p:nvPr/>
+        </p:nvCxnSpPr>
+        <p:spPr>
+          <a:xfrm flipH="1" flipV="1">
+            <a:off x="2690470" y="3436412"/>
+            <a:ext cx="1796681" cy="328683"/>
+          </a:xfrm>
+          <a:prstGeom prst="line">
+            <a:avLst/>
+          </a:prstGeom>
+        </p:spPr>
+        <p:style>
+          <a:lnRef idx="1">
+            <a:schemeClr val="accent1"/>
+          </a:lnRef>
+          <a:fillRef idx="0">
+            <a:schemeClr val="accent1"/>
+          </a:fillRef>
+          <a:effectRef idx="0">
+            <a:schemeClr val="accent1"/>
+          </a:effectRef>
+          <a:fontRef idx="minor">
+            <a:schemeClr val="tx1"/>
+          </a:fontRef>
+        </p:style>
+      </p:cxnSp>
+      <p:sp>
+        <p:nvSpPr>
+          <p:cNvPr id="59" name="TextBox 58">
+            <a:extLst>
+              <a:ext uri="{FF2B5EF4-FFF2-40B4-BE49-F238E27FC236}">
+                <a16:creationId xmlns:a16="http://schemas.microsoft.com/office/drawing/2014/main" id="{118680C0-16A9-4F29-8FDE-1CE3EC4F7906}"/>
+              </a:ext>
+            </a:extLst>
+          </p:cNvPr>
+          <p:cNvSpPr txBox="1"/>
+          <p:nvPr/>
+        </p:nvSpPr>
+        <p:spPr>
+          <a:xfrm>
+            <a:off x="6006116" y="4283523"/>
+            <a:ext cx="693965" cy="246221"/>
+          </a:xfrm>
+          <a:prstGeom prst="rect">
+            <a:avLst/>
+          </a:prstGeom>
+          <a:noFill/>
+          <a:ln>
+            <a:solidFill>
+              <a:schemeClr val="accent1"/>
+            </a:solidFill>
+          </a:ln>
+        </p:spPr>
+        <p:txBody>
+          <a:bodyPr wrap="square" rtlCol="0">
+            <a:spAutoFit/>
+          </a:bodyPr>
+          <a:lstStyle/>
+          <a:p>
+            <a:r>
+              <a:rPr lang="en-US" sz="1000" dirty="0"/>
+              <a:t>?</a:t>
+            </a:r>
+          </a:p>
+        </p:txBody>
+      </p:sp>
+      <p:cxnSp>
+        <p:nvCxnSpPr>
+          <p:cNvPr id="65" name="Straight Connector 64">
+            <a:extLst>
+              <a:ext uri="{FF2B5EF4-FFF2-40B4-BE49-F238E27FC236}">
+                <a16:creationId xmlns:a16="http://schemas.microsoft.com/office/drawing/2014/main" id="{7916E6D4-37C4-4705-868C-CC8A802EEA53}"/>
+              </a:ext>
+            </a:extLst>
+          </p:cNvPr>
+          <p:cNvCxnSpPr>
+            <a:cxnSpLocks/>
+            <a:stCxn id="59" idx="1"/>
+            <a:endCxn id="2" idx="3"/>
+          </p:cNvCxnSpPr>
+          <p:nvPr/>
+        </p:nvCxnSpPr>
+        <p:spPr>
+          <a:xfrm flipH="1" flipV="1">
+            <a:off x="5106761" y="4401196"/>
+            <a:ext cx="899355" cy="5438"/>
+          </a:xfrm>
+          <a:prstGeom prst="line">
+            <a:avLst/>
+          </a:prstGeom>
+        </p:spPr>
+        <p:style>
+          <a:lnRef idx="1">
+            <a:schemeClr val="accent1"/>
+          </a:lnRef>
+          <a:fillRef idx="0">
+            <a:schemeClr val="accent1"/>
+          </a:fillRef>
+          <a:effectRef idx="0">
+            <a:schemeClr val="accent1"/>
+          </a:effectRef>
+          <a:fontRef idx="minor">
+            <a:schemeClr val="tx1"/>
+          </a:fontRef>
+        </p:style>
+      </p:cxnSp>
+      <p:sp>
+        <p:nvSpPr>
+          <p:cNvPr id="66" name="TextBox 65">
+            <a:extLst>
+              <a:ext uri="{FF2B5EF4-FFF2-40B4-BE49-F238E27FC236}">
+                <a16:creationId xmlns:a16="http://schemas.microsoft.com/office/drawing/2014/main" id="{13FA0F31-12C7-444A-8F36-E33CD7D1526B}"/>
+              </a:ext>
+            </a:extLst>
+          </p:cNvPr>
+          <p:cNvSpPr txBox="1"/>
+          <p:nvPr/>
+        </p:nvSpPr>
+        <p:spPr>
+          <a:xfrm>
+            <a:off x="7650238" y="4281189"/>
+            <a:ext cx="693965" cy="246221"/>
+          </a:xfrm>
+          <a:prstGeom prst="rect">
+            <a:avLst/>
+          </a:prstGeom>
+          <a:noFill/>
+          <a:ln>
+            <a:solidFill>
+              <a:schemeClr val="accent1"/>
+            </a:solidFill>
+          </a:ln>
+        </p:spPr>
+        <p:txBody>
+          <a:bodyPr wrap="square" rtlCol="0">
+            <a:spAutoFit/>
+          </a:bodyPr>
+          <a:lstStyle/>
+          <a:p>
+            <a:r>
+              <a:rPr lang="en-US" sz="1000" dirty="0"/>
+              <a:t>?</a:t>
+            </a:r>
+          </a:p>
+        </p:txBody>
+      </p:sp>
+      <p:cxnSp>
+        <p:nvCxnSpPr>
+          <p:cNvPr id="70" name="Straight Connector 69">
+            <a:extLst>
+              <a:ext uri="{FF2B5EF4-FFF2-40B4-BE49-F238E27FC236}">
+                <a16:creationId xmlns:a16="http://schemas.microsoft.com/office/drawing/2014/main" id="{6A50D722-7B06-4E74-9414-1889617005E4}"/>
+              </a:ext>
+            </a:extLst>
+          </p:cNvPr>
+          <p:cNvCxnSpPr>
+            <a:cxnSpLocks/>
+            <a:stCxn id="66" idx="1"/>
+            <a:endCxn id="59" idx="3"/>
+          </p:cNvCxnSpPr>
+          <p:nvPr/>
+        </p:nvCxnSpPr>
+        <p:spPr>
+          <a:xfrm flipH="1">
+            <a:off x="6700081" y="4404300"/>
+            <a:ext cx="950157" cy="2334"/>
+          </a:xfrm>
+          <a:prstGeom prst="line">
+            <a:avLst/>
+          </a:prstGeom>
+        </p:spPr>
+        <p:style>
+          <a:lnRef idx="1">
+            <a:schemeClr val="accent1"/>
+          </a:lnRef>
+          <a:fillRef idx="0">
+            <a:schemeClr val="accent1"/>
+          </a:fillRef>
+          <a:effectRef idx="0">
+            <a:schemeClr val="accent1"/>
+          </a:effectRef>
+          <a:fontRef idx="minor">
+            <a:schemeClr val="tx1"/>
+          </a:fontRef>
+        </p:style>
+      </p:cxnSp>
+      <p:sp>
+        <p:nvSpPr>
+          <p:cNvPr id="71" name="TextBox 70">
+            <a:extLst>
+              <a:ext uri="{FF2B5EF4-FFF2-40B4-BE49-F238E27FC236}">
+                <a16:creationId xmlns:a16="http://schemas.microsoft.com/office/drawing/2014/main" id="{362CD041-6802-465C-B30C-324A37B533E4}"/>
+              </a:ext>
+            </a:extLst>
+          </p:cNvPr>
+          <p:cNvSpPr txBox="1"/>
+          <p:nvPr/>
+        </p:nvSpPr>
+        <p:spPr>
+          <a:xfrm>
+            <a:off x="8291968" y="3190191"/>
+            <a:ext cx="693965" cy="246221"/>
+          </a:xfrm>
+          <a:prstGeom prst="rect">
+            <a:avLst/>
+          </a:prstGeom>
+          <a:noFill/>
+          <a:ln>
+            <a:solidFill>
+              <a:schemeClr val="accent1"/>
+            </a:solidFill>
+          </a:ln>
+        </p:spPr>
+        <p:txBody>
+          <a:bodyPr wrap="square" rtlCol="0">
+            <a:spAutoFit/>
+          </a:bodyPr>
+          <a:lstStyle/>
+          <a:p>
+            <a:r>
+              <a:rPr lang="en-US" sz="1000" dirty="0"/>
+              <a:t>?</a:t>
+            </a:r>
+          </a:p>
+        </p:txBody>
+      </p:sp>
+      <p:cxnSp>
+        <p:nvCxnSpPr>
+          <p:cNvPr id="75" name="Straight Connector 74">
+            <a:extLst>
+              <a:ext uri="{FF2B5EF4-FFF2-40B4-BE49-F238E27FC236}">
+                <a16:creationId xmlns:a16="http://schemas.microsoft.com/office/drawing/2014/main" id="{F1BAD2B8-B5B7-4A60-B0D8-4CE250A82736}"/>
+              </a:ext>
+            </a:extLst>
+          </p:cNvPr>
+          <p:cNvCxnSpPr>
+            <a:cxnSpLocks/>
+            <a:stCxn id="66" idx="0"/>
+            <a:endCxn id="71" idx="2"/>
+          </p:cNvCxnSpPr>
+          <p:nvPr/>
+        </p:nvCxnSpPr>
+        <p:spPr>
+          <a:xfrm flipV="1">
+            <a:off x="7997221" y="3436412"/>
+            <a:ext cx="641730" cy="844777"/>
+          </a:xfrm>
+          <a:prstGeom prst="line">
+            <a:avLst/>
+          </a:prstGeom>
+        </p:spPr>
+        <p:style>
+          <a:lnRef idx="1">
+            <a:schemeClr val="accent1"/>
+          </a:lnRef>
+          <a:fillRef idx="0">
+            <a:schemeClr val="accent1"/>
+          </a:fillRef>
+          <a:effectRef idx="0">
+            <a:schemeClr val="accent1"/>
+          </a:effectRef>
+          <a:fontRef idx="minor">
+            <a:schemeClr val="tx1"/>
+          </a:fontRef>
+        </p:style>
+      </p:cxnSp>
+      <p:sp>
+        <p:nvSpPr>
+          <p:cNvPr id="76" name="TextBox 75">
+            <a:extLst>
+              <a:ext uri="{FF2B5EF4-FFF2-40B4-BE49-F238E27FC236}">
+                <a16:creationId xmlns:a16="http://schemas.microsoft.com/office/drawing/2014/main" id="{1EFC9713-B8AC-4563-A330-9528B18C886D}"/>
+              </a:ext>
+            </a:extLst>
+          </p:cNvPr>
+          <p:cNvSpPr txBox="1"/>
+          <p:nvPr/>
+        </p:nvSpPr>
+        <p:spPr>
+          <a:xfrm>
+            <a:off x="6090556" y="3190191"/>
+            <a:ext cx="693965" cy="246221"/>
+          </a:xfrm>
+          <a:prstGeom prst="rect">
+            <a:avLst/>
+          </a:prstGeom>
+          <a:noFill/>
+          <a:ln>
+            <a:solidFill>
+              <a:schemeClr val="accent1"/>
+            </a:solidFill>
+          </a:ln>
+        </p:spPr>
+        <p:txBody>
+          <a:bodyPr wrap="square" rtlCol="0">
+            <a:spAutoFit/>
+          </a:bodyPr>
+          <a:lstStyle/>
+          <a:p>
+            <a:r>
+              <a:rPr lang="en-US" sz="1000" dirty="0"/>
+              <a:t>?</a:t>
+            </a:r>
+          </a:p>
+        </p:txBody>
+      </p:sp>
+      <p:sp>
+        <p:nvSpPr>
+          <p:cNvPr id="77" name="TextBox 76">
+            <a:extLst>
+              <a:ext uri="{FF2B5EF4-FFF2-40B4-BE49-F238E27FC236}">
+                <a16:creationId xmlns:a16="http://schemas.microsoft.com/office/drawing/2014/main" id="{AA04DCAE-C8CF-430A-BBDA-502D6C178D87}"/>
+              </a:ext>
+            </a:extLst>
+          </p:cNvPr>
+          <p:cNvSpPr txBox="1"/>
+          <p:nvPr/>
+        </p:nvSpPr>
+        <p:spPr>
+          <a:xfrm>
+            <a:off x="6991864" y="3190191"/>
+            <a:ext cx="693965" cy="246221"/>
+          </a:xfrm>
+          <a:prstGeom prst="rect">
+            <a:avLst/>
+          </a:prstGeom>
+          <a:noFill/>
+          <a:ln>
+            <a:solidFill>
+              <a:schemeClr val="accent1"/>
+            </a:solidFill>
+          </a:ln>
+        </p:spPr>
+        <p:txBody>
+          <a:bodyPr wrap="square" rtlCol="0">
+            <a:spAutoFit/>
+          </a:bodyPr>
+          <a:lstStyle/>
+          <a:p>
+            <a:r>
+              <a:rPr lang="en-US" sz="1000" dirty="0"/>
+              <a:t>?</a:t>
+            </a:r>
+          </a:p>
+        </p:txBody>
+      </p:sp>
+      <p:cxnSp>
+        <p:nvCxnSpPr>
+          <p:cNvPr id="87" name="Straight Connector 86">
+            <a:extLst>
+              <a:ext uri="{FF2B5EF4-FFF2-40B4-BE49-F238E27FC236}">
+                <a16:creationId xmlns:a16="http://schemas.microsoft.com/office/drawing/2014/main" id="{E70A57BA-61D8-46F3-85B0-1C1A0B74B5DE}"/>
+              </a:ext>
+            </a:extLst>
+          </p:cNvPr>
+          <p:cNvCxnSpPr>
+            <a:cxnSpLocks/>
+            <a:stCxn id="76" idx="2"/>
+          </p:cNvCxnSpPr>
+          <p:nvPr/>
+        </p:nvCxnSpPr>
+        <p:spPr>
+          <a:xfrm>
+            <a:off x="6437539" y="3436412"/>
+            <a:ext cx="638257" cy="328683"/>
+          </a:xfrm>
+          <a:prstGeom prst="line">
+            <a:avLst/>
+          </a:prstGeom>
+        </p:spPr>
+        <p:style>
+          <a:lnRef idx="1">
+            <a:schemeClr val="accent1"/>
+          </a:lnRef>
+          <a:fillRef idx="0">
+            <a:schemeClr val="accent1"/>
+          </a:fillRef>
+          <a:effectRef idx="0">
+            <a:schemeClr val="accent1"/>
+          </a:effectRef>
+          <a:fontRef idx="minor">
+            <a:schemeClr val="tx1"/>
+          </a:fontRef>
+        </p:style>
+      </p:cxnSp>
+      <p:cxnSp>
+        <p:nvCxnSpPr>
+          <p:cNvPr id="90" name="Straight Connector 89">
+            <a:extLst>
+              <a:ext uri="{FF2B5EF4-FFF2-40B4-BE49-F238E27FC236}">
+                <a16:creationId xmlns:a16="http://schemas.microsoft.com/office/drawing/2014/main" id="{DA64B0AC-01BD-4436-A32D-25E2748912C6}"/>
+              </a:ext>
+            </a:extLst>
+          </p:cNvPr>
+          <p:cNvCxnSpPr>
+            <a:cxnSpLocks/>
+            <a:stCxn id="77" idx="2"/>
+          </p:cNvCxnSpPr>
+          <p:nvPr/>
+        </p:nvCxnSpPr>
+        <p:spPr>
+          <a:xfrm>
+            <a:off x="7338847" y="3436412"/>
+            <a:ext cx="34751" cy="325165"/>
+          </a:xfrm>
+          <a:prstGeom prst="line">
+            <a:avLst/>
+          </a:prstGeom>
+        </p:spPr>
+        <p:style>
+          <a:lnRef idx="1">
+            <a:schemeClr val="accent1"/>
+          </a:lnRef>
+          <a:fillRef idx="0">
+            <a:schemeClr val="accent1"/>
+          </a:fillRef>
+          <a:effectRef idx="0">
+            <a:schemeClr val="accent1"/>
+          </a:effectRef>
+          <a:fontRef idx="minor">
+            <a:schemeClr val="tx1"/>
+          </a:fontRef>
+        </p:style>
+      </p:cxnSp>
+      <p:cxnSp>
+        <p:nvCxnSpPr>
+          <p:cNvPr id="93" name="Straight Connector 92">
+            <a:extLst>
+              <a:ext uri="{FF2B5EF4-FFF2-40B4-BE49-F238E27FC236}">
+                <a16:creationId xmlns:a16="http://schemas.microsoft.com/office/drawing/2014/main" id="{1983ED3A-EB24-48EC-BE8F-093D1FF2E2FD}"/>
+              </a:ext>
+            </a:extLst>
+          </p:cNvPr>
+          <p:cNvCxnSpPr>
+            <a:cxnSpLocks/>
+            <a:stCxn id="71" idx="1"/>
+          </p:cNvCxnSpPr>
+          <p:nvPr/>
+        </p:nvCxnSpPr>
+        <p:spPr>
+          <a:xfrm flipH="1">
+            <a:off x="7507818" y="3313302"/>
+            <a:ext cx="784150" cy="448275"/>
+          </a:xfrm>
+          <a:prstGeom prst="line">
+            <a:avLst/>
+          </a:prstGeom>
+        </p:spPr>
+        <p:style>
+          <a:lnRef idx="1">
+            <a:schemeClr val="accent1"/>
+          </a:lnRef>
+          <a:fillRef idx="0">
+            <a:schemeClr val="accent1"/>
+          </a:fillRef>
+          <a:effectRef idx="0">
+            <a:schemeClr val="accent1"/>
+          </a:effectRef>
+          <a:fontRef idx="minor">
+            <a:schemeClr val="tx1"/>
+          </a:fontRef>
+        </p:style>
+      </p:cxnSp>
+      <p:sp>
+        <p:nvSpPr>
+          <p:cNvPr id="95" name="TextBox 94">
+            <a:extLst>
+              <a:ext uri="{FF2B5EF4-FFF2-40B4-BE49-F238E27FC236}">
+                <a16:creationId xmlns:a16="http://schemas.microsoft.com/office/drawing/2014/main" id="{413093AA-66AB-4271-A19F-68419ED74E7B}"/>
+              </a:ext>
+            </a:extLst>
+          </p:cNvPr>
+          <p:cNvSpPr txBox="1"/>
+          <p:nvPr/>
+        </p:nvSpPr>
+        <p:spPr>
+          <a:xfrm>
+            <a:off x="9966772" y="996000"/>
+            <a:ext cx="789213" cy="246221"/>
+          </a:xfrm>
+          <a:prstGeom prst="rect">
+            <a:avLst/>
+          </a:prstGeom>
+          <a:noFill/>
+          <a:ln>
+            <a:solidFill>
+              <a:schemeClr val="accent1"/>
+            </a:solidFill>
+          </a:ln>
+        </p:spPr>
+        <p:txBody>
+          <a:bodyPr wrap="square" rtlCol="0">
+            <a:spAutoFit/>
+          </a:bodyPr>
+          <a:lstStyle/>
+          <a:p>
+            <a:r>
+              <a:rPr lang="en-US" sz="1000" dirty="0"/>
+              <a:t>Edna Room</a:t>
+            </a:r>
+          </a:p>
+        </p:txBody>
+      </p:sp>
+      <p:sp>
+        <p:nvSpPr>
+          <p:cNvPr id="96" name="TextBox 95">
+            <a:extLst>
+              <a:ext uri="{FF2B5EF4-FFF2-40B4-BE49-F238E27FC236}">
+                <a16:creationId xmlns:a16="http://schemas.microsoft.com/office/drawing/2014/main" id="{BF8FD4D4-097E-4642-91AB-5362C459C148}"/>
+              </a:ext>
+            </a:extLst>
+          </p:cNvPr>
+          <p:cNvSpPr txBox="1"/>
+          <p:nvPr/>
+        </p:nvSpPr>
+        <p:spPr>
+          <a:xfrm>
+            <a:off x="8935351" y="996001"/>
+            <a:ext cx="891728" cy="246221"/>
+          </a:xfrm>
+          <a:prstGeom prst="rect">
+            <a:avLst/>
+          </a:prstGeom>
+          <a:noFill/>
+          <a:ln>
+            <a:solidFill>
+              <a:schemeClr val="accent1"/>
+            </a:solidFill>
+          </a:ln>
+        </p:spPr>
+        <p:txBody>
+          <a:bodyPr wrap="square" rtlCol="0">
+            <a:spAutoFit/>
+          </a:bodyPr>
+          <a:lstStyle/>
+          <a:p>
+            <a:r>
+              <a:rPr lang="en-US" sz="1000" dirty="0" err="1"/>
+              <a:t>Edwige</a:t>
+            </a:r>
+            <a:r>
+              <a:rPr lang="en-US" sz="1000" dirty="0"/>
+              <a:t> Room</a:t>
+            </a:r>
+          </a:p>
+        </p:txBody>
+      </p:sp>
+      <p:sp>
+        <p:nvSpPr>
+          <p:cNvPr id="98" name="TextBox 97">
+            <a:extLst>
+              <a:ext uri="{FF2B5EF4-FFF2-40B4-BE49-F238E27FC236}">
+                <a16:creationId xmlns:a16="http://schemas.microsoft.com/office/drawing/2014/main" id="{0398A134-01AC-4583-AC5B-C57D1E6D5E55}"/>
+              </a:ext>
+            </a:extLst>
+          </p:cNvPr>
+          <p:cNvSpPr txBox="1"/>
+          <p:nvPr/>
+        </p:nvSpPr>
+        <p:spPr>
+          <a:xfrm>
+            <a:off x="9975236" y="1415365"/>
+            <a:ext cx="789213" cy="246221"/>
+          </a:xfrm>
+          <a:prstGeom prst="rect">
+            <a:avLst/>
+          </a:prstGeom>
+          <a:noFill/>
+          <a:ln>
+            <a:solidFill>
+              <a:schemeClr val="accent1"/>
+            </a:solidFill>
+          </a:ln>
+        </p:spPr>
+        <p:txBody>
+          <a:bodyPr wrap="square" rtlCol="0">
+            <a:spAutoFit/>
+          </a:bodyPr>
+          <a:lstStyle/>
+          <a:p>
+            <a:r>
+              <a:rPr lang="en-US" sz="1000" dirty="0" err="1"/>
+              <a:t>Batroom</a:t>
+            </a:r>
+            <a:endParaRPr lang="en-US" sz="1000" dirty="0"/>
+          </a:p>
+        </p:txBody>
+      </p:sp>
+      <p:cxnSp>
+        <p:nvCxnSpPr>
+          <p:cNvPr id="103" name="Straight Connector 102">
+            <a:extLst>
+              <a:ext uri="{FF2B5EF4-FFF2-40B4-BE49-F238E27FC236}">
+                <a16:creationId xmlns:a16="http://schemas.microsoft.com/office/drawing/2014/main" id="{FF9A4AD6-ABCB-4FB3-AAB0-8C1A51C9AAC1}"/>
+              </a:ext>
+            </a:extLst>
+          </p:cNvPr>
+          <p:cNvCxnSpPr>
+            <a:cxnSpLocks/>
+            <a:stCxn id="96" idx="2"/>
+            <a:endCxn id="10" idx="0"/>
+          </p:cNvCxnSpPr>
+          <p:nvPr/>
+        </p:nvCxnSpPr>
+        <p:spPr>
+          <a:xfrm flipH="1">
+            <a:off x="8586557" y="1242222"/>
+            <a:ext cx="794658" cy="419364"/>
+          </a:xfrm>
+          <a:prstGeom prst="line">
+            <a:avLst/>
+          </a:prstGeom>
+        </p:spPr>
+        <p:style>
+          <a:lnRef idx="1">
+            <a:schemeClr val="accent1"/>
+          </a:lnRef>
+          <a:fillRef idx="0">
+            <a:schemeClr val="accent1"/>
+          </a:fillRef>
+          <a:effectRef idx="0">
+            <a:schemeClr val="accent1"/>
+          </a:effectRef>
+          <a:fontRef idx="minor">
+            <a:schemeClr val="tx1"/>
+          </a:fontRef>
+        </p:style>
+      </p:cxnSp>
+      <p:cxnSp>
+        <p:nvCxnSpPr>
+          <p:cNvPr id="104" name="Straight Connector 103">
+            <a:extLst>
+              <a:ext uri="{FF2B5EF4-FFF2-40B4-BE49-F238E27FC236}">
+                <a16:creationId xmlns:a16="http://schemas.microsoft.com/office/drawing/2014/main" id="{EDACB3BA-07DD-4EC1-8954-4F7779649935}"/>
+              </a:ext>
+            </a:extLst>
+          </p:cNvPr>
+          <p:cNvCxnSpPr>
+            <a:cxnSpLocks/>
+            <a:stCxn id="95" idx="2"/>
+          </p:cNvCxnSpPr>
+          <p:nvPr/>
+        </p:nvCxnSpPr>
+        <p:spPr>
+          <a:xfrm flipH="1">
+            <a:off x="8956748" y="1242221"/>
+            <a:ext cx="1404631" cy="426360"/>
+          </a:xfrm>
+          <a:prstGeom prst="line">
+            <a:avLst/>
+          </a:prstGeom>
+        </p:spPr>
+        <p:style>
+          <a:lnRef idx="1">
+            <a:schemeClr val="accent1"/>
+          </a:lnRef>
+          <a:fillRef idx="0">
+            <a:schemeClr val="accent1"/>
+          </a:fillRef>
+          <a:effectRef idx="0">
+            <a:schemeClr val="accent1"/>
+          </a:effectRef>
+          <a:fontRef idx="minor">
+            <a:schemeClr val="tx1"/>
+          </a:fontRef>
+        </p:style>
+      </p:cxnSp>
+      <p:cxnSp>
+        <p:nvCxnSpPr>
+          <p:cNvPr id="105" name="Straight Connector 104">
+            <a:extLst>
+              <a:ext uri="{FF2B5EF4-FFF2-40B4-BE49-F238E27FC236}">
+                <a16:creationId xmlns:a16="http://schemas.microsoft.com/office/drawing/2014/main" id="{C536124E-098F-4A08-9AC9-BC85252F4DAC}"/>
+              </a:ext>
+            </a:extLst>
+          </p:cNvPr>
+          <p:cNvCxnSpPr>
+            <a:cxnSpLocks/>
+            <a:stCxn id="98" idx="1"/>
+            <a:endCxn id="10" idx="3"/>
+          </p:cNvCxnSpPr>
+          <p:nvPr/>
+        </p:nvCxnSpPr>
+        <p:spPr>
+          <a:xfrm flipH="1">
+            <a:off x="9114514" y="1538476"/>
+            <a:ext cx="860722" cy="246221"/>
+          </a:xfrm>
+          <a:prstGeom prst="line">
+            <a:avLst/>
+          </a:prstGeom>
+        </p:spPr>
+        <p:style>
+          <a:lnRef idx="1">
+            <a:schemeClr val="accent1"/>
+          </a:lnRef>
+          <a:fillRef idx="0">
+            <a:schemeClr val="accent1"/>
+          </a:fillRef>
+          <a:effectRef idx="0">
+            <a:schemeClr val="accent1"/>
+          </a:effectRef>
+          <a:fontRef idx="minor">
+            <a:schemeClr val="tx1"/>
+          </a:fontRef>
+        </p:style>
+      </p:cxnSp>
+      <p:sp>
+        <p:nvSpPr>
+          <p:cNvPr id="113" name="TextBox 112">
+            <a:extLst>
+              <a:ext uri="{FF2B5EF4-FFF2-40B4-BE49-F238E27FC236}">
+                <a16:creationId xmlns:a16="http://schemas.microsoft.com/office/drawing/2014/main" id="{BE0E4618-D6F8-4F37-ACDD-A25C4950685B}"/>
+              </a:ext>
+            </a:extLst>
+          </p:cNvPr>
+          <p:cNvSpPr txBox="1"/>
+          <p:nvPr/>
+        </p:nvSpPr>
+        <p:spPr>
+          <a:xfrm>
+            <a:off x="6129943" y="1934016"/>
+            <a:ext cx="693965" cy="246221"/>
+          </a:xfrm>
+          <a:prstGeom prst="rect">
+            <a:avLst/>
+          </a:prstGeom>
+          <a:noFill/>
+          <a:ln>
+            <a:solidFill>
+              <a:schemeClr val="accent1"/>
+            </a:solidFill>
+          </a:ln>
+        </p:spPr>
+        <p:txBody>
+          <a:bodyPr wrap="square" rtlCol="0">
+            <a:spAutoFit/>
+          </a:bodyPr>
+          <a:lstStyle/>
+          <a:p>
+            <a:r>
+              <a:rPr lang="en-US" sz="1000" dirty="0"/>
+              <a:t>Study</a:t>
+            </a:r>
+          </a:p>
+        </p:txBody>
+      </p:sp>
+      <p:sp>
+        <p:nvSpPr>
+          <p:cNvPr id="114" name="TextBox 113">
+            <a:extLst>
+              <a:ext uri="{FF2B5EF4-FFF2-40B4-BE49-F238E27FC236}">
+                <a16:creationId xmlns:a16="http://schemas.microsoft.com/office/drawing/2014/main" id="{43C1B765-8B67-404D-B15B-81E9875CC576}"/>
+              </a:ext>
+            </a:extLst>
+          </p:cNvPr>
+          <p:cNvSpPr txBox="1"/>
+          <p:nvPr/>
+        </p:nvSpPr>
+        <p:spPr>
+          <a:xfrm>
+            <a:off x="2554064" y="1934016"/>
+            <a:ext cx="789213" cy="246221"/>
+          </a:xfrm>
+          <a:prstGeom prst="rect">
+            <a:avLst/>
+          </a:prstGeom>
+          <a:noFill/>
+          <a:ln>
+            <a:solidFill>
+              <a:schemeClr val="accent1"/>
+            </a:solidFill>
+          </a:ln>
+        </p:spPr>
+        <p:txBody>
+          <a:bodyPr wrap="square" rtlCol="0">
+            <a:spAutoFit/>
+          </a:bodyPr>
+          <a:lstStyle/>
+          <a:p>
+            <a:r>
+              <a:rPr lang="en-US" sz="1000" dirty="0" err="1"/>
+              <a:t>Batroom</a:t>
+            </a:r>
+            <a:endParaRPr lang="en-US" sz="1000" dirty="0"/>
+          </a:p>
+        </p:txBody>
+      </p:sp>
+      <p:cxnSp>
+        <p:nvCxnSpPr>
+          <p:cNvPr id="119" name="Straight Connector 118">
+            <a:extLst>
+              <a:ext uri="{FF2B5EF4-FFF2-40B4-BE49-F238E27FC236}">
+                <a16:creationId xmlns:a16="http://schemas.microsoft.com/office/drawing/2014/main" id="{A6E02811-F9D0-48B5-AB95-F9B1CEE1DE97}"/>
+              </a:ext>
+            </a:extLst>
+          </p:cNvPr>
+          <p:cNvCxnSpPr>
+            <a:cxnSpLocks/>
+            <a:stCxn id="8" idx="1"/>
+            <a:endCxn id="114" idx="2"/>
+          </p:cNvCxnSpPr>
+          <p:nvPr/>
+        </p:nvCxnSpPr>
+        <p:spPr>
+          <a:xfrm flipH="1" flipV="1">
+            <a:off x="2948671" y="2180237"/>
+            <a:ext cx="1649185" cy="460484"/>
+          </a:xfrm>
+          <a:prstGeom prst="line">
+            <a:avLst/>
+          </a:prstGeom>
+        </p:spPr>
+        <p:style>
+          <a:lnRef idx="1">
+            <a:schemeClr val="accent1"/>
+          </a:lnRef>
+          <a:fillRef idx="0">
+            <a:schemeClr val="accent1"/>
+          </a:fillRef>
+          <a:effectRef idx="0">
+            <a:schemeClr val="accent1"/>
+          </a:effectRef>
+          <a:fontRef idx="minor">
+            <a:schemeClr val="tx1"/>
+          </a:fontRef>
+        </p:style>
+      </p:cxnSp>
+      <p:cxnSp>
+        <p:nvCxnSpPr>
+          <p:cNvPr id="122" name="Straight Connector 121">
+            <a:extLst>
+              <a:ext uri="{FF2B5EF4-FFF2-40B4-BE49-F238E27FC236}">
+                <a16:creationId xmlns:a16="http://schemas.microsoft.com/office/drawing/2014/main" id="{607B3DBB-28B0-48EA-836B-ABFC4C7D9235}"/>
+              </a:ext>
+            </a:extLst>
+          </p:cNvPr>
+          <p:cNvCxnSpPr>
+            <a:cxnSpLocks/>
+            <a:stCxn id="8" idx="0"/>
+            <a:endCxn id="113" idx="2"/>
+          </p:cNvCxnSpPr>
+          <p:nvPr/>
+        </p:nvCxnSpPr>
+        <p:spPr>
+          <a:xfrm flipV="1">
+            <a:off x="5170717" y="2180237"/>
+            <a:ext cx="1306209" cy="337373"/>
+          </a:xfrm>
+          <a:prstGeom prst="line">
+            <a:avLst/>
+          </a:prstGeom>
+        </p:spPr>
+        <p:style>
+          <a:lnRef idx="1">
+            <a:schemeClr val="accent1"/>
+          </a:lnRef>
+          <a:fillRef idx="0">
+            <a:schemeClr val="accent1"/>
+          </a:fillRef>
+          <a:effectRef idx="0">
+            <a:schemeClr val="accent1"/>
+          </a:effectRef>
+          <a:fontRef idx="minor">
+            <a:schemeClr val="tx1"/>
+          </a:fontRef>
+        </p:style>
+      </p:cxnSp>
+      <p:sp>
+        <p:nvSpPr>
+          <p:cNvPr id="123" name="TextBox 122">
+            <a:extLst>
+              <a:ext uri="{FF2B5EF4-FFF2-40B4-BE49-F238E27FC236}">
+                <a16:creationId xmlns:a16="http://schemas.microsoft.com/office/drawing/2014/main" id="{6E61AE0A-B2D8-4E84-8BFE-52084BBB17BB}"/>
+              </a:ext>
+            </a:extLst>
+          </p:cNvPr>
+          <p:cNvSpPr txBox="1"/>
+          <p:nvPr/>
+        </p:nvSpPr>
+        <p:spPr>
+          <a:xfrm>
+            <a:off x="5972177" y="1271926"/>
+            <a:ext cx="693965" cy="246221"/>
+          </a:xfrm>
+          <a:prstGeom prst="rect">
+            <a:avLst/>
+          </a:prstGeom>
+          <a:noFill/>
+          <a:ln>
+            <a:solidFill>
+              <a:schemeClr val="accent1"/>
+            </a:solidFill>
+          </a:ln>
+        </p:spPr>
+        <p:txBody>
+          <a:bodyPr wrap="square" rtlCol="0">
+            <a:spAutoFit/>
+          </a:bodyPr>
+          <a:lstStyle/>
+          <a:p>
+            <a:r>
+              <a:rPr lang="en-US" sz="1000" dirty="0"/>
+              <a:t>?</a:t>
+            </a:r>
+          </a:p>
+        </p:txBody>
+      </p:sp>
+      <p:sp>
+        <p:nvSpPr>
+          <p:cNvPr id="124" name="TextBox 123">
+            <a:extLst>
+              <a:ext uri="{FF2B5EF4-FFF2-40B4-BE49-F238E27FC236}">
+                <a16:creationId xmlns:a16="http://schemas.microsoft.com/office/drawing/2014/main" id="{D7DED947-2D94-43A1-81F0-250619C5B4F3}"/>
+              </a:ext>
+            </a:extLst>
+          </p:cNvPr>
+          <p:cNvSpPr txBox="1"/>
+          <p:nvPr/>
+        </p:nvSpPr>
+        <p:spPr>
+          <a:xfrm>
+            <a:off x="4786994" y="1268113"/>
+            <a:ext cx="693965" cy="246221"/>
+          </a:xfrm>
+          <a:prstGeom prst="rect">
+            <a:avLst/>
+          </a:prstGeom>
+          <a:noFill/>
+          <a:ln>
+            <a:solidFill>
+              <a:schemeClr val="accent1"/>
+            </a:solidFill>
+          </a:ln>
+        </p:spPr>
+        <p:txBody>
+          <a:bodyPr wrap="square" rtlCol="0">
+            <a:spAutoFit/>
+          </a:bodyPr>
+          <a:lstStyle/>
+          <a:p>
+            <a:r>
+              <a:rPr lang="en-US" sz="1000" dirty="0"/>
+              <a:t>?</a:t>
+            </a:r>
+          </a:p>
+        </p:txBody>
+      </p:sp>
+      <p:sp>
+        <p:nvSpPr>
+          <p:cNvPr id="126" name="TextBox 125">
+            <a:extLst>
+              <a:ext uri="{FF2B5EF4-FFF2-40B4-BE49-F238E27FC236}">
+                <a16:creationId xmlns:a16="http://schemas.microsoft.com/office/drawing/2014/main" id="{23366973-11EA-4BA4-9138-281B688DCE73}"/>
+              </a:ext>
+            </a:extLst>
+          </p:cNvPr>
+          <p:cNvSpPr txBox="1"/>
+          <p:nvPr/>
+        </p:nvSpPr>
+        <p:spPr>
+          <a:xfrm>
+            <a:off x="8061321" y="351909"/>
+            <a:ext cx="693965" cy="246221"/>
+          </a:xfrm>
+          <a:prstGeom prst="rect">
+            <a:avLst/>
+          </a:prstGeom>
+          <a:noFill/>
+          <a:ln>
+            <a:solidFill>
+              <a:schemeClr val="accent1"/>
+            </a:solidFill>
+          </a:ln>
+        </p:spPr>
+        <p:txBody>
+          <a:bodyPr wrap="square" rtlCol="0">
+            <a:spAutoFit/>
+          </a:bodyPr>
+          <a:lstStyle/>
+          <a:p>
+            <a:r>
+              <a:rPr lang="en-US" sz="1000" dirty="0"/>
+              <a:t>?</a:t>
+            </a:r>
+          </a:p>
+        </p:txBody>
+      </p:sp>
+      <p:sp>
+        <p:nvSpPr>
+          <p:cNvPr id="1024" name="TextBox 1023">
+            <a:extLst>
+              <a:ext uri="{FF2B5EF4-FFF2-40B4-BE49-F238E27FC236}">
+                <a16:creationId xmlns:a16="http://schemas.microsoft.com/office/drawing/2014/main" id="{D64EF598-53A7-4C1A-AA8C-BB87213D9A77}"/>
+              </a:ext>
+            </a:extLst>
+          </p:cNvPr>
+          <p:cNvSpPr txBox="1"/>
+          <p:nvPr/>
+        </p:nvSpPr>
+        <p:spPr>
+          <a:xfrm>
+            <a:off x="6890653" y="424215"/>
+            <a:ext cx="693965" cy="246221"/>
+          </a:xfrm>
+          <a:prstGeom prst="rect">
+            <a:avLst/>
+          </a:prstGeom>
+          <a:noFill/>
+          <a:ln>
+            <a:solidFill>
+              <a:schemeClr val="accent1"/>
+            </a:solidFill>
+          </a:ln>
+        </p:spPr>
+        <p:txBody>
+          <a:bodyPr wrap="square" rtlCol="0">
+            <a:spAutoFit/>
+          </a:bodyPr>
+          <a:lstStyle/>
+          <a:p>
+            <a:r>
+              <a:rPr lang="en-US" sz="1000" dirty="0"/>
+              <a:t>?</a:t>
+            </a:r>
+          </a:p>
+        </p:txBody>
+      </p:sp>
+      <p:sp>
+        <p:nvSpPr>
+          <p:cNvPr id="1027" name="TextBox 1026">
+            <a:extLst>
+              <a:ext uri="{FF2B5EF4-FFF2-40B4-BE49-F238E27FC236}">
+                <a16:creationId xmlns:a16="http://schemas.microsoft.com/office/drawing/2014/main" id="{9962463D-E69C-4EDA-89CD-107B0CE7CD0E}"/>
+              </a:ext>
+            </a:extLst>
+          </p:cNvPr>
+          <p:cNvSpPr txBox="1"/>
+          <p:nvPr/>
+        </p:nvSpPr>
+        <p:spPr>
+          <a:xfrm>
+            <a:off x="9480848" y="2047383"/>
+            <a:ext cx="693965" cy="246221"/>
+          </a:xfrm>
+          <a:prstGeom prst="rect">
+            <a:avLst/>
+          </a:prstGeom>
+          <a:noFill/>
+          <a:ln>
+            <a:solidFill>
+              <a:schemeClr val="accent1"/>
+            </a:solidFill>
+          </a:ln>
+        </p:spPr>
+        <p:txBody>
+          <a:bodyPr wrap="square" rtlCol="0">
+            <a:spAutoFit/>
+          </a:bodyPr>
+          <a:lstStyle/>
+          <a:p>
+            <a:r>
+              <a:rPr lang="en-US" sz="1000" dirty="0"/>
+              <a:t>?</a:t>
+            </a:r>
+          </a:p>
+        </p:txBody>
+      </p:sp>
+      <p:sp>
+        <p:nvSpPr>
+          <p:cNvPr id="1028" name="TextBox 1027">
+            <a:extLst>
+              <a:ext uri="{FF2B5EF4-FFF2-40B4-BE49-F238E27FC236}">
+                <a16:creationId xmlns:a16="http://schemas.microsoft.com/office/drawing/2014/main" id="{89C4362B-A9D4-4F25-97D9-35376BA65D8A}"/>
+              </a:ext>
+            </a:extLst>
+          </p:cNvPr>
+          <p:cNvSpPr txBox="1"/>
+          <p:nvPr/>
+        </p:nvSpPr>
+        <p:spPr>
+          <a:xfrm>
+            <a:off x="8598578" y="2048489"/>
+            <a:ext cx="693965" cy="246221"/>
+          </a:xfrm>
+          <a:prstGeom prst="rect">
+            <a:avLst/>
+          </a:prstGeom>
+          <a:noFill/>
+          <a:ln>
+            <a:solidFill>
+              <a:schemeClr val="accent1"/>
+            </a:solidFill>
+          </a:ln>
+        </p:spPr>
+        <p:txBody>
+          <a:bodyPr wrap="square" rtlCol="0">
+            <a:spAutoFit/>
+          </a:bodyPr>
+          <a:lstStyle/>
+          <a:p>
+            <a:r>
+              <a:rPr lang="en-US" sz="1000" dirty="0"/>
+              <a:t>?</a:t>
+            </a:r>
+          </a:p>
+        </p:txBody>
+      </p:sp>
+      <p:sp>
+        <p:nvSpPr>
+          <p:cNvPr id="1029" name="TextBox 1028">
+            <a:extLst>
+              <a:ext uri="{FF2B5EF4-FFF2-40B4-BE49-F238E27FC236}">
+                <a16:creationId xmlns:a16="http://schemas.microsoft.com/office/drawing/2014/main" id="{DECA3660-D103-44D7-ADE8-458AE07AF5C8}"/>
+              </a:ext>
+            </a:extLst>
+          </p:cNvPr>
+          <p:cNvSpPr txBox="1"/>
+          <p:nvPr/>
+        </p:nvSpPr>
+        <p:spPr>
+          <a:xfrm>
+            <a:off x="7263418" y="2044895"/>
+            <a:ext cx="693965" cy="246221"/>
+          </a:xfrm>
+          <a:prstGeom prst="rect">
+            <a:avLst/>
+          </a:prstGeom>
+          <a:noFill/>
+          <a:ln>
+            <a:solidFill>
+              <a:schemeClr val="accent1"/>
+            </a:solidFill>
+          </a:ln>
+        </p:spPr>
+        <p:txBody>
+          <a:bodyPr wrap="square" rtlCol="0">
+            <a:spAutoFit/>
+          </a:bodyPr>
+          <a:lstStyle/>
+          <a:p>
+            <a:r>
+              <a:rPr lang="en-US" sz="1000" dirty="0"/>
+              <a:t>?</a:t>
+            </a:r>
+          </a:p>
+        </p:txBody>
+      </p:sp>
+      <p:cxnSp>
+        <p:nvCxnSpPr>
+          <p:cNvPr id="139" name="Straight Connector 138">
+            <a:extLst>
+              <a:ext uri="{FF2B5EF4-FFF2-40B4-BE49-F238E27FC236}">
+                <a16:creationId xmlns:a16="http://schemas.microsoft.com/office/drawing/2014/main" id="{561F459A-393F-44C5-8E4E-084D062E4BE1}"/>
+              </a:ext>
+            </a:extLst>
+          </p:cNvPr>
+          <p:cNvCxnSpPr>
+            <a:cxnSpLocks/>
+            <a:stCxn id="30" idx="0"/>
+            <a:endCxn id="1027" idx="2"/>
+          </p:cNvCxnSpPr>
+          <p:nvPr/>
+        </p:nvCxnSpPr>
+        <p:spPr>
+          <a:xfrm flipV="1">
+            <a:off x="8239576" y="2293604"/>
+            <a:ext cx="1588255" cy="245709"/>
+          </a:xfrm>
+          <a:prstGeom prst="line">
+            <a:avLst/>
+          </a:prstGeom>
+        </p:spPr>
+        <p:style>
+          <a:lnRef idx="1">
+            <a:schemeClr val="accent1"/>
+          </a:lnRef>
+          <a:fillRef idx="0">
+            <a:schemeClr val="accent1"/>
+          </a:fillRef>
+          <a:effectRef idx="0">
+            <a:schemeClr val="accent1"/>
+          </a:effectRef>
+          <a:fontRef idx="minor">
+            <a:schemeClr val="tx1"/>
+          </a:fontRef>
+        </p:style>
+      </p:cxnSp>
+      <p:cxnSp>
+        <p:nvCxnSpPr>
+          <p:cNvPr id="140" name="Straight Connector 139">
+            <a:extLst>
+              <a:ext uri="{FF2B5EF4-FFF2-40B4-BE49-F238E27FC236}">
+                <a16:creationId xmlns:a16="http://schemas.microsoft.com/office/drawing/2014/main" id="{8CE0893D-5725-4350-977F-FA914E9FD1E2}"/>
+              </a:ext>
+            </a:extLst>
+          </p:cNvPr>
+          <p:cNvCxnSpPr>
+            <a:cxnSpLocks/>
+            <a:stCxn id="1028" idx="2"/>
+            <a:endCxn id="30" idx="0"/>
+          </p:cNvCxnSpPr>
+          <p:nvPr/>
+        </p:nvCxnSpPr>
+        <p:spPr>
+          <a:xfrm flipH="1">
+            <a:off x="8239576" y="2294710"/>
+            <a:ext cx="705985" cy="244603"/>
+          </a:xfrm>
+          <a:prstGeom prst="line">
+            <a:avLst/>
+          </a:prstGeom>
+        </p:spPr>
+        <p:style>
+          <a:lnRef idx="1">
+            <a:schemeClr val="accent1"/>
+          </a:lnRef>
+          <a:fillRef idx="0">
+            <a:schemeClr val="accent1"/>
+          </a:fillRef>
+          <a:effectRef idx="0">
+            <a:schemeClr val="accent1"/>
+          </a:effectRef>
+          <a:fontRef idx="minor">
+            <a:schemeClr val="tx1"/>
+          </a:fontRef>
+        </p:style>
+      </p:cxnSp>
+      <p:cxnSp>
+        <p:nvCxnSpPr>
+          <p:cNvPr id="141" name="Straight Connector 140">
+            <a:extLst>
+              <a:ext uri="{FF2B5EF4-FFF2-40B4-BE49-F238E27FC236}">
+                <a16:creationId xmlns:a16="http://schemas.microsoft.com/office/drawing/2014/main" id="{A20CEEA4-0E82-4557-850B-8EBE993E4A0B}"/>
+              </a:ext>
+            </a:extLst>
+          </p:cNvPr>
+          <p:cNvCxnSpPr>
+            <a:cxnSpLocks/>
+            <a:stCxn id="1029" idx="2"/>
+            <a:endCxn id="30" idx="0"/>
+          </p:cNvCxnSpPr>
+          <p:nvPr/>
+        </p:nvCxnSpPr>
+        <p:spPr>
+          <a:xfrm>
+            <a:off x="7610401" y="2291116"/>
+            <a:ext cx="629175" cy="248197"/>
+          </a:xfrm>
+          <a:prstGeom prst="line">
+            <a:avLst/>
+          </a:prstGeom>
+        </p:spPr>
+        <p:style>
+          <a:lnRef idx="1">
+            <a:schemeClr val="accent1"/>
+          </a:lnRef>
+          <a:fillRef idx="0">
+            <a:schemeClr val="accent1"/>
+          </a:fillRef>
+          <a:effectRef idx="0">
+            <a:schemeClr val="accent1"/>
+          </a:effectRef>
+          <a:fontRef idx="minor">
+            <a:schemeClr val="tx1"/>
+          </a:fontRef>
+        </p:style>
+      </p:cxnSp>
+      <p:sp>
+        <p:nvSpPr>
+          <p:cNvPr id="1036" name="TextBox 1035">
+            <a:extLst>
+              <a:ext uri="{FF2B5EF4-FFF2-40B4-BE49-F238E27FC236}">
+                <a16:creationId xmlns:a16="http://schemas.microsoft.com/office/drawing/2014/main" id="{E548014C-F655-4C85-AE56-50465CDFBCA1}"/>
+              </a:ext>
+            </a:extLst>
+          </p:cNvPr>
+          <p:cNvSpPr txBox="1"/>
+          <p:nvPr/>
+        </p:nvSpPr>
+        <p:spPr>
+          <a:xfrm>
+            <a:off x="10612963" y="2044894"/>
+            <a:ext cx="693965" cy="246221"/>
+          </a:xfrm>
+          <a:prstGeom prst="rect">
+            <a:avLst/>
+          </a:prstGeom>
+          <a:noFill/>
+          <a:ln>
+            <a:solidFill>
+              <a:schemeClr val="accent1"/>
+            </a:solidFill>
+          </a:ln>
+        </p:spPr>
+        <p:txBody>
+          <a:bodyPr wrap="square" rtlCol="0">
+            <a:spAutoFit/>
+          </a:bodyPr>
+          <a:lstStyle/>
+          <a:p>
+            <a:r>
+              <a:rPr lang="en-US" sz="1000" dirty="0"/>
+              <a:t>?</a:t>
+            </a:r>
+          </a:p>
+        </p:txBody>
+      </p:sp>
+      <p:cxnSp>
+        <p:nvCxnSpPr>
+          <p:cNvPr id="150" name="Straight Connector 149">
+            <a:extLst>
+              <a:ext uri="{FF2B5EF4-FFF2-40B4-BE49-F238E27FC236}">
+                <a16:creationId xmlns:a16="http://schemas.microsoft.com/office/drawing/2014/main" id="{7A6EEAEB-BB29-40F6-90A1-10B2BBB90BDD}"/>
+              </a:ext>
+            </a:extLst>
+          </p:cNvPr>
+          <p:cNvCxnSpPr>
+            <a:cxnSpLocks/>
+            <a:stCxn id="1027" idx="3"/>
+            <a:endCxn id="1036" idx="1"/>
+          </p:cNvCxnSpPr>
+          <p:nvPr/>
+        </p:nvCxnSpPr>
+        <p:spPr>
+          <a:xfrm flipV="1">
+            <a:off x="10174813" y="2168005"/>
+            <a:ext cx="438150" cy="2489"/>
+          </a:xfrm>
+          <a:prstGeom prst="line">
+            <a:avLst/>
+          </a:prstGeom>
+        </p:spPr>
+        <p:style>
+          <a:lnRef idx="1">
+            <a:schemeClr val="accent1"/>
+          </a:lnRef>
+          <a:fillRef idx="0">
+            <a:schemeClr val="accent1"/>
+          </a:fillRef>
+          <a:effectRef idx="0">
+            <a:schemeClr val="accent1"/>
+          </a:effectRef>
+          <a:fontRef idx="minor">
+            <a:schemeClr val="tx1"/>
+          </a:fontRef>
+        </p:style>
+      </p:cxnSp>
+      <p:cxnSp>
+        <p:nvCxnSpPr>
+          <p:cNvPr id="153" name="Straight Connector 152">
+            <a:extLst>
+              <a:ext uri="{FF2B5EF4-FFF2-40B4-BE49-F238E27FC236}">
+                <a16:creationId xmlns:a16="http://schemas.microsoft.com/office/drawing/2014/main" id="{EDB5EA59-0187-4A36-A663-6B94C737269F}"/>
+              </a:ext>
+            </a:extLst>
+          </p:cNvPr>
+          <p:cNvCxnSpPr>
+            <a:cxnSpLocks/>
+            <a:stCxn id="113" idx="0"/>
+            <a:endCxn id="123" idx="2"/>
+          </p:cNvCxnSpPr>
+          <p:nvPr/>
+        </p:nvCxnSpPr>
+        <p:spPr>
+          <a:xfrm flipH="1" flipV="1">
+            <a:off x="6319160" y="1518147"/>
+            <a:ext cx="157766" cy="415869"/>
+          </a:xfrm>
+          <a:prstGeom prst="line">
+            <a:avLst/>
+          </a:prstGeom>
+        </p:spPr>
+        <p:style>
+          <a:lnRef idx="1">
+            <a:schemeClr val="accent1"/>
+          </a:lnRef>
+          <a:fillRef idx="0">
+            <a:schemeClr val="accent1"/>
+          </a:fillRef>
+          <a:effectRef idx="0">
+            <a:schemeClr val="accent1"/>
+          </a:effectRef>
+          <a:fontRef idx="minor">
+            <a:schemeClr val="tx1"/>
+          </a:fontRef>
+        </p:style>
+      </p:cxnSp>
+      <p:cxnSp>
+        <p:nvCxnSpPr>
+          <p:cNvPr id="156" name="Straight Connector 155">
+            <a:extLst>
+              <a:ext uri="{FF2B5EF4-FFF2-40B4-BE49-F238E27FC236}">
+                <a16:creationId xmlns:a16="http://schemas.microsoft.com/office/drawing/2014/main" id="{B7FAD545-848B-48F9-B572-2B46E25DB9EC}"/>
+              </a:ext>
+            </a:extLst>
+          </p:cNvPr>
+          <p:cNvCxnSpPr>
+            <a:cxnSpLocks/>
+            <a:stCxn id="45" idx="0"/>
+            <a:endCxn id="124" idx="2"/>
+          </p:cNvCxnSpPr>
+          <p:nvPr/>
+        </p:nvCxnSpPr>
+        <p:spPr>
+          <a:xfrm flipV="1">
+            <a:off x="4864556" y="1514334"/>
+            <a:ext cx="269421" cy="429344"/>
+          </a:xfrm>
+          <a:prstGeom prst="line">
+            <a:avLst/>
+          </a:prstGeom>
+        </p:spPr>
+        <p:style>
+          <a:lnRef idx="1">
+            <a:schemeClr val="accent1"/>
+          </a:lnRef>
+          <a:fillRef idx="0">
+            <a:schemeClr val="accent1"/>
+          </a:fillRef>
+          <a:effectRef idx="0">
+            <a:schemeClr val="accent1"/>
+          </a:effectRef>
+          <a:fontRef idx="minor">
+            <a:schemeClr val="tx1"/>
+          </a:fontRef>
+        </p:style>
+      </p:cxnSp>
+      <p:sp>
+        <p:nvSpPr>
+          <p:cNvPr id="1043" name="TextBox 1042">
+            <a:extLst>
+              <a:ext uri="{FF2B5EF4-FFF2-40B4-BE49-F238E27FC236}">
+                <a16:creationId xmlns:a16="http://schemas.microsoft.com/office/drawing/2014/main" id="{5F1981B9-8FBC-40C5-8821-348A31B79DEE}"/>
+              </a:ext>
+            </a:extLst>
+          </p:cNvPr>
+          <p:cNvSpPr txBox="1"/>
+          <p:nvPr/>
+        </p:nvSpPr>
+        <p:spPr>
+          <a:xfrm>
+            <a:off x="1384534" y="1936471"/>
+            <a:ext cx="789213" cy="246221"/>
+          </a:xfrm>
+          <a:prstGeom prst="rect">
+            <a:avLst/>
+          </a:prstGeom>
+          <a:noFill/>
+          <a:ln>
+            <a:solidFill>
+              <a:schemeClr val="accent1"/>
+            </a:solidFill>
+          </a:ln>
+        </p:spPr>
+        <p:txBody>
+          <a:bodyPr wrap="square" rtlCol="0">
+            <a:spAutoFit/>
+          </a:bodyPr>
+          <a:lstStyle/>
+          <a:p>
+            <a:r>
+              <a:rPr lang="en-US" sz="1000" dirty="0"/>
+              <a:t>Laundry</a:t>
+            </a:r>
+          </a:p>
+        </p:txBody>
+      </p:sp>
+      <p:cxnSp>
+        <p:nvCxnSpPr>
+          <p:cNvPr id="161" name="Straight Connector 160">
+            <a:extLst>
+              <a:ext uri="{FF2B5EF4-FFF2-40B4-BE49-F238E27FC236}">
+                <a16:creationId xmlns:a16="http://schemas.microsoft.com/office/drawing/2014/main" id="{D21E2C05-9A4B-405F-A09C-592C948A3E08}"/>
+              </a:ext>
+            </a:extLst>
+          </p:cNvPr>
+          <p:cNvCxnSpPr>
+            <a:cxnSpLocks/>
+            <a:stCxn id="114" idx="1"/>
+            <a:endCxn id="1043" idx="3"/>
+          </p:cNvCxnSpPr>
+          <p:nvPr/>
+        </p:nvCxnSpPr>
+        <p:spPr>
+          <a:xfrm flipH="1">
+            <a:off x="2173747" y="2057127"/>
+            <a:ext cx="380317" cy="2455"/>
+          </a:xfrm>
+          <a:prstGeom prst="line">
+            <a:avLst/>
+          </a:prstGeom>
+        </p:spPr>
+        <p:style>
+          <a:lnRef idx="1">
+            <a:schemeClr val="accent1"/>
+          </a:lnRef>
+          <a:fillRef idx="0">
+            <a:schemeClr val="accent1"/>
+          </a:fillRef>
+          <a:effectRef idx="0">
+            <a:schemeClr val="accent1"/>
+          </a:effectRef>
+          <a:fontRef idx="minor">
+            <a:schemeClr val="tx1"/>
+          </a:fontRef>
+        </p:style>
+      </p:cxnSp>
+      <p:sp>
+        <p:nvSpPr>
+          <p:cNvPr id="1046" name="TextBox 1045">
+            <a:extLst>
+              <a:ext uri="{FF2B5EF4-FFF2-40B4-BE49-F238E27FC236}">
+                <a16:creationId xmlns:a16="http://schemas.microsoft.com/office/drawing/2014/main" id="{8EE8E5DD-63DD-4795-A8B8-E6AC07485031}"/>
+              </a:ext>
+            </a:extLst>
+          </p:cNvPr>
+          <p:cNvSpPr txBox="1"/>
+          <p:nvPr/>
+        </p:nvSpPr>
+        <p:spPr>
+          <a:xfrm>
+            <a:off x="4114885" y="5825142"/>
+            <a:ext cx="857250" cy="246221"/>
+          </a:xfrm>
+          <a:prstGeom prst="rect">
+            <a:avLst/>
+          </a:prstGeom>
+          <a:noFill/>
+          <a:ln>
+            <a:solidFill>
+              <a:schemeClr val="accent1"/>
+            </a:solidFill>
+          </a:ln>
+        </p:spPr>
+        <p:txBody>
+          <a:bodyPr wrap="square" rtlCol="0">
+            <a:spAutoFit/>
+          </a:bodyPr>
+          <a:lstStyle/>
+          <a:p>
+            <a:r>
+              <a:rPr lang="en-US" sz="1000" dirty="0"/>
+              <a:t>Lab Entrance</a:t>
+            </a:r>
+          </a:p>
+        </p:txBody>
+      </p:sp>
+      <p:sp>
+        <p:nvSpPr>
+          <p:cNvPr id="1047" name="TextBox 1046">
+            <a:extLst>
+              <a:ext uri="{FF2B5EF4-FFF2-40B4-BE49-F238E27FC236}">
+                <a16:creationId xmlns:a16="http://schemas.microsoft.com/office/drawing/2014/main" id="{42C36495-836C-4733-8F09-2B431651281F}"/>
+              </a:ext>
+            </a:extLst>
+          </p:cNvPr>
+          <p:cNvSpPr txBox="1"/>
+          <p:nvPr/>
+        </p:nvSpPr>
+        <p:spPr>
+          <a:xfrm>
+            <a:off x="5468035" y="5825142"/>
+            <a:ext cx="751114" cy="246221"/>
+          </a:xfrm>
+          <a:prstGeom prst="rect">
+            <a:avLst/>
+          </a:prstGeom>
+          <a:noFill/>
+          <a:ln>
+            <a:solidFill>
+              <a:schemeClr val="accent1"/>
+            </a:solidFill>
+          </a:ln>
+        </p:spPr>
+        <p:txBody>
+          <a:bodyPr wrap="square" rtlCol="0">
+            <a:spAutoFit/>
+          </a:bodyPr>
+          <a:lstStyle/>
+          <a:p>
+            <a:r>
+              <a:rPr lang="en-US" sz="1000" dirty="0"/>
+              <a:t>Secret Lab</a:t>
+            </a:r>
+          </a:p>
+        </p:txBody>
+      </p:sp>
+      <p:sp>
+        <p:nvSpPr>
+          <p:cNvPr id="1048" name="TextBox 1047">
+            <a:extLst>
+              <a:ext uri="{FF2B5EF4-FFF2-40B4-BE49-F238E27FC236}">
+                <a16:creationId xmlns:a16="http://schemas.microsoft.com/office/drawing/2014/main" id="{8EAC4DBE-CF5F-4D05-9528-1F69CFBB98EC}"/>
+              </a:ext>
+            </a:extLst>
+          </p:cNvPr>
+          <p:cNvSpPr txBox="1"/>
+          <p:nvPr/>
+        </p:nvSpPr>
+        <p:spPr>
+          <a:xfrm>
+            <a:off x="6683660" y="5810171"/>
+            <a:ext cx="616408" cy="246221"/>
+          </a:xfrm>
+          <a:prstGeom prst="rect">
+            <a:avLst/>
+          </a:prstGeom>
+          <a:noFill/>
+          <a:ln>
+            <a:solidFill>
+              <a:schemeClr val="accent1"/>
+            </a:solidFill>
+          </a:ln>
+        </p:spPr>
+        <p:txBody>
+          <a:bodyPr wrap="square" rtlCol="0">
+            <a:spAutoFit/>
+          </a:bodyPr>
+          <a:lstStyle/>
+          <a:p>
+            <a:r>
+              <a:rPr lang="en-US" sz="1000" dirty="0"/>
+              <a:t>Meteor</a:t>
+            </a:r>
+          </a:p>
+        </p:txBody>
+      </p:sp>
+      <p:cxnSp>
+        <p:nvCxnSpPr>
+          <p:cNvPr id="170" name="Straight Connector 169">
+            <a:extLst>
+              <a:ext uri="{FF2B5EF4-FFF2-40B4-BE49-F238E27FC236}">
+                <a16:creationId xmlns:a16="http://schemas.microsoft.com/office/drawing/2014/main" id="{97F53DF6-449B-4CFE-B79F-7CF01F411767}"/>
+              </a:ext>
+            </a:extLst>
+          </p:cNvPr>
+          <p:cNvCxnSpPr>
+            <a:cxnSpLocks/>
+            <a:stCxn id="1046" idx="0"/>
+            <a:endCxn id="9" idx="2"/>
+          </p:cNvCxnSpPr>
+          <p:nvPr/>
+        </p:nvCxnSpPr>
+        <p:spPr>
+          <a:xfrm flipH="1" flipV="1">
+            <a:off x="4448175" y="5638082"/>
+            <a:ext cx="95335" cy="187060"/>
+          </a:xfrm>
+          <a:prstGeom prst="line">
+            <a:avLst/>
+          </a:prstGeom>
+        </p:spPr>
+        <p:style>
+          <a:lnRef idx="1">
+            <a:schemeClr val="accent1"/>
+          </a:lnRef>
+          <a:fillRef idx="0">
+            <a:schemeClr val="accent1"/>
+          </a:fillRef>
+          <a:effectRef idx="0">
+            <a:schemeClr val="accent1"/>
+          </a:effectRef>
+          <a:fontRef idx="minor">
+            <a:schemeClr val="tx1"/>
+          </a:fontRef>
+        </p:style>
+      </p:cxnSp>
+      <p:cxnSp>
+        <p:nvCxnSpPr>
+          <p:cNvPr id="173" name="Straight Connector 172">
+            <a:extLst>
+              <a:ext uri="{FF2B5EF4-FFF2-40B4-BE49-F238E27FC236}">
+                <a16:creationId xmlns:a16="http://schemas.microsoft.com/office/drawing/2014/main" id="{E7A0F178-40C0-4843-B1A7-7148733D3A38}"/>
+              </a:ext>
+            </a:extLst>
+          </p:cNvPr>
+          <p:cNvCxnSpPr>
+            <a:cxnSpLocks/>
+            <a:stCxn id="1046" idx="3"/>
+            <a:endCxn id="1047" idx="1"/>
+          </p:cNvCxnSpPr>
+          <p:nvPr/>
+        </p:nvCxnSpPr>
+        <p:spPr>
+          <a:xfrm>
+            <a:off x="4972135" y="5948253"/>
+            <a:ext cx="495900" cy="0"/>
+          </a:xfrm>
+          <a:prstGeom prst="line">
+            <a:avLst/>
+          </a:prstGeom>
+        </p:spPr>
+        <p:style>
+          <a:lnRef idx="1">
+            <a:schemeClr val="accent1"/>
+          </a:lnRef>
+          <a:fillRef idx="0">
+            <a:schemeClr val="accent1"/>
+          </a:fillRef>
+          <a:effectRef idx="0">
+            <a:schemeClr val="accent1"/>
+          </a:effectRef>
+          <a:fontRef idx="minor">
+            <a:schemeClr val="tx1"/>
+          </a:fontRef>
+        </p:style>
+      </p:cxnSp>
+      <p:cxnSp>
+        <p:nvCxnSpPr>
+          <p:cNvPr id="176" name="Straight Connector 175">
+            <a:extLst>
+              <a:ext uri="{FF2B5EF4-FFF2-40B4-BE49-F238E27FC236}">
+                <a16:creationId xmlns:a16="http://schemas.microsoft.com/office/drawing/2014/main" id="{38C7C7C2-3F53-45FD-8EEF-EFD378DC03B7}"/>
+              </a:ext>
+            </a:extLst>
+          </p:cNvPr>
+          <p:cNvCxnSpPr>
+            <a:cxnSpLocks/>
+            <a:stCxn id="1047" idx="3"/>
+            <a:endCxn id="1048" idx="1"/>
+          </p:cNvCxnSpPr>
+          <p:nvPr/>
+        </p:nvCxnSpPr>
+        <p:spPr>
+          <a:xfrm flipV="1">
+            <a:off x="6219149" y="5933282"/>
+            <a:ext cx="464511" cy="14971"/>
+          </a:xfrm>
+          <a:prstGeom prst="line">
+            <a:avLst/>
+          </a:prstGeom>
+        </p:spPr>
+        <p:style>
+          <a:lnRef idx="1">
+            <a:schemeClr val="accent1"/>
+          </a:lnRef>
+          <a:fillRef idx="0">
+            <a:schemeClr val="accent1"/>
+          </a:fillRef>
+          <a:effectRef idx="0">
+            <a:schemeClr val="accent1"/>
+          </a:effectRef>
+          <a:fontRef idx="minor">
+            <a:schemeClr val="tx1"/>
+          </a:fontRef>
+        </p:style>
+      </p:cxnSp>
+      <p:sp>
+        <p:nvSpPr>
+          <p:cNvPr id="1055" name="TextBox 1054">
+            <a:extLst>
+              <a:ext uri="{FF2B5EF4-FFF2-40B4-BE49-F238E27FC236}">
+                <a16:creationId xmlns:a16="http://schemas.microsoft.com/office/drawing/2014/main" id="{0B38F97D-09F5-42F8-BF29-7214C7C4DDF9}"/>
+              </a:ext>
+            </a:extLst>
+          </p:cNvPr>
+          <p:cNvSpPr txBox="1"/>
+          <p:nvPr/>
+        </p:nvSpPr>
+        <p:spPr>
+          <a:xfrm>
+            <a:off x="2406499" y="4843425"/>
+            <a:ext cx="751114" cy="246221"/>
+          </a:xfrm>
+          <a:prstGeom prst="rect">
+            <a:avLst/>
+          </a:prstGeom>
+          <a:noFill/>
+          <a:ln>
+            <a:solidFill>
+              <a:schemeClr val="accent1"/>
+            </a:solidFill>
+          </a:ln>
+        </p:spPr>
+        <p:txBody>
+          <a:bodyPr wrap="square" rtlCol="0">
+            <a:spAutoFit/>
+          </a:bodyPr>
+          <a:lstStyle/>
+          <a:p>
+            <a:r>
+              <a:rPr lang="en-US" sz="1000" dirty="0"/>
+              <a:t>Backyard</a:t>
+            </a:r>
+          </a:p>
+        </p:txBody>
+      </p:sp>
+      <p:cxnSp>
+        <p:nvCxnSpPr>
+          <p:cNvPr id="181" name="Straight Connector 180">
+            <a:extLst>
+              <a:ext uri="{FF2B5EF4-FFF2-40B4-BE49-F238E27FC236}">
+                <a16:creationId xmlns:a16="http://schemas.microsoft.com/office/drawing/2014/main" id="{0FBC3F52-1A1A-4433-BDDE-48BCCBC3A37E}"/>
+              </a:ext>
+            </a:extLst>
+          </p:cNvPr>
+          <p:cNvCxnSpPr>
+            <a:cxnSpLocks/>
+            <a:stCxn id="12" idx="1"/>
+            <a:endCxn id="1055" idx="3"/>
+          </p:cNvCxnSpPr>
+          <p:nvPr/>
+        </p:nvCxnSpPr>
+        <p:spPr>
+          <a:xfrm flipH="1">
+            <a:off x="3157613" y="4959089"/>
+            <a:ext cx="1198034" cy="7447"/>
+          </a:xfrm>
+          <a:prstGeom prst="line">
+            <a:avLst/>
           </a:prstGeom>
         </p:spPr>
         <p:style>

</xml_diff>

<commit_message>
Bagin of Michael implementation
</commit_message>
<xml_diff>
--- a/Logic/MM Rooms.pptx
+++ b/Logic/MM Rooms.pptx
@@ -259,7 +259,7 @@
           <a:p>
             <a:fld id="{F507AA02-389D-4D6E-9F55-4109D7FF027D}" type="datetimeFigureOut">
               <a:rPr lang="en-US" smtClean="0"/>
-              <a:t>11/8/2020</a:t>
+              <a:t>11/9/2020</a:t>
             </a:fld>
             <a:endParaRPr lang="en-US"/>
           </a:p>
@@ -457,7 +457,7 @@
           <a:p>
             <a:fld id="{F507AA02-389D-4D6E-9F55-4109D7FF027D}" type="datetimeFigureOut">
               <a:rPr lang="en-US" smtClean="0"/>
-              <a:t>11/8/2020</a:t>
+              <a:t>11/9/2020</a:t>
             </a:fld>
             <a:endParaRPr lang="en-US"/>
           </a:p>
@@ -665,7 +665,7 @@
           <a:p>
             <a:fld id="{F507AA02-389D-4D6E-9F55-4109D7FF027D}" type="datetimeFigureOut">
               <a:rPr lang="en-US" smtClean="0"/>
-              <a:t>11/8/2020</a:t>
+              <a:t>11/9/2020</a:t>
             </a:fld>
             <a:endParaRPr lang="en-US"/>
           </a:p>
@@ -863,7 +863,7 @@
           <a:p>
             <a:fld id="{F507AA02-389D-4D6E-9F55-4109D7FF027D}" type="datetimeFigureOut">
               <a:rPr lang="en-US" smtClean="0"/>
-              <a:t>11/8/2020</a:t>
+              <a:t>11/9/2020</a:t>
             </a:fld>
             <a:endParaRPr lang="en-US"/>
           </a:p>
@@ -1138,7 +1138,7 @@
           <a:p>
             <a:fld id="{F507AA02-389D-4D6E-9F55-4109D7FF027D}" type="datetimeFigureOut">
               <a:rPr lang="en-US" smtClean="0"/>
-              <a:t>11/8/2020</a:t>
+              <a:t>11/9/2020</a:t>
             </a:fld>
             <a:endParaRPr lang="en-US"/>
           </a:p>
@@ -1403,7 +1403,7 @@
           <a:p>
             <a:fld id="{F507AA02-389D-4D6E-9F55-4109D7FF027D}" type="datetimeFigureOut">
               <a:rPr lang="en-US" smtClean="0"/>
-              <a:t>11/8/2020</a:t>
+              <a:t>11/9/2020</a:t>
             </a:fld>
             <a:endParaRPr lang="en-US"/>
           </a:p>
@@ -1815,7 +1815,7 @@
           <a:p>
             <a:fld id="{F507AA02-389D-4D6E-9F55-4109D7FF027D}" type="datetimeFigureOut">
               <a:rPr lang="en-US" smtClean="0"/>
-              <a:t>11/8/2020</a:t>
+              <a:t>11/9/2020</a:t>
             </a:fld>
             <a:endParaRPr lang="en-US"/>
           </a:p>
@@ -1956,7 +1956,7 @@
           <a:p>
             <a:fld id="{F507AA02-389D-4D6E-9F55-4109D7FF027D}" type="datetimeFigureOut">
               <a:rPr lang="en-US" smtClean="0"/>
-              <a:t>11/8/2020</a:t>
+              <a:t>11/9/2020</a:t>
             </a:fld>
             <a:endParaRPr lang="en-US"/>
           </a:p>
@@ -2069,7 +2069,7 @@
           <a:p>
             <a:fld id="{F507AA02-389D-4D6E-9F55-4109D7FF027D}" type="datetimeFigureOut">
               <a:rPr lang="en-US" smtClean="0"/>
-              <a:t>11/8/2020</a:t>
+              <a:t>11/9/2020</a:t>
             </a:fld>
             <a:endParaRPr lang="en-US"/>
           </a:p>
@@ -2380,7 +2380,7 @@
           <a:p>
             <a:fld id="{F507AA02-389D-4D6E-9F55-4109D7FF027D}" type="datetimeFigureOut">
               <a:rPr lang="en-US" smtClean="0"/>
-              <a:t>11/8/2020</a:t>
+              <a:t>11/9/2020</a:t>
             </a:fld>
             <a:endParaRPr lang="en-US"/>
           </a:p>
@@ -2668,7 +2668,7 @@
           <a:p>
             <a:fld id="{F507AA02-389D-4D6E-9F55-4109D7FF027D}" type="datetimeFigureOut">
               <a:rPr lang="en-US" smtClean="0"/>
-              <a:t>11/8/2020</a:t>
+              <a:t>11/9/2020</a:t>
             </a:fld>
             <a:endParaRPr lang="en-US"/>
           </a:p>
@@ -2909,7 +2909,7 @@
           <a:p>
             <a:fld id="{F507AA02-389D-4D6E-9F55-4109D7FF027D}" type="datetimeFigureOut">
               <a:rPr lang="en-US" smtClean="0"/>
-              <a:t>11/8/2020</a:t>
+              <a:t>11/9/2020</a:t>
             </a:fld>
             <a:endParaRPr lang="en-US"/>
           </a:p>
@@ -4961,7 +4961,7 @@
           <a:p>
             <a:r>
               <a:rPr lang="en-US" sz="1000" dirty="0"/>
-              <a:t>?</a:t>
+              <a:t>Art Room</a:t>
             </a:r>
           </a:p>
         </p:txBody>
@@ -4980,8 +4980,8 @@
         </p:nvSpPr>
         <p:spPr>
           <a:xfrm>
-            <a:off x="2343487" y="3190191"/>
-            <a:ext cx="693965" cy="246221"/>
+            <a:off x="2248241" y="3190191"/>
+            <a:ext cx="789212" cy="246221"/>
           </a:xfrm>
           <a:prstGeom prst="rect">
             <a:avLst/>
@@ -5001,7 +5001,7 @@
           <a:p>
             <a:r>
               <a:rPr lang="en-US" sz="1000" dirty="0"/>
-              <a:t>?</a:t>
+              <a:t>Tech Room</a:t>
             </a:r>
           </a:p>
         </p:txBody>
@@ -5102,8 +5102,8 @@
         </p:nvCxnSpPr>
         <p:spPr>
           <a:xfrm flipH="1" flipV="1">
-            <a:off x="2690470" y="3436412"/>
-            <a:ext cx="1796681" cy="328683"/>
+            <a:off x="2642847" y="3436412"/>
+            <a:ext cx="1844306" cy="328686"/>
           </a:xfrm>
           <a:prstGeom prst="line">
             <a:avLst/>
@@ -5139,7 +5139,7 @@
         <p:spPr>
           <a:xfrm>
             <a:off x="6006116" y="4283523"/>
-            <a:ext cx="693965" cy="246221"/>
+            <a:ext cx="749754" cy="246221"/>
           </a:xfrm>
           <a:prstGeom prst="rect">
             <a:avLst/>
@@ -5159,7 +5159,7 @@
           <a:p>
             <a:r>
               <a:rPr lang="en-US" sz="1000" dirty="0"/>
-              <a:t>?</a:t>
+              <a:t>Music Hall</a:t>
             </a:r>
           </a:p>
         </p:txBody>
@@ -5239,7 +5239,7 @@
           <a:p>
             <a:r>
               <a:rPr lang="en-US" sz="1000" dirty="0"/>
-              <a:t>?</a:t>
+              <a:t>Library</a:t>
             </a:r>
           </a:p>
         </p:txBody>
@@ -5262,8 +5262,8 @@
         </p:nvCxnSpPr>
         <p:spPr>
           <a:xfrm flipH="1">
-            <a:off x="6700081" y="4404300"/>
-            <a:ext cx="950157" cy="2334"/>
+            <a:off x="6755870" y="4404300"/>
+            <a:ext cx="894368" cy="2334"/>
           </a:xfrm>
           <a:prstGeom prst="line">
             <a:avLst/>
@@ -5299,7 +5299,7 @@
         <p:spPr>
           <a:xfrm>
             <a:off x="8291968" y="3190191"/>
-            <a:ext cx="693965" cy="246221"/>
+            <a:ext cx="876525" cy="246221"/>
           </a:xfrm>
           <a:prstGeom prst="rect">
             <a:avLst/>
@@ -5319,7 +5319,7 @@
           <a:p>
             <a:r>
               <a:rPr lang="en-US" sz="1000" dirty="0"/>
-              <a:t>?</a:t>
+              <a:t>Living room</a:t>
             </a:r>
           </a:p>
         </p:txBody>
@@ -5343,7 +5343,7 @@
         <p:spPr>
           <a:xfrm flipV="1">
             <a:off x="7997221" y="3436412"/>
-            <a:ext cx="641730" cy="844777"/>
+            <a:ext cx="733010" cy="844777"/>
           </a:xfrm>
           <a:prstGeom prst="line">
             <a:avLst/>
@@ -5378,8 +5378,8 @@
         </p:nvSpPr>
         <p:spPr>
           <a:xfrm>
-            <a:off x="6090556" y="3190191"/>
-            <a:ext cx="693965" cy="246221"/>
+            <a:off x="5776404" y="3190191"/>
+            <a:ext cx="1008117" cy="246221"/>
           </a:xfrm>
           <a:prstGeom prst="rect">
             <a:avLst/>
@@ -5399,7 +5399,7 @@
           <a:p>
             <a:r>
               <a:rPr lang="en-US" sz="1000" dirty="0"/>
-              <a:t>?</a:t>
+              <a:t>Arcade Room</a:t>
             </a:r>
           </a:p>
         </p:txBody>
@@ -5439,7 +5439,7 @@
           <a:p>
             <a:r>
               <a:rPr lang="en-US" sz="1000" dirty="0"/>
-              <a:t>?</a:t>
+              <a:t>Gym</a:t>
             </a:r>
           </a:p>
         </p:txBody>
@@ -5461,8 +5461,8 @@
         </p:nvCxnSpPr>
         <p:spPr>
           <a:xfrm>
-            <a:off x="6437539" y="3436412"/>
-            <a:ext cx="638257" cy="328683"/>
+            <a:off x="6280463" y="3436412"/>
+            <a:ext cx="795333" cy="328683"/>
           </a:xfrm>
           <a:prstGeom prst="line">
             <a:avLst/>
@@ -5679,10 +5679,9 @@
           <a:lstStyle/>
           <a:p>
             <a:r>
-              <a:rPr lang="en-US" sz="1000" dirty="0" err="1"/>
-              <a:t>Batroom</a:t>
-            </a:r>
-            <a:endParaRPr lang="en-US" sz="1000" dirty="0"/>
+              <a:rPr lang="en-US" sz="1000" dirty="0"/>
+              <a:t>Bathroom</a:t>
+            </a:r>
           </a:p>
         </p:txBody>
       </p:sp>
@@ -5879,10 +5878,9 @@
           <a:lstStyle/>
           <a:p>
             <a:r>
-              <a:rPr lang="en-US" sz="1000" dirty="0" err="1"/>
-              <a:t>Batroom</a:t>
-            </a:r>
-            <a:endParaRPr lang="en-US" sz="1000" dirty="0"/>
+              <a:rPr lang="en-US" sz="1000" dirty="0"/>
+              <a:t>Bathroom</a:t>
+            </a:r>
           </a:p>
         </p:txBody>
       </p:sp>

</xml_diff>

<commit_message>
Some work on quests
</commit_message>
<xml_diff>
--- a/Logic/MM Rooms.pptx
+++ b/Logic/MM Rooms.pptx
@@ -2,18 +2,18 @@
 <file path=ppt/presentation.xml><?xml version="1.0" encoding="utf-8"?>
 <p:presentation xmlns:a="http://schemas.openxmlformats.org/drawingml/2006/main" xmlns:r="http://schemas.openxmlformats.org/officeDocument/2006/relationships" xmlns:p="http://schemas.openxmlformats.org/presentationml/2006/main" saveSubsetFonts="1">
   <p:sldMasterIdLst>
-    <p:sldMasterId id="2147483648" r:id="rId1"/>
+    <p:sldMasterId id="2147483660" r:id="rId1"/>
   </p:sldMasterIdLst>
   <p:sldIdLst>
     <p:sldId id="256" r:id="rId2"/>
   </p:sldIdLst>
-  <p:sldSz cx="12192000" cy="6858000"/>
+  <p:sldSz cx="29260800" cy="16459200"/>
   <p:notesSz cx="6858000" cy="9144000"/>
   <p:defaultTextStyle>
     <a:defPPr>
       <a:defRPr lang="en-US"/>
     </a:defPPr>
-    <a:lvl1pPr marL="0" algn="l" defTabSz="914400" rtl="0" eaLnBrk="1" latinLnBrk="0" hangingPunct="1">
+    <a:lvl1pPr marL="0" algn="l" defTabSz="457200" rtl="0" eaLnBrk="1" latinLnBrk="0" hangingPunct="1">
       <a:defRPr sz="1800" kern="1200">
         <a:solidFill>
           <a:schemeClr val="tx1"/>
@@ -23,7 +23,7 @@
         <a:cs typeface="+mn-cs"/>
       </a:defRPr>
     </a:lvl1pPr>
-    <a:lvl2pPr marL="457200" algn="l" defTabSz="914400" rtl="0" eaLnBrk="1" latinLnBrk="0" hangingPunct="1">
+    <a:lvl2pPr marL="457200" algn="l" defTabSz="457200" rtl="0" eaLnBrk="1" latinLnBrk="0" hangingPunct="1">
       <a:defRPr sz="1800" kern="1200">
         <a:solidFill>
           <a:schemeClr val="tx1"/>
@@ -33,7 +33,7 @@
         <a:cs typeface="+mn-cs"/>
       </a:defRPr>
     </a:lvl2pPr>
-    <a:lvl3pPr marL="914400" algn="l" defTabSz="914400" rtl="0" eaLnBrk="1" latinLnBrk="0" hangingPunct="1">
+    <a:lvl3pPr marL="914400" algn="l" defTabSz="457200" rtl="0" eaLnBrk="1" latinLnBrk="0" hangingPunct="1">
       <a:defRPr sz="1800" kern="1200">
         <a:solidFill>
           <a:schemeClr val="tx1"/>
@@ -43,7 +43,7 @@
         <a:cs typeface="+mn-cs"/>
       </a:defRPr>
     </a:lvl3pPr>
-    <a:lvl4pPr marL="1371600" algn="l" defTabSz="914400" rtl="0" eaLnBrk="1" latinLnBrk="0" hangingPunct="1">
+    <a:lvl4pPr marL="1371600" algn="l" defTabSz="457200" rtl="0" eaLnBrk="1" latinLnBrk="0" hangingPunct="1">
       <a:defRPr sz="1800" kern="1200">
         <a:solidFill>
           <a:schemeClr val="tx1"/>
@@ -53,7 +53,7 @@
         <a:cs typeface="+mn-cs"/>
       </a:defRPr>
     </a:lvl4pPr>
-    <a:lvl5pPr marL="1828800" algn="l" defTabSz="914400" rtl="0" eaLnBrk="1" latinLnBrk="0" hangingPunct="1">
+    <a:lvl5pPr marL="1828800" algn="l" defTabSz="457200" rtl="0" eaLnBrk="1" latinLnBrk="0" hangingPunct="1">
       <a:defRPr sz="1800" kern="1200">
         <a:solidFill>
           <a:schemeClr val="tx1"/>
@@ -63,7 +63,7 @@
         <a:cs typeface="+mn-cs"/>
       </a:defRPr>
     </a:lvl5pPr>
-    <a:lvl6pPr marL="2286000" algn="l" defTabSz="914400" rtl="0" eaLnBrk="1" latinLnBrk="0" hangingPunct="1">
+    <a:lvl6pPr marL="2286000" algn="l" defTabSz="457200" rtl="0" eaLnBrk="1" latinLnBrk="0" hangingPunct="1">
       <a:defRPr sz="1800" kern="1200">
         <a:solidFill>
           <a:schemeClr val="tx1"/>
@@ -73,7 +73,7 @@
         <a:cs typeface="+mn-cs"/>
       </a:defRPr>
     </a:lvl6pPr>
-    <a:lvl7pPr marL="2743200" algn="l" defTabSz="914400" rtl="0" eaLnBrk="1" latinLnBrk="0" hangingPunct="1">
+    <a:lvl7pPr marL="2743200" algn="l" defTabSz="457200" rtl="0" eaLnBrk="1" latinLnBrk="0" hangingPunct="1">
       <a:defRPr sz="1800" kern="1200">
         <a:solidFill>
           <a:schemeClr val="tx1"/>
@@ -83,7 +83,7 @@
         <a:cs typeface="+mn-cs"/>
       </a:defRPr>
     </a:lvl7pPr>
-    <a:lvl8pPr marL="3200400" algn="l" defTabSz="914400" rtl="0" eaLnBrk="1" latinLnBrk="0" hangingPunct="1">
+    <a:lvl8pPr marL="3200400" algn="l" defTabSz="457200" rtl="0" eaLnBrk="1" latinLnBrk="0" hangingPunct="1">
       <a:defRPr sz="1800" kern="1200">
         <a:solidFill>
           <a:schemeClr val="tx1"/>
@@ -93,7 +93,7 @@
         <a:cs typeface="+mn-cs"/>
       </a:defRPr>
     </a:lvl8pPr>
-    <a:lvl9pPr marL="3657600" algn="l" defTabSz="914400" rtl="0" eaLnBrk="1" latinLnBrk="0" hangingPunct="1">
+    <a:lvl9pPr marL="3657600" algn="l" defTabSz="457200" rtl="0" eaLnBrk="1" latinLnBrk="0" hangingPunct="1">
       <a:defRPr sz="1800" kern="1200">
         <a:solidFill>
           <a:schemeClr val="tx1"/>
@@ -131,13 +131,7 @@
       </p:grpSpPr>
       <p:sp>
         <p:nvSpPr>
-          <p:cNvPr id="2" name="Title 1">
-            <a:extLst>
-              <a:ext uri="{FF2B5EF4-FFF2-40B4-BE49-F238E27FC236}">
-                <a16:creationId xmlns:a16="http://schemas.microsoft.com/office/drawing/2014/main" id="{F806BAC4-FF21-47D6-AF79-FE01AE8547A7}"/>
-              </a:ext>
-            </a:extLst>
-          </p:cNvPr>
+          <p:cNvPr id="2" name="Title 1"/>
           <p:cNvSpPr>
             <a:spLocks noGrp="1"/>
           </p:cNvSpPr>
@@ -147,15 +141,15 @@
         </p:nvSpPr>
         <p:spPr>
           <a:xfrm>
-            <a:off x="1524000" y="1122363"/>
-            <a:ext cx="9144000" cy="2387600"/>
+            <a:off x="3657600" y="2693671"/>
+            <a:ext cx="21945600" cy="5730240"/>
           </a:xfrm>
         </p:spPr>
         <p:txBody>
           <a:bodyPr anchor="b"/>
           <a:lstStyle>
             <a:lvl1pPr algn="ctr">
-              <a:defRPr sz="6000"/>
+              <a:defRPr sz="14400"/>
             </a:lvl1pPr>
           </a:lstStyle>
           <a:p>
@@ -163,18 +157,13 @@
               <a:rPr lang="en-US"/>
               <a:t>Click to edit Master title style</a:t>
             </a:r>
-          </a:p>
-        </p:txBody>
-      </p:sp>
-      <p:sp>
-        <p:nvSpPr>
-          <p:cNvPr id="3" name="Subtitle 2">
-            <a:extLst>
-              <a:ext uri="{FF2B5EF4-FFF2-40B4-BE49-F238E27FC236}">
-                <a16:creationId xmlns:a16="http://schemas.microsoft.com/office/drawing/2014/main" id="{C24D487F-3DA9-4927-81C5-51990F9C1670}"/>
-              </a:ext>
-            </a:extLst>
-          </p:cNvPr>
+            <a:endParaRPr lang="en-US" dirty="0"/>
+          </a:p>
+        </p:txBody>
+      </p:sp>
+      <p:sp>
+        <p:nvSpPr>
+          <p:cNvPr id="3" name="Subtitle 2"/>
           <p:cNvSpPr>
             <a:spLocks noGrp="1"/>
           </p:cNvSpPr>
@@ -184,8 +173,8 @@
         </p:nvSpPr>
         <p:spPr>
           <a:xfrm>
-            <a:off x="1524000" y="3602038"/>
-            <a:ext cx="9144000" cy="1655762"/>
+            <a:off x="3657600" y="8644891"/>
+            <a:ext cx="21945600" cy="3973829"/>
           </a:xfrm>
         </p:spPr>
         <p:txBody>
@@ -193,39 +182,39 @@
           <a:lstStyle>
             <a:lvl1pPr marL="0" indent="0" algn="ctr">
               <a:buNone/>
-              <a:defRPr sz="2400"/>
+              <a:defRPr sz="5760"/>
             </a:lvl1pPr>
-            <a:lvl2pPr marL="457200" indent="0" algn="ctr">
+            <a:lvl2pPr marL="1097280" indent="0" algn="ctr">
               <a:buNone/>
-              <a:defRPr sz="2000"/>
+              <a:defRPr sz="4800"/>
             </a:lvl2pPr>
-            <a:lvl3pPr marL="914400" indent="0" algn="ctr">
+            <a:lvl3pPr marL="2194560" indent="0" algn="ctr">
               <a:buNone/>
-              <a:defRPr sz="1800"/>
+              <a:defRPr sz="4320"/>
             </a:lvl3pPr>
-            <a:lvl4pPr marL="1371600" indent="0" algn="ctr">
+            <a:lvl4pPr marL="3291840" indent="0" algn="ctr">
               <a:buNone/>
-              <a:defRPr sz="1600"/>
+              <a:defRPr sz="3840"/>
             </a:lvl4pPr>
-            <a:lvl5pPr marL="1828800" indent="0" algn="ctr">
+            <a:lvl5pPr marL="4389120" indent="0" algn="ctr">
               <a:buNone/>
-              <a:defRPr sz="1600"/>
+              <a:defRPr sz="3840"/>
             </a:lvl5pPr>
-            <a:lvl6pPr marL="2286000" indent="0" algn="ctr">
+            <a:lvl6pPr marL="5486400" indent="0" algn="ctr">
               <a:buNone/>
-              <a:defRPr sz="1600"/>
+              <a:defRPr sz="3840"/>
             </a:lvl6pPr>
-            <a:lvl7pPr marL="2743200" indent="0" algn="ctr">
+            <a:lvl7pPr marL="6583680" indent="0" algn="ctr">
               <a:buNone/>
-              <a:defRPr sz="1600"/>
+              <a:defRPr sz="3840"/>
             </a:lvl7pPr>
-            <a:lvl8pPr marL="3200400" indent="0" algn="ctr">
+            <a:lvl8pPr marL="7680960" indent="0" algn="ctr">
               <a:buNone/>
-              <a:defRPr sz="1600"/>
+              <a:defRPr sz="3840"/>
             </a:lvl8pPr>
-            <a:lvl9pPr marL="3657600" indent="0" algn="ctr">
+            <a:lvl9pPr marL="8778240" indent="0" algn="ctr">
               <a:buNone/>
-              <a:defRPr sz="1600"/>
+              <a:defRPr sz="3840"/>
             </a:lvl9pPr>
           </a:lstStyle>
           <a:p>
@@ -233,18 +222,13 @@
               <a:rPr lang="en-US"/>
               <a:t>Click to edit Master subtitle style</a:t>
             </a:r>
-          </a:p>
-        </p:txBody>
-      </p:sp>
-      <p:sp>
-        <p:nvSpPr>
-          <p:cNvPr id="4" name="Date Placeholder 3">
-            <a:extLst>
-              <a:ext uri="{FF2B5EF4-FFF2-40B4-BE49-F238E27FC236}">
-                <a16:creationId xmlns:a16="http://schemas.microsoft.com/office/drawing/2014/main" id="{ED01B335-3CA5-4CC0-81EB-8C9FA7576872}"/>
-              </a:ext>
-            </a:extLst>
-          </p:cNvPr>
+            <a:endParaRPr lang="en-US" dirty="0"/>
+          </a:p>
+        </p:txBody>
+      </p:sp>
+      <p:sp>
+        <p:nvSpPr>
+          <p:cNvPr id="4" name="Date Placeholder 3"/>
           <p:cNvSpPr>
             <a:spLocks noGrp="1"/>
           </p:cNvSpPr>
@@ -267,13 +251,7 @@
       </p:sp>
       <p:sp>
         <p:nvSpPr>
-          <p:cNvPr id="5" name="Footer Placeholder 4">
-            <a:extLst>
-              <a:ext uri="{FF2B5EF4-FFF2-40B4-BE49-F238E27FC236}">
-                <a16:creationId xmlns:a16="http://schemas.microsoft.com/office/drawing/2014/main" id="{4B7F31FD-F6A7-45D6-921C-F6F3C7FE28C2}"/>
-              </a:ext>
-            </a:extLst>
-          </p:cNvPr>
+          <p:cNvPr id="5" name="Footer Placeholder 4"/>
           <p:cNvSpPr>
             <a:spLocks noGrp="1"/>
           </p:cNvSpPr>
@@ -292,13 +270,7 @@
       </p:sp>
       <p:sp>
         <p:nvSpPr>
-          <p:cNvPr id="6" name="Slide Number Placeholder 5">
-            <a:extLst>
-              <a:ext uri="{FF2B5EF4-FFF2-40B4-BE49-F238E27FC236}">
-                <a16:creationId xmlns:a16="http://schemas.microsoft.com/office/drawing/2014/main" id="{FD71AFB3-8AB1-4D0F-A4F1-5DA2620E5D41}"/>
-              </a:ext>
-            </a:extLst>
-          </p:cNvPr>
+          <p:cNvPr id="6" name="Slide Number Placeholder 5"/>
           <p:cNvSpPr>
             <a:spLocks noGrp="1"/>
           </p:cNvSpPr>
@@ -322,7 +294,7 @@
     </p:spTree>
     <p:extLst>
       <p:ext uri="{BB962C8B-B14F-4D97-AF65-F5344CB8AC3E}">
-        <p14:creationId xmlns:p14="http://schemas.microsoft.com/office/powerpoint/2010/main" val="1874101741"/>
+        <p14:creationId xmlns:p14="http://schemas.microsoft.com/office/powerpoint/2010/main" val="1624911981"/>
       </p:ext>
     </p:extLst>
   </p:cSld>
@@ -351,13 +323,7 @@
       </p:grpSpPr>
       <p:sp>
         <p:nvSpPr>
-          <p:cNvPr id="2" name="Title 1">
-            <a:extLst>
-              <a:ext uri="{FF2B5EF4-FFF2-40B4-BE49-F238E27FC236}">
-                <a16:creationId xmlns:a16="http://schemas.microsoft.com/office/drawing/2014/main" id="{34E8F161-6781-4287-92AD-AA7A3211E81F}"/>
-              </a:ext>
-            </a:extLst>
-          </p:cNvPr>
+          <p:cNvPr id="2" name="Title 1"/>
           <p:cNvSpPr>
             <a:spLocks noGrp="1"/>
           </p:cNvSpPr>
@@ -374,18 +340,13 @@
               <a:rPr lang="en-US"/>
               <a:t>Click to edit Master title style</a:t>
             </a:r>
-          </a:p>
-        </p:txBody>
-      </p:sp>
-      <p:sp>
-        <p:nvSpPr>
-          <p:cNvPr id="3" name="Vertical Text Placeholder 2">
-            <a:extLst>
-              <a:ext uri="{FF2B5EF4-FFF2-40B4-BE49-F238E27FC236}">
-                <a16:creationId xmlns:a16="http://schemas.microsoft.com/office/drawing/2014/main" id="{F97B64FD-9C1E-4867-8AB0-27BB60B48800}"/>
-              </a:ext>
-            </a:extLst>
-          </p:cNvPr>
+            <a:endParaRPr lang="en-US" dirty="0"/>
+          </a:p>
+        </p:txBody>
+      </p:sp>
+      <p:sp>
+        <p:nvSpPr>
+          <p:cNvPr id="3" name="Vertical Text Placeholder 2"/>
           <p:cNvSpPr>
             <a:spLocks noGrp="1"/>
           </p:cNvSpPr>
@@ -431,18 +392,13 @@
               <a:rPr lang="en-US"/>
               <a:t>Fifth level</a:t>
             </a:r>
-          </a:p>
-        </p:txBody>
-      </p:sp>
-      <p:sp>
-        <p:nvSpPr>
-          <p:cNvPr id="4" name="Date Placeholder 3">
-            <a:extLst>
-              <a:ext uri="{FF2B5EF4-FFF2-40B4-BE49-F238E27FC236}">
-                <a16:creationId xmlns:a16="http://schemas.microsoft.com/office/drawing/2014/main" id="{340066CC-9D38-40EB-B607-0ECACA68DF8F}"/>
-              </a:ext>
-            </a:extLst>
-          </p:cNvPr>
+            <a:endParaRPr lang="en-US" dirty="0"/>
+          </a:p>
+        </p:txBody>
+      </p:sp>
+      <p:sp>
+        <p:nvSpPr>
+          <p:cNvPr id="4" name="Date Placeholder 3"/>
           <p:cNvSpPr>
             <a:spLocks noGrp="1"/>
           </p:cNvSpPr>
@@ -465,13 +421,7 @@
       </p:sp>
       <p:sp>
         <p:nvSpPr>
-          <p:cNvPr id="5" name="Footer Placeholder 4">
-            <a:extLst>
-              <a:ext uri="{FF2B5EF4-FFF2-40B4-BE49-F238E27FC236}">
-                <a16:creationId xmlns:a16="http://schemas.microsoft.com/office/drawing/2014/main" id="{CAEDC317-2FB7-44F7-A972-DB11BF61946F}"/>
-              </a:ext>
-            </a:extLst>
-          </p:cNvPr>
+          <p:cNvPr id="5" name="Footer Placeholder 4"/>
           <p:cNvSpPr>
             <a:spLocks noGrp="1"/>
           </p:cNvSpPr>
@@ -490,13 +440,7 @@
       </p:sp>
       <p:sp>
         <p:nvSpPr>
-          <p:cNvPr id="6" name="Slide Number Placeholder 5">
-            <a:extLst>
-              <a:ext uri="{FF2B5EF4-FFF2-40B4-BE49-F238E27FC236}">
-                <a16:creationId xmlns:a16="http://schemas.microsoft.com/office/drawing/2014/main" id="{8EA5B24A-229D-4512-8974-2989894928D6}"/>
-              </a:ext>
-            </a:extLst>
-          </p:cNvPr>
+          <p:cNvPr id="6" name="Slide Number Placeholder 5"/>
           <p:cNvSpPr>
             <a:spLocks noGrp="1"/>
           </p:cNvSpPr>
@@ -520,7 +464,7 @@
     </p:spTree>
     <p:extLst>
       <p:ext uri="{BB962C8B-B14F-4D97-AF65-F5344CB8AC3E}">
-        <p14:creationId xmlns:p14="http://schemas.microsoft.com/office/powerpoint/2010/main" val="3308996208"/>
+        <p14:creationId xmlns:p14="http://schemas.microsoft.com/office/powerpoint/2010/main" val="625555708"/>
       </p:ext>
     </p:extLst>
   </p:cSld>
@@ -549,13 +493,7 @@
       </p:grpSpPr>
       <p:sp>
         <p:nvSpPr>
-          <p:cNvPr id="2" name="Vertical Title 1">
-            <a:extLst>
-              <a:ext uri="{FF2B5EF4-FFF2-40B4-BE49-F238E27FC236}">
-                <a16:creationId xmlns:a16="http://schemas.microsoft.com/office/drawing/2014/main" id="{77B59467-44C0-4E08-9122-536F2998062C}"/>
-              </a:ext>
-            </a:extLst>
-          </p:cNvPr>
+          <p:cNvPr id="2" name="Vertical Title 1"/>
           <p:cNvSpPr>
             <a:spLocks noGrp="1"/>
           </p:cNvSpPr>
@@ -565,8 +503,8 @@
         </p:nvSpPr>
         <p:spPr>
           <a:xfrm>
-            <a:off x="8724900" y="365125"/>
-            <a:ext cx="2628900" cy="5811838"/>
+            <a:off x="20939760" y="876300"/>
+            <a:ext cx="6309360" cy="13948411"/>
           </a:xfrm>
         </p:spPr>
         <p:txBody>
@@ -577,18 +515,13 @@
               <a:rPr lang="en-US"/>
               <a:t>Click to edit Master title style</a:t>
             </a:r>
-          </a:p>
-        </p:txBody>
-      </p:sp>
-      <p:sp>
-        <p:nvSpPr>
-          <p:cNvPr id="3" name="Vertical Text Placeholder 2">
-            <a:extLst>
-              <a:ext uri="{FF2B5EF4-FFF2-40B4-BE49-F238E27FC236}">
-                <a16:creationId xmlns:a16="http://schemas.microsoft.com/office/drawing/2014/main" id="{6ADAF733-CE45-4398-B8DC-DEA2B2070654}"/>
-              </a:ext>
-            </a:extLst>
-          </p:cNvPr>
+            <a:endParaRPr lang="en-US" dirty="0"/>
+          </a:p>
+        </p:txBody>
+      </p:sp>
+      <p:sp>
+        <p:nvSpPr>
+          <p:cNvPr id="3" name="Vertical Text Placeholder 2"/>
           <p:cNvSpPr>
             <a:spLocks noGrp="1"/>
           </p:cNvSpPr>
@@ -598,8 +531,8 @@
         </p:nvSpPr>
         <p:spPr>
           <a:xfrm>
-            <a:off x="838200" y="365125"/>
-            <a:ext cx="7734300" cy="5811838"/>
+            <a:off x="2011680" y="876300"/>
+            <a:ext cx="18562320" cy="13948411"/>
           </a:xfrm>
         </p:spPr>
         <p:txBody>
@@ -639,18 +572,13 @@
               <a:rPr lang="en-US"/>
               <a:t>Fifth level</a:t>
             </a:r>
-          </a:p>
-        </p:txBody>
-      </p:sp>
-      <p:sp>
-        <p:nvSpPr>
-          <p:cNvPr id="4" name="Date Placeholder 3">
-            <a:extLst>
-              <a:ext uri="{FF2B5EF4-FFF2-40B4-BE49-F238E27FC236}">
-                <a16:creationId xmlns:a16="http://schemas.microsoft.com/office/drawing/2014/main" id="{AB39A757-56F6-426F-AC2A-DABB1E3A3EC5}"/>
-              </a:ext>
-            </a:extLst>
-          </p:cNvPr>
+            <a:endParaRPr lang="en-US" dirty="0"/>
+          </a:p>
+        </p:txBody>
+      </p:sp>
+      <p:sp>
+        <p:nvSpPr>
+          <p:cNvPr id="4" name="Date Placeholder 3"/>
           <p:cNvSpPr>
             <a:spLocks noGrp="1"/>
           </p:cNvSpPr>
@@ -673,13 +601,7 @@
       </p:sp>
       <p:sp>
         <p:nvSpPr>
-          <p:cNvPr id="5" name="Footer Placeholder 4">
-            <a:extLst>
-              <a:ext uri="{FF2B5EF4-FFF2-40B4-BE49-F238E27FC236}">
-                <a16:creationId xmlns:a16="http://schemas.microsoft.com/office/drawing/2014/main" id="{D8880110-2D1A-4D39-B035-2DDB99C59645}"/>
-              </a:ext>
-            </a:extLst>
-          </p:cNvPr>
+          <p:cNvPr id="5" name="Footer Placeholder 4"/>
           <p:cNvSpPr>
             <a:spLocks noGrp="1"/>
           </p:cNvSpPr>
@@ -698,13 +620,7 @@
       </p:sp>
       <p:sp>
         <p:nvSpPr>
-          <p:cNvPr id="6" name="Slide Number Placeholder 5">
-            <a:extLst>
-              <a:ext uri="{FF2B5EF4-FFF2-40B4-BE49-F238E27FC236}">
-                <a16:creationId xmlns:a16="http://schemas.microsoft.com/office/drawing/2014/main" id="{5DBA94E6-5788-4E63-ABDD-4E58EBCD8AC6}"/>
-              </a:ext>
-            </a:extLst>
-          </p:cNvPr>
+          <p:cNvPr id="6" name="Slide Number Placeholder 5"/>
           <p:cNvSpPr>
             <a:spLocks noGrp="1"/>
           </p:cNvSpPr>
@@ -728,7 +644,7 @@
     </p:spTree>
     <p:extLst>
       <p:ext uri="{BB962C8B-B14F-4D97-AF65-F5344CB8AC3E}">
-        <p14:creationId xmlns:p14="http://schemas.microsoft.com/office/powerpoint/2010/main" val="3145820111"/>
+        <p14:creationId xmlns:p14="http://schemas.microsoft.com/office/powerpoint/2010/main" val="3769509529"/>
       </p:ext>
     </p:extLst>
   </p:cSld>
@@ -757,13 +673,7 @@
       </p:grpSpPr>
       <p:sp>
         <p:nvSpPr>
-          <p:cNvPr id="2" name="Title 1">
-            <a:extLst>
-              <a:ext uri="{FF2B5EF4-FFF2-40B4-BE49-F238E27FC236}">
-                <a16:creationId xmlns:a16="http://schemas.microsoft.com/office/drawing/2014/main" id="{6A70E8A4-C5BB-41CE-AFC1-4B271ACEBB90}"/>
-              </a:ext>
-            </a:extLst>
-          </p:cNvPr>
+          <p:cNvPr id="2" name="Title 1"/>
           <p:cNvSpPr>
             <a:spLocks noGrp="1"/>
           </p:cNvSpPr>
@@ -780,18 +690,13 @@
               <a:rPr lang="en-US"/>
               <a:t>Click to edit Master title style</a:t>
             </a:r>
-          </a:p>
-        </p:txBody>
-      </p:sp>
-      <p:sp>
-        <p:nvSpPr>
-          <p:cNvPr id="3" name="Content Placeholder 2">
-            <a:extLst>
-              <a:ext uri="{FF2B5EF4-FFF2-40B4-BE49-F238E27FC236}">
-                <a16:creationId xmlns:a16="http://schemas.microsoft.com/office/drawing/2014/main" id="{63EA9E10-A5F8-4EF5-9ADA-3FA4D25131B4}"/>
-              </a:ext>
-            </a:extLst>
-          </p:cNvPr>
+            <a:endParaRPr lang="en-US" dirty="0"/>
+          </a:p>
+        </p:txBody>
+      </p:sp>
+      <p:sp>
+        <p:nvSpPr>
+          <p:cNvPr id="3" name="Content Placeholder 2"/>
           <p:cNvSpPr>
             <a:spLocks noGrp="1"/>
           </p:cNvSpPr>
@@ -837,18 +742,13 @@
               <a:rPr lang="en-US"/>
               <a:t>Fifth level</a:t>
             </a:r>
-          </a:p>
-        </p:txBody>
-      </p:sp>
-      <p:sp>
-        <p:nvSpPr>
-          <p:cNvPr id="4" name="Date Placeholder 3">
-            <a:extLst>
-              <a:ext uri="{FF2B5EF4-FFF2-40B4-BE49-F238E27FC236}">
-                <a16:creationId xmlns:a16="http://schemas.microsoft.com/office/drawing/2014/main" id="{F1BB803A-BC3F-4868-8B63-4BD49390EC37}"/>
-              </a:ext>
-            </a:extLst>
-          </p:cNvPr>
+            <a:endParaRPr lang="en-US" dirty="0"/>
+          </a:p>
+        </p:txBody>
+      </p:sp>
+      <p:sp>
+        <p:nvSpPr>
+          <p:cNvPr id="4" name="Date Placeholder 3"/>
           <p:cNvSpPr>
             <a:spLocks noGrp="1"/>
           </p:cNvSpPr>
@@ -871,13 +771,7 @@
       </p:sp>
       <p:sp>
         <p:nvSpPr>
-          <p:cNvPr id="5" name="Footer Placeholder 4">
-            <a:extLst>
-              <a:ext uri="{FF2B5EF4-FFF2-40B4-BE49-F238E27FC236}">
-                <a16:creationId xmlns:a16="http://schemas.microsoft.com/office/drawing/2014/main" id="{F07DC77C-4880-4BEB-B3F1-811B47286C94}"/>
-              </a:ext>
-            </a:extLst>
-          </p:cNvPr>
+          <p:cNvPr id="5" name="Footer Placeholder 4"/>
           <p:cNvSpPr>
             <a:spLocks noGrp="1"/>
           </p:cNvSpPr>
@@ -896,13 +790,7 @@
       </p:sp>
       <p:sp>
         <p:nvSpPr>
-          <p:cNvPr id="6" name="Slide Number Placeholder 5">
-            <a:extLst>
-              <a:ext uri="{FF2B5EF4-FFF2-40B4-BE49-F238E27FC236}">
-                <a16:creationId xmlns:a16="http://schemas.microsoft.com/office/drawing/2014/main" id="{D3D68854-6F6A-4EAA-8606-3C7766869064}"/>
-              </a:ext>
-            </a:extLst>
-          </p:cNvPr>
+          <p:cNvPr id="6" name="Slide Number Placeholder 5"/>
           <p:cNvSpPr>
             <a:spLocks noGrp="1"/>
           </p:cNvSpPr>
@@ -926,7 +814,7 @@
     </p:spTree>
     <p:extLst>
       <p:ext uri="{BB962C8B-B14F-4D97-AF65-F5344CB8AC3E}">
-        <p14:creationId xmlns:p14="http://schemas.microsoft.com/office/powerpoint/2010/main" val="372373080"/>
+        <p14:creationId xmlns:p14="http://schemas.microsoft.com/office/powerpoint/2010/main" val="1035679909"/>
       </p:ext>
     </p:extLst>
   </p:cSld>
@@ -955,13 +843,7 @@
       </p:grpSpPr>
       <p:sp>
         <p:nvSpPr>
-          <p:cNvPr id="2" name="Title 1">
-            <a:extLst>
-              <a:ext uri="{FF2B5EF4-FFF2-40B4-BE49-F238E27FC236}">
-                <a16:creationId xmlns:a16="http://schemas.microsoft.com/office/drawing/2014/main" id="{97F035F9-DB85-49E2-8A1A-E8BDD7EBEE95}"/>
-              </a:ext>
-            </a:extLst>
-          </p:cNvPr>
+          <p:cNvPr id="2" name="Title 1"/>
           <p:cNvSpPr>
             <a:spLocks noGrp="1"/>
           </p:cNvSpPr>
@@ -971,15 +853,15 @@
         </p:nvSpPr>
         <p:spPr>
           <a:xfrm>
-            <a:off x="831850" y="1709738"/>
-            <a:ext cx="10515600" cy="2852737"/>
+            <a:off x="1996440" y="4103372"/>
+            <a:ext cx="25237440" cy="6846569"/>
           </a:xfrm>
         </p:spPr>
         <p:txBody>
           <a:bodyPr anchor="b"/>
           <a:lstStyle>
             <a:lvl1pPr>
-              <a:defRPr sz="6000"/>
+              <a:defRPr sz="14400"/>
             </a:lvl1pPr>
           </a:lstStyle>
           <a:p>
@@ -987,18 +869,13 @@
               <a:rPr lang="en-US"/>
               <a:t>Click to edit Master title style</a:t>
             </a:r>
-          </a:p>
-        </p:txBody>
-      </p:sp>
-      <p:sp>
-        <p:nvSpPr>
-          <p:cNvPr id="3" name="Text Placeholder 2">
-            <a:extLst>
-              <a:ext uri="{FF2B5EF4-FFF2-40B4-BE49-F238E27FC236}">
-                <a16:creationId xmlns:a16="http://schemas.microsoft.com/office/drawing/2014/main" id="{2DB1F4B3-6C28-42DC-9E19-0E82E72BB4C0}"/>
-              </a:ext>
-            </a:extLst>
-          </p:cNvPr>
+            <a:endParaRPr lang="en-US" dirty="0"/>
+          </a:p>
+        </p:txBody>
+      </p:sp>
+      <p:sp>
+        <p:nvSpPr>
+          <p:cNvPr id="3" name="Text Placeholder 2"/>
           <p:cNvSpPr>
             <a:spLocks noGrp="1"/>
           </p:cNvSpPr>
@@ -1008,8 +885,8 @@
         </p:nvSpPr>
         <p:spPr>
           <a:xfrm>
-            <a:off x="831850" y="4589463"/>
-            <a:ext cx="10515600" cy="1500187"/>
+            <a:off x="1996440" y="11014712"/>
+            <a:ext cx="25237440" cy="3600449"/>
           </a:xfrm>
         </p:spPr>
         <p:txBody>
@@ -1017,7 +894,7 @@
           <a:lstStyle>
             <a:lvl1pPr marL="0" indent="0">
               <a:buNone/>
-              <a:defRPr sz="2400">
+              <a:defRPr sz="5760">
                 <a:solidFill>
                   <a:schemeClr val="tx1">
                     <a:tint val="75000"/>
@@ -1025,9 +902,9 @@
                 </a:solidFill>
               </a:defRPr>
             </a:lvl1pPr>
-            <a:lvl2pPr marL="457200" indent="0">
+            <a:lvl2pPr marL="1097280" indent="0">
               <a:buNone/>
-              <a:defRPr sz="2000">
+              <a:defRPr sz="4800">
                 <a:solidFill>
                   <a:schemeClr val="tx1">
                     <a:tint val="75000"/>
@@ -1035,9 +912,9 @@
                 </a:solidFill>
               </a:defRPr>
             </a:lvl2pPr>
-            <a:lvl3pPr marL="914400" indent="0">
+            <a:lvl3pPr marL="2194560" indent="0">
               <a:buNone/>
-              <a:defRPr sz="1800">
+              <a:defRPr sz="4320">
                 <a:solidFill>
                   <a:schemeClr val="tx1">
                     <a:tint val="75000"/>
@@ -1045,9 +922,9 @@
                 </a:solidFill>
               </a:defRPr>
             </a:lvl3pPr>
-            <a:lvl4pPr marL="1371600" indent="0">
+            <a:lvl4pPr marL="3291840" indent="0">
               <a:buNone/>
-              <a:defRPr sz="1600">
+              <a:defRPr sz="3840">
                 <a:solidFill>
                   <a:schemeClr val="tx1">
                     <a:tint val="75000"/>
@@ -1055,9 +932,9 @@
                 </a:solidFill>
               </a:defRPr>
             </a:lvl4pPr>
-            <a:lvl5pPr marL="1828800" indent="0">
+            <a:lvl5pPr marL="4389120" indent="0">
               <a:buNone/>
-              <a:defRPr sz="1600">
+              <a:defRPr sz="3840">
                 <a:solidFill>
                   <a:schemeClr val="tx1">
                     <a:tint val="75000"/>
@@ -1065,9 +942,9 @@
                 </a:solidFill>
               </a:defRPr>
             </a:lvl5pPr>
-            <a:lvl6pPr marL="2286000" indent="0">
+            <a:lvl6pPr marL="5486400" indent="0">
               <a:buNone/>
-              <a:defRPr sz="1600">
+              <a:defRPr sz="3840">
                 <a:solidFill>
                   <a:schemeClr val="tx1">
                     <a:tint val="75000"/>
@@ -1075,9 +952,9 @@
                 </a:solidFill>
               </a:defRPr>
             </a:lvl6pPr>
-            <a:lvl7pPr marL="2743200" indent="0">
+            <a:lvl7pPr marL="6583680" indent="0">
               <a:buNone/>
-              <a:defRPr sz="1600">
+              <a:defRPr sz="3840">
                 <a:solidFill>
                   <a:schemeClr val="tx1">
                     <a:tint val="75000"/>
@@ -1085,9 +962,9 @@
                 </a:solidFill>
               </a:defRPr>
             </a:lvl7pPr>
-            <a:lvl8pPr marL="3200400" indent="0">
+            <a:lvl8pPr marL="7680960" indent="0">
               <a:buNone/>
-              <a:defRPr sz="1600">
+              <a:defRPr sz="3840">
                 <a:solidFill>
                   <a:schemeClr val="tx1">
                     <a:tint val="75000"/>
@@ -1095,9 +972,9 @@
                 </a:solidFill>
               </a:defRPr>
             </a:lvl8pPr>
-            <a:lvl9pPr marL="3657600" indent="0">
+            <a:lvl9pPr marL="8778240" indent="0">
               <a:buNone/>
-              <a:defRPr sz="1600">
+              <a:defRPr sz="3840">
                 <a:solidFill>
                   <a:schemeClr val="tx1">
                     <a:tint val="75000"/>
@@ -1117,13 +994,7 @@
       </p:sp>
       <p:sp>
         <p:nvSpPr>
-          <p:cNvPr id="4" name="Date Placeholder 3">
-            <a:extLst>
-              <a:ext uri="{FF2B5EF4-FFF2-40B4-BE49-F238E27FC236}">
-                <a16:creationId xmlns:a16="http://schemas.microsoft.com/office/drawing/2014/main" id="{E7B5340B-90A7-49BC-AD93-1D2F1FD68AB8}"/>
-              </a:ext>
-            </a:extLst>
-          </p:cNvPr>
+          <p:cNvPr id="4" name="Date Placeholder 3"/>
           <p:cNvSpPr>
             <a:spLocks noGrp="1"/>
           </p:cNvSpPr>
@@ -1146,13 +1017,7 @@
       </p:sp>
       <p:sp>
         <p:nvSpPr>
-          <p:cNvPr id="5" name="Footer Placeholder 4">
-            <a:extLst>
-              <a:ext uri="{FF2B5EF4-FFF2-40B4-BE49-F238E27FC236}">
-                <a16:creationId xmlns:a16="http://schemas.microsoft.com/office/drawing/2014/main" id="{25FC3732-14C3-4F13-9B14-3E0D90F24F4F}"/>
-              </a:ext>
-            </a:extLst>
-          </p:cNvPr>
+          <p:cNvPr id="5" name="Footer Placeholder 4"/>
           <p:cNvSpPr>
             <a:spLocks noGrp="1"/>
           </p:cNvSpPr>
@@ -1171,13 +1036,7 @@
       </p:sp>
       <p:sp>
         <p:nvSpPr>
-          <p:cNvPr id="6" name="Slide Number Placeholder 5">
-            <a:extLst>
-              <a:ext uri="{FF2B5EF4-FFF2-40B4-BE49-F238E27FC236}">
-                <a16:creationId xmlns:a16="http://schemas.microsoft.com/office/drawing/2014/main" id="{F0B65C5A-E663-48F3-8981-DD03F3EDBA4E}"/>
-              </a:ext>
-            </a:extLst>
-          </p:cNvPr>
+          <p:cNvPr id="6" name="Slide Number Placeholder 5"/>
           <p:cNvSpPr>
             <a:spLocks noGrp="1"/>
           </p:cNvSpPr>
@@ -1201,7 +1060,7 @@
     </p:spTree>
     <p:extLst>
       <p:ext uri="{BB962C8B-B14F-4D97-AF65-F5344CB8AC3E}">
-        <p14:creationId xmlns:p14="http://schemas.microsoft.com/office/powerpoint/2010/main" val="959342630"/>
+        <p14:creationId xmlns:p14="http://schemas.microsoft.com/office/powerpoint/2010/main" val="4202667237"/>
       </p:ext>
     </p:extLst>
   </p:cSld>
@@ -1230,13 +1089,7 @@
       </p:grpSpPr>
       <p:sp>
         <p:nvSpPr>
-          <p:cNvPr id="2" name="Title 1">
-            <a:extLst>
-              <a:ext uri="{FF2B5EF4-FFF2-40B4-BE49-F238E27FC236}">
-                <a16:creationId xmlns:a16="http://schemas.microsoft.com/office/drawing/2014/main" id="{1C879B7A-DC8C-42DC-B469-BB2011EFAE69}"/>
-              </a:ext>
-            </a:extLst>
-          </p:cNvPr>
+          <p:cNvPr id="2" name="Title 1"/>
           <p:cNvSpPr>
             <a:spLocks noGrp="1"/>
           </p:cNvSpPr>
@@ -1253,18 +1106,13 @@
               <a:rPr lang="en-US"/>
               <a:t>Click to edit Master title style</a:t>
             </a:r>
-          </a:p>
-        </p:txBody>
-      </p:sp>
-      <p:sp>
-        <p:nvSpPr>
-          <p:cNvPr id="3" name="Content Placeholder 2">
-            <a:extLst>
-              <a:ext uri="{FF2B5EF4-FFF2-40B4-BE49-F238E27FC236}">
-                <a16:creationId xmlns:a16="http://schemas.microsoft.com/office/drawing/2014/main" id="{5E3B7920-9AB9-4290-952D-378EBCDD46F1}"/>
-              </a:ext>
-            </a:extLst>
-          </p:cNvPr>
+            <a:endParaRPr lang="en-US" dirty="0"/>
+          </a:p>
+        </p:txBody>
+      </p:sp>
+      <p:sp>
+        <p:nvSpPr>
+          <p:cNvPr id="3" name="Content Placeholder 2"/>
           <p:cNvSpPr>
             <a:spLocks noGrp="1"/>
           </p:cNvSpPr>
@@ -1274,8 +1122,8 @@
         </p:nvSpPr>
         <p:spPr>
           <a:xfrm>
-            <a:off x="838200" y="1825625"/>
-            <a:ext cx="5181600" cy="4351338"/>
+            <a:off x="2011680" y="4381500"/>
+            <a:ext cx="12435840" cy="10443211"/>
           </a:xfrm>
         </p:spPr>
         <p:txBody>
@@ -1315,18 +1163,13 @@
               <a:rPr lang="en-US"/>
               <a:t>Fifth level</a:t>
             </a:r>
-          </a:p>
-        </p:txBody>
-      </p:sp>
-      <p:sp>
-        <p:nvSpPr>
-          <p:cNvPr id="4" name="Content Placeholder 3">
-            <a:extLst>
-              <a:ext uri="{FF2B5EF4-FFF2-40B4-BE49-F238E27FC236}">
-                <a16:creationId xmlns:a16="http://schemas.microsoft.com/office/drawing/2014/main" id="{BA7AFB25-50DC-4C31-89D3-3E6602928771}"/>
-              </a:ext>
-            </a:extLst>
-          </p:cNvPr>
+            <a:endParaRPr lang="en-US" dirty="0"/>
+          </a:p>
+        </p:txBody>
+      </p:sp>
+      <p:sp>
+        <p:nvSpPr>
+          <p:cNvPr id="4" name="Content Placeholder 3"/>
           <p:cNvSpPr>
             <a:spLocks noGrp="1"/>
           </p:cNvSpPr>
@@ -1336,8 +1179,8 @@
         </p:nvSpPr>
         <p:spPr>
           <a:xfrm>
-            <a:off x="6172200" y="1825625"/>
-            <a:ext cx="5181600" cy="4351338"/>
+            <a:off x="14813280" y="4381500"/>
+            <a:ext cx="12435840" cy="10443211"/>
           </a:xfrm>
         </p:spPr>
         <p:txBody>
@@ -1377,18 +1220,13 @@
               <a:rPr lang="en-US"/>
               <a:t>Fifth level</a:t>
             </a:r>
-          </a:p>
-        </p:txBody>
-      </p:sp>
-      <p:sp>
-        <p:nvSpPr>
-          <p:cNvPr id="5" name="Date Placeholder 4">
-            <a:extLst>
-              <a:ext uri="{FF2B5EF4-FFF2-40B4-BE49-F238E27FC236}">
-                <a16:creationId xmlns:a16="http://schemas.microsoft.com/office/drawing/2014/main" id="{E442377A-B431-4516-A0E5-6AA3EB8510F6}"/>
-              </a:ext>
-            </a:extLst>
-          </p:cNvPr>
+            <a:endParaRPr lang="en-US" dirty="0"/>
+          </a:p>
+        </p:txBody>
+      </p:sp>
+      <p:sp>
+        <p:nvSpPr>
+          <p:cNvPr id="5" name="Date Placeholder 4"/>
           <p:cNvSpPr>
             <a:spLocks noGrp="1"/>
           </p:cNvSpPr>
@@ -1411,13 +1249,7 @@
       </p:sp>
       <p:sp>
         <p:nvSpPr>
-          <p:cNvPr id="6" name="Footer Placeholder 5">
-            <a:extLst>
-              <a:ext uri="{FF2B5EF4-FFF2-40B4-BE49-F238E27FC236}">
-                <a16:creationId xmlns:a16="http://schemas.microsoft.com/office/drawing/2014/main" id="{25B00E6B-CEE5-45AB-8FD4-AD49DF7DAD2F}"/>
-              </a:ext>
-            </a:extLst>
-          </p:cNvPr>
+          <p:cNvPr id="6" name="Footer Placeholder 5"/>
           <p:cNvSpPr>
             <a:spLocks noGrp="1"/>
           </p:cNvSpPr>
@@ -1436,13 +1268,7 @@
       </p:sp>
       <p:sp>
         <p:nvSpPr>
-          <p:cNvPr id="7" name="Slide Number Placeholder 6">
-            <a:extLst>
-              <a:ext uri="{FF2B5EF4-FFF2-40B4-BE49-F238E27FC236}">
-                <a16:creationId xmlns:a16="http://schemas.microsoft.com/office/drawing/2014/main" id="{D36E85C1-C32D-47BD-86E2-76365CD75F35}"/>
-              </a:ext>
-            </a:extLst>
-          </p:cNvPr>
+          <p:cNvPr id="7" name="Slide Number Placeholder 6"/>
           <p:cNvSpPr>
             <a:spLocks noGrp="1"/>
           </p:cNvSpPr>
@@ -1466,7 +1292,7 @@
     </p:spTree>
     <p:extLst>
       <p:ext uri="{BB962C8B-B14F-4D97-AF65-F5344CB8AC3E}">
-        <p14:creationId xmlns:p14="http://schemas.microsoft.com/office/powerpoint/2010/main" val="762692360"/>
+        <p14:creationId xmlns:p14="http://schemas.microsoft.com/office/powerpoint/2010/main" val="599298385"/>
       </p:ext>
     </p:extLst>
   </p:cSld>
@@ -1495,13 +1321,7 @@
       </p:grpSpPr>
       <p:sp>
         <p:nvSpPr>
-          <p:cNvPr id="2" name="Title 1">
-            <a:extLst>
-              <a:ext uri="{FF2B5EF4-FFF2-40B4-BE49-F238E27FC236}">
-                <a16:creationId xmlns:a16="http://schemas.microsoft.com/office/drawing/2014/main" id="{BAC3CC4B-8E55-4FCC-A2C5-7ACCB9269D1A}"/>
-              </a:ext>
-            </a:extLst>
-          </p:cNvPr>
+          <p:cNvPr id="2" name="Title 1"/>
           <p:cNvSpPr>
             <a:spLocks noGrp="1"/>
           </p:cNvSpPr>
@@ -1511,8 +1331,8 @@
         </p:nvSpPr>
         <p:spPr>
           <a:xfrm>
-            <a:off x="839788" y="365125"/>
-            <a:ext cx="10515600" cy="1325563"/>
+            <a:off x="2015491" y="876301"/>
+            <a:ext cx="25237440" cy="3181351"/>
           </a:xfrm>
         </p:spPr>
         <p:txBody>
@@ -1523,18 +1343,13 @@
               <a:rPr lang="en-US"/>
               <a:t>Click to edit Master title style</a:t>
             </a:r>
-          </a:p>
-        </p:txBody>
-      </p:sp>
-      <p:sp>
-        <p:nvSpPr>
-          <p:cNvPr id="3" name="Text Placeholder 2">
-            <a:extLst>
-              <a:ext uri="{FF2B5EF4-FFF2-40B4-BE49-F238E27FC236}">
-                <a16:creationId xmlns:a16="http://schemas.microsoft.com/office/drawing/2014/main" id="{198C195D-F667-4E07-B532-30BA973E6D36}"/>
-              </a:ext>
-            </a:extLst>
-          </p:cNvPr>
+            <a:endParaRPr lang="en-US" dirty="0"/>
+          </a:p>
+        </p:txBody>
+      </p:sp>
+      <p:sp>
+        <p:nvSpPr>
+          <p:cNvPr id="3" name="Text Placeholder 2"/>
           <p:cNvSpPr>
             <a:spLocks noGrp="1"/>
           </p:cNvSpPr>
@@ -1544,8 +1359,8 @@
         </p:nvSpPr>
         <p:spPr>
           <a:xfrm>
-            <a:off x="839788" y="1681163"/>
-            <a:ext cx="5157787" cy="823912"/>
+            <a:off x="2015492" y="4034791"/>
+            <a:ext cx="12378689" cy="1977389"/>
           </a:xfrm>
         </p:spPr>
         <p:txBody>
@@ -1553,39 +1368,39 @@
           <a:lstStyle>
             <a:lvl1pPr marL="0" indent="0">
               <a:buNone/>
-              <a:defRPr sz="2400" b="1"/>
+              <a:defRPr sz="5760" b="1"/>
             </a:lvl1pPr>
-            <a:lvl2pPr marL="457200" indent="0">
+            <a:lvl2pPr marL="1097280" indent="0">
               <a:buNone/>
-              <a:defRPr sz="2000" b="1"/>
+              <a:defRPr sz="4800" b="1"/>
             </a:lvl2pPr>
-            <a:lvl3pPr marL="914400" indent="0">
+            <a:lvl3pPr marL="2194560" indent="0">
               <a:buNone/>
-              <a:defRPr sz="1800" b="1"/>
+              <a:defRPr sz="4320" b="1"/>
             </a:lvl3pPr>
-            <a:lvl4pPr marL="1371600" indent="0">
+            <a:lvl4pPr marL="3291840" indent="0">
               <a:buNone/>
-              <a:defRPr sz="1600" b="1"/>
+              <a:defRPr sz="3840" b="1"/>
             </a:lvl4pPr>
-            <a:lvl5pPr marL="1828800" indent="0">
+            <a:lvl5pPr marL="4389120" indent="0">
               <a:buNone/>
-              <a:defRPr sz="1600" b="1"/>
+              <a:defRPr sz="3840" b="1"/>
             </a:lvl5pPr>
-            <a:lvl6pPr marL="2286000" indent="0">
+            <a:lvl6pPr marL="5486400" indent="0">
               <a:buNone/>
-              <a:defRPr sz="1600" b="1"/>
+              <a:defRPr sz="3840" b="1"/>
             </a:lvl6pPr>
-            <a:lvl7pPr marL="2743200" indent="0">
+            <a:lvl7pPr marL="6583680" indent="0">
               <a:buNone/>
-              <a:defRPr sz="1600" b="1"/>
+              <a:defRPr sz="3840" b="1"/>
             </a:lvl7pPr>
-            <a:lvl8pPr marL="3200400" indent="0">
+            <a:lvl8pPr marL="7680960" indent="0">
               <a:buNone/>
-              <a:defRPr sz="1600" b="1"/>
+              <a:defRPr sz="3840" b="1"/>
             </a:lvl8pPr>
-            <a:lvl9pPr marL="3657600" indent="0">
+            <a:lvl9pPr marL="8778240" indent="0">
               <a:buNone/>
-              <a:defRPr sz="1600" b="1"/>
+              <a:defRPr sz="3840" b="1"/>
             </a:lvl9pPr>
           </a:lstStyle>
           <a:p>
@@ -1599,13 +1414,7 @@
       </p:sp>
       <p:sp>
         <p:nvSpPr>
-          <p:cNvPr id="4" name="Content Placeholder 3">
-            <a:extLst>
-              <a:ext uri="{FF2B5EF4-FFF2-40B4-BE49-F238E27FC236}">
-                <a16:creationId xmlns:a16="http://schemas.microsoft.com/office/drawing/2014/main" id="{494D688C-5F2A-43CE-85EF-D90049C550E1}"/>
-              </a:ext>
-            </a:extLst>
-          </p:cNvPr>
+          <p:cNvPr id="4" name="Content Placeholder 3"/>
           <p:cNvSpPr>
             <a:spLocks noGrp="1"/>
           </p:cNvSpPr>
@@ -1615,8 +1424,8 @@
         </p:nvSpPr>
         <p:spPr>
           <a:xfrm>
-            <a:off x="839788" y="2505075"/>
-            <a:ext cx="5157787" cy="3684588"/>
+            <a:off x="2015492" y="6012180"/>
+            <a:ext cx="12378689" cy="8843011"/>
           </a:xfrm>
         </p:spPr>
         <p:txBody>
@@ -1656,18 +1465,13 @@
               <a:rPr lang="en-US"/>
               <a:t>Fifth level</a:t>
             </a:r>
-          </a:p>
-        </p:txBody>
-      </p:sp>
-      <p:sp>
-        <p:nvSpPr>
-          <p:cNvPr id="5" name="Text Placeholder 4">
-            <a:extLst>
-              <a:ext uri="{FF2B5EF4-FFF2-40B4-BE49-F238E27FC236}">
-                <a16:creationId xmlns:a16="http://schemas.microsoft.com/office/drawing/2014/main" id="{AD3F4A93-9041-48AE-9BC1-DC81AF21E4C7}"/>
-              </a:ext>
-            </a:extLst>
-          </p:cNvPr>
+            <a:endParaRPr lang="en-US" dirty="0"/>
+          </a:p>
+        </p:txBody>
+      </p:sp>
+      <p:sp>
+        <p:nvSpPr>
+          <p:cNvPr id="5" name="Text Placeholder 4"/>
           <p:cNvSpPr>
             <a:spLocks noGrp="1"/>
           </p:cNvSpPr>
@@ -1677,8 +1481,8 @@
         </p:nvSpPr>
         <p:spPr>
           <a:xfrm>
-            <a:off x="6172200" y="1681163"/>
-            <a:ext cx="5183188" cy="823912"/>
+            <a:off x="14813280" y="4034791"/>
+            <a:ext cx="12439651" cy="1977389"/>
           </a:xfrm>
         </p:spPr>
         <p:txBody>
@@ -1686,39 +1490,39 @@
           <a:lstStyle>
             <a:lvl1pPr marL="0" indent="0">
               <a:buNone/>
-              <a:defRPr sz="2400" b="1"/>
+              <a:defRPr sz="5760" b="1"/>
             </a:lvl1pPr>
-            <a:lvl2pPr marL="457200" indent="0">
+            <a:lvl2pPr marL="1097280" indent="0">
               <a:buNone/>
-              <a:defRPr sz="2000" b="1"/>
+              <a:defRPr sz="4800" b="1"/>
             </a:lvl2pPr>
-            <a:lvl3pPr marL="914400" indent="0">
+            <a:lvl3pPr marL="2194560" indent="0">
               <a:buNone/>
-              <a:defRPr sz="1800" b="1"/>
+              <a:defRPr sz="4320" b="1"/>
             </a:lvl3pPr>
-            <a:lvl4pPr marL="1371600" indent="0">
+            <a:lvl4pPr marL="3291840" indent="0">
               <a:buNone/>
-              <a:defRPr sz="1600" b="1"/>
+              <a:defRPr sz="3840" b="1"/>
             </a:lvl4pPr>
-            <a:lvl5pPr marL="1828800" indent="0">
+            <a:lvl5pPr marL="4389120" indent="0">
               <a:buNone/>
-              <a:defRPr sz="1600" b="1"/>
+              <a:defRPr sz="3840" b="1"/>
             </a:lvl5pPr>
-            <a:lvl6pPr marL="2286000" indent="0">
+            <a:lvl6pPr marL="5486400" indent="0">
               <a:buNone/>
-              <a:defRPr sz="1600" b="1"/>
+              <a:defRPr sz="3840" b="1"/>
             </a:lvl6pPr>
-            <a:lvl7pPr marL="2743200" indent="0">
+            <a:lvl7pPr marL="6583680" indent="0">
               <a:buNone/>
-              <a:defRPr sz="1600" b="1"/>
+              <a:defRPr sz="3840" b="1"/>
             </a:lvl7pPr>
-            <a:lvl8pPr marL="3200400" indent="0">
+            <a:lvl8pPr marL="7680960" indent="0">
               <a:buNone/>
-              <a:defRPr sz="1600" b="1"/>
+              <a:defRPr sz="3840" b="1"/>
             </a:lvl8pPr>
-            <a:lvl9pPr marL="3657600" indent="0">
+            <a:lvl9pPr marL="8778240" indent="0">
               <a:buNone/>
-              <a:defRPr sz="1600" b="1"/>
+              <a:defRPr sz="3840" b="1"/>
             </a:lvl9pPr>
           </a:lstStyle>
           <a:p>
@@ -1732,13 +1536,7 @@
       </p:sp>
       <p:sp>
         <p:nvSpPr>
-          <p:cNvPr id="6" name="Content Placeholder 5">
-            <a:extLst>
-              <a:ext uri="{FF2B5EF4-FFF2-40B4-BE49-F238E27FC236}">
-                <a16:creationId xmlns:a16="http://schemas.microsoft.com/office/drawing/2014/main" id="{56268956-A14D-4E38-8ED8-158B2CF951E8}"/>
-              </a:ext>
-            </a:extLst>
-          </p:cNvPr>
+          <p:cNvPr id="6" name="Content Placeholder 5"/>
           <p:cNvSpPr>
             <a:spLocks noGrp="1"/>
           </p:cNvSpPr>
@@ -1748,8 +1546,8 @@
         </p:nvSpPr>
         <p:spPr>
           <a:xfrm>
-            <a:off x="6172200" y="2505075"/>
-            <a:ext cx="5183188" cy="3684588"/>
+            <a:off x="14813280" y="6012180"/>
+            <a:ext cx="12439651" cy="8843011"/>
           </a:xfrm>
         </p:spPr>
         <p:txBody>
@@ -1789,18 +1587,13 @@
               <a:rPr lang="en-US"/>
               <a:t>Fifth level</a:t>
             </a:r>
-          </a:p>
-        </p:txBody>
-      </p:sp>
-      <p:sp>
-        <p:nvSpPr>
-          <p:cNvPr id="7" name="Date Placeholder 6">
-            <a:extLst>
-              <a:ext uri="{FF2B5EF4-FFF2-40B4-BE49-F238E27FC236}">
-                <a16:creationId xmlns:a16="http://schemas.microsoft.com/office/drawing/2014/main" id="{E995F463-E92B-4423-B57C-416206D195A9}"/>
-              </a:ext>
-            </a:extLst>
-          </p:cNvPr>
+            <a:endParaRPr lang="en-US" dirty="0"/>
+          </a:p>
+        </p:txBody>
+      </p:sp>
+      <p:sp>
+        <p:nvSpPr>
+          <p:cNvPr id="7" name="Date Placeholder 6"/>
           <p:cNvSpPr>
             <a:spLocks noGrp="1"/>
           </p:cNvSpPr>
@@ -1823,13 +1616,7 @@
       </p:sp>
       <p:sp>
         <p:nvSpPr>
-          <p:cNvPr id="8" name="Footer Placeholder 7">
-            <a:extLst>
-              <a:ext uri="{FF2B5EF4-FFF2-40B4-BE49-F238E27FC236}">
-                <a16:creationId xmlns:a16="http://schemas.microsoft.com/office/drawing/2014/main" id="{918E6489-DFE4-4A20-8BBD-F16FF2512F8D}"/>
-              </a:ext>
-            </a:extLst>
-          </p:cNvPr>
+          <p:cNvPr id="8" name="Footer Placeholder 7"/>
           <p:cNvSpPr>
             <a:spLocks noGrp="1"/>
           </p:cNvSpPr>
@@ -1848,13 +1635,7 @@
       </p:sp>
       <p:sp>
         <p:nvSpPr>
-          <p:cNvPr id="9" name="Slide Number Placeholder 8">
-            <a:extLst>
-              <a:ext uri="{FF2B5EF4-FFF2-40B4-BE49-F238E27FC236}">
-                <a16:creationId xmlns:a16="http://schemas.microsoft.com/office/drawing/2014/main" id="{A635F7C7-B15C-4A37-86A1-901BBC9C03EE}"/>
-              </a:ext>
-            </a:extLst>
-          </p:cNvPr>
+          <p:cNvPr id="9" name="Slide Number Placeholder 8"/>
           <p:cNvSpPr>
             <a:spLocks noGrp="1"/>
           </p:cNvSpPr>
@@ -1878,7 +1659,7 @@
     </p:spTree>
     <p:extLst>
       <p:ext uri="{BB962C8B-B14F-4D97-AF65-F5344CB8AC3E}">
-        <p14:creationId xmlns:p14="http://schemas.microsoft.com/office/powerpoint/2010/main" val="3601680073"/>
+        <p14:creationId xmlns:p14="http://schemas.microsoft.com/office/powerpoint/2010/main" val="3351523399"/>
       </p:ext>
     </p:extLst>
   </p:cSld>
@@ -1907,13 +1688,7 @@
       </p:grpSpPr>
       <p:sp>
         <p:nvSpPr>
-          <p:cNvPr id="2" name="Title 1">
-            <a:extLst>
-              <a:ext uri="{FF2B5EF4-FFF2-40B4-BE49-F238E27FC236}">
-                <a16:creationId xmlns:a16="http://schemas.microsoft.com/office/drawing/2014/main" id="{2A88E433-C3DB-438E-B8A7-B088B5ED71E8}"/>
-              </a:ext>
-            </a:extLst>
-          </p:cNvPr>
+          <p:cNvPr id="2" name="Title 1"/>
           <p:cNvSpPr>
             <a:spLocks noGrp="1"/>
           </p:cNvSpPr>
@@ -1930,18 +1705,13 @@
               <a:rPr lang="en-US"/>
               <a:t>Click to edit Master title style</a:t>
             </a:r>
-          </a:p>
-        </p:txBody>
-      </p:sp>
-      <p:sp>
-        <p:nvSpPr>
-          <p:cNvPr id="3" name="Date Placeholder 2">
-            <a:extLst>
-              <a:ext uri="{FF2B5EF4-FFF2-40B4-BE49-F238E27FC236}">
-                <a16:creationId xmlns:a16="http://schemas.microsoft.com/office/drawing/2014/main" id="{92E95CE3-15B6-4A62-8A7C-095D6C1CE44F}"/>
-              </a:ext>
-            </a:extLst>
-          </p:cNvPr>
+            <a:endParaRPr lang="en-US" dirty="0"/>
+          </a:p>
+        </p:txBody>
+      </p:sp>
+      <p:sp>
+        <p:nvSpPr>
+          <p:cNvPr id="3" name="Date Placeholder 2"/>
           <p:cNvSpPr>
             <a:spLocks noGrp="1"/>
           </p:cNvSpPr>
@@ -1964,13 +1734,7 @@
       </p:sp>
       <p:sp>
         <p:nvSpPr>
-          <p:cNvPr id="4" name="Footer Placeholder 3">
-            <a:extLst>
-              <a:ext uri="{FF2B5EF4-FFF2-40B4-BE49-F238E27FC236}">
-                <a16:creationId xmlns:a16="http://schemas.microsoft.com/office/drawing/2014/main" id="{75D542A6-C39B-46BE-966A-3C2A34DEBE9F}"/>
-              </a:ext>
-            </a:extLst>
-          </p:cNvPr>
+          <p:cNvPr id="4" name="Footer Placeholder 3"/>
           <p:cNvSpPr>
             <a:spLocks noGrp="1"/>
           </p:cNvSpPr>
@@ -1989,13 +1753,7 @@
       </p:sp>
       <p:sp>
         <p:nvSpPr>
-          <p:cNvPr id="5" name="Slide Number Placeholder 4">
-            <a:extLst>
-              <a:ext uri="{FF2B5EF4-FFF2-40B4-BE49-F238E27FC236}">
-                <a16:creationId xmlns:a16="http://schemas.microsoft.com/office/drawing/2014/main" id="{F4056CA6-7DC2-4287-AD7B-AFA69F292DD4}"/>
-              </a:ext>
-            </a:extLst>
-          </p:cNvPr>
+          <p:cNvPr id="5" name="Slide Number Placeholder 4"/>
           <p:cNvSpPr>
             <a:spLocks noGrp="1"/>
           </p:cNvSpPr>
@@ -2019,7 +1777,7 @@
     </p:spTree>
     <p:extLst>
       <p:ext uri="{BB962C8B-B14F-4D97-AF65-F5344CB8AC3E}">
-        <p14:creationId xmlns:p14="http://schemas.microsoft.com/office/powerpoint/2010/main" val="4035880305"/>
+        <p14:creationId xmlns:p14="http://schemas.microsoft.com/office/powerpoint/2010/main" val="3130500208"/>
       </p:ext>
     </p:extLst>
   </p:cSld>
@@ -2048,13 +1806,7 @@
       </p:grpSpPr>
       <p:sp>
         <p:nvSpPr>
-          <p:cNvPr id="2" name="Date Placeholder 1">
-            <a:extLst>
-              <a:ext uri="{FF2B5EF4-FFF2-40B4-BE49-F238E27FC236}">
-                <a16:creationId xmlns:a16="http://schemas.microsoft.com/office/drawing/2014/main" id="{5462805E-13BE-4366-9C03-2ACEFAF4E3E3}"/>
-              </a:ext>
-            </a:extLst>
-          </p:cNvPr>
+          <p:cNvPr id="2" name="Date Placeholder 1"/>
           <p:cNvSpPr>
             <a:spLocks noGrp="1"/>
           </p:cNvSpPr>
@@ -2077,13 +1829,7 @@
       </p:sp>
       <p:sp>
         <p:nvSpPr>
-          <p:cNvPr id="3" name="Footer Placeholder 2">
-            <a:extLst>
-              <a:ext uri="{FF2B5EF4-FFF2-40B4-BE49-F238E27FC236}">
-                <a16:creationId xmlns:a16="http://schemas.microsoft.com/office/drawing/2014/main" id="{10BF0106-DA07-44F3-A37E-B2620A5EA3B7}"/>
-              </a:ext>
-            </a:extLst>
-          </p:cNvPr>
+          <p:cNvPr id="3" name="Footer Placeholder 2"/>
           <p:cNvSpPr>
             <a:spLocks noGrp="1"/>
           </p:cNvSpPr>
@@ -2102,13 +1848,7 @@
       </p:sp>
       <p:sp>
         <p:nvSpPr>
-          <p:cNvPr id="4" name="Slide Number Placeholder 3">
-            <a:extLst>
-              <a:ext uri="{FF2B5EF4-FFF2-40B4-BE49-F238E27FC236}">
-                <a16:creationId xmlns:a16="http://schemas.microsoft.com/office/drawing/2014/main" id="{CE6B7591-12CC-43A9-84F3-E617AA90849A}"/>
-              </a:ext>
-            </a:extLst>
-          </p:cNvPr>
+          <p:cNvPr id="4" name="Slide Number Placeholder 3"/>
           <p:cNvSpPr>
             <a:spLocks noGrp="1"/>
           </p:cNvSpPr>
@@ -2132,7 +1872,7 @@
     </p:spTree>
     <p:extLst>
       <p:ext uri="{BB962C8B-B14F-4D97-AF65-F5344CB8AC3E}">
-        <p14:creationId xmlns:p14="http://schemas.microsoft.com/office/powerpoint/2010/main" val="638477686"/>
+        <p14:creationId xmlns:p14="http://schemas.microsoft.com/office/powerpoint/2010/main" val="344282644"/>
       </p:ext>
     </p:extLst>
   </p:cSld>
@@ -2161,13 +1901,7 @@
       </p:grpSpPr>
       <p:sp>
         <p:nvSpPr>
-          <p:cNvPr id="2" name="Title 1">
-            <a:extLst>
-              <a:ext uri="{FF2B5EF4-FFF2-40B4-BE49-F238E27FC236}">
-                <a16:creationId xmlns:a16="http://schemas.microsoft.com/office/drawing/2014/main" id="{DC473AEC-2C8D-4BEA-AF8D-CD0061F383BA}"/>
-              </a:ext>
-            </a:extLst>
-          </p:cNvPr>
+          <p:cNvPr id="2" name="Title 1"/>
           <p:cNvSpPr>
             <a:spLocks noGrp="1"/>
           </p:cNvSpPr>
@@ -2177,15 +1911,15 @@
         </p:nvSpPr>
         <p:spPr>
           <a:xfrm>
-            <a:off x="839788" y="457200"/>
-            <a:ext cx="3932237" cy="1600200"/>
+            <a:off x="2015492" y="1097280"/>
+            <a:ext cx="9437369" cy="3840480"/>
           </a:xfrm>
         </p:spPr>
         <p:txBody>
           <a:bodyPr anchor="b"/>
           <a:lstStyle>
             <a:lvl1pPr>
-              <a:defRPr sz="3200"/>
+              <a:defRPr sz="7680"/>
             </a:lvl1pPr>
           </a:lstStyle>
           <a:p>
@@ -2193,18 +1927,13 @@
               <a:rPr lang="en-US"/>
               <a:t>Click to edit Master title style</a:t>
             </a:r>
-          </a:p>
-        </p:txBody>
-      </p:sp>
-      <p:sp>
-        <p:nvSpPr>
-          <p:cNvPr id="3" name="Content Placeholder 2">
-            <a:extLst>
-              <a:ext uri="{FF2B5EF4-FFF2-40B4-BE49-F238E27FC236}">
-                <a16:creationId xmlns:a16="http://schemas.microsoft.com/office/drawing/2014/main" id="{6D88BCFF-0E1F-4D7E-9FF8-48B243EEAF35}"/>
-              </a:ext>
-            </a:extLst>
-          </p:cNvPr>
+            <a:endParaRPr lang="en-US" dirty="0"/>
+          </a:p>
+        </p:txBody>
+      </p:sp>
+      <p:sp>
+        <p:nvSpPr>
+          <p:cNvPr id="3" name="Content Placeholder 2"/>
           <p:cNvSpPr>
             <a:spLocks noGrp="1"/>
           </p:cNvSpPr>
@@ -2214,39 +1943,39 @@
         </p:nvSpPr>
         <p:spPr>
           <a:xfrm>
-            <a:off x="5183188" y="987425"/>
-            <a:ext cx="6172200" cy="4873625"/>
+            <a:off x="12439651" y="2369821"/>
+            <a:ext cx="14813280" cy="11696700"/>
           </a:xfrm>
         </p:spPr>
         <p:txBody>
           <a:bodyPr/>
           <a:lstStyle>
             <a:lvl1pPr>
-              <a:defRPr sz="3200"/>
+              <a:defRPr sz="7680"/>
             </a:lvl1pPr>
             <a:lvl2pPr>
-              <a:defRPr sz="2800"/>
+              <a:defRPr sz="6720"/>
             </a:lvl2pPr>
             <a:lvl3pPr>
-              <a:defRPr sz="2400"/>
+              <a:defRPr sz="5760"/>
             </a:lvl3pPr>
             <a:lvl4pPr>
-              <a:defRPr sz="2000"/>
+              <a:defRPr sz="4800"/>
             </a:lvl4pPr>
             <a:lvl5pPr>
-              <a:defRPr sz="2000"/>
+              <a:defRPr sz="4800"/>
             </a:lvl5pPr>
             <a:lvl6pPr>
-              <a:defRPr sz="2000"/>
+              <a:defRPr sz="4800"/>
             </a:lvl6pPr>
             <a:lvl7pPr>
-              <a:defRPr sz="2000"/>
+              <a:defRPr sz="4800"/>
             </a:lvl7pPr>
             <a:lvl8pPr>
-              <a:defRPr sz="2000"/>
+              <a:defRPr sz="4800"/>
             </a:lvl8pPr>
             <a:lvl9pPr>
-              <a:defRPr sz="2000"/>
+              <a:defRPr sz="4800"/>
             </a:lvl9pPr>
           </a:lstStyle>
           <a:p>
@@ -2283,18 +2012,13 @@
               <a:rPr lang="en-US"/>
               <a:t>Fifth level</a:t>
             </a:r>
-          </a:p>
-        </p:txBody>
-      </p:sp>
-      <p:sp>
-        <p:nvSpPr>
-          <p:cNvPr id="4" name="Text Placeholder 3">
-            <a:extLst>
-              <a:ext uri="{FF2B5EF4-FFF2-40B4-BE49-F238E27FC236}">
-                <a16:creationId xmlns:a16="http://schemas.microsoft.com/office/drawing/2014/main" id="{F9041988-A670-4023-9828-8F441F4C672B}"/>
-              </a:ext>
-            </a:extLst>
-          </p:cNvPr>
+            <a:endParaRPr lang="en-US" dirty="0"/>
+          </a:p>
+        </p:txBody>
+      </p:sp>
+      <p:sp>
+        <p:nvSpPr>
+          <p:cNvPr id="4" name="Text Placeholder 3"/>
           <p:cNvSpPr>
             <a:spLocks noGrp="1"/>
           </p:cNvSpPr>
@@ -2304,8 +2028,8 @@
         </p:nvSpPr>
         <p:spPr>
           <a:xfrm>
-            <a:off x="839788" y="2057400"/>
-            <a:ext cx="3932237" cy="3811588"/>
+            <a:off x="2015492" y="4937760"/>
+            <a:ext cx="9437369" cy="9147811"/>
           </a:xfrm>
         </p:spPr>
         <p:txBody>
@@ -2313,39 +2037,39 @@
           <a:lstStyle>
             <a:lvl1pPr marL="0" indent="0">
               <a:buNone/>
-              <a:defRPr sz="1600"/>
+              <a:defRPr sz="3840"/>
             </a:lvl1pPr>
-            <a:lvl2pPr marL="457200" indent="0">
+            <a:lvl2pPr marL="1097280" indent="0">
               <a:buNone/>
-              <a:defRPr sz="1400"/>
+              <a:defRPr sz="3360"/>
             </a:lvl2pPr>
-            <a:lvl3pPr marL="914400" indent="0">
+            <a:lvl3pPr marL="2194560" indent="0">
               <a:buNone/>
-              <a:defRPr sz="1200"/>
+              <a:defRPr sz="2880"/>
             </a:lvl3pPr>
-            <a:lvl4pPr marL="1371600" indent="0">
+            <a:lvl4pPr marL="3291840" indent="0">
               <a:buNone/>
-              <a:defRPr sz="1000"/>
+              <a:defRPr sz="2400"/>
             </a:lvl4pPr>
-            <a:lvl5pPr marL="1828800" indent="0">
+            <a:lvl5pPr marL="4389120" indent="0">
               <a:buNone/>
-              <a:defRPr sz="1000"/>
+              <a:defRPr sz="2400"/>
             </a:lvl5pPr>
-            <a:lvl6pPr marL="2286000" indent="0">
+            <a:lvl6pPr marL="5486400" indent="0">
               <a:buNone/>
-              <a:defRPr sz="1000"/>
+              <a:defRPr sz="2400"/>
             </a:lvl6pPr>
-            <a:lvl7pPr marL="2743200" indent="0">
+            <a:lvl7pPr marL="6583680" indent="0">
               <a:buNone/>
-              <a:defRPr sz="1000"/>
+              <a:defRPr sz="2400"/>
             </a:lvl7pPr>
-            <a:lvl8pPr marL="3200400" indent="0">
+            <a:lvl8pPr marL="7680960" indent="0">
               <a:buNone/>
-              <a:defRPr sz="1000"/>
+              <a:defRPr sz="2400"/>
             </a:lvl8pPr>
-            <a:lvl9pPr marL="3657600" indent="0">
+            <a:lvl9pPr marL="8778240" indent="0">
               <a:buNone/>
-              <a:defRPr sz="1000"/>
+              <a:defRPr sz="2400"/>
             </a:lvl9pPr>
           </a:lstStyle>
           <a:p>
@@ -2359,13 +2083,7 @@
       </p:sp>
       <p:sp>
         <p:nvSpPr>
-          <p:cNvPr id="5" name="Date Placeholder 4">
-            <a:extLst>
-              <a:ext uri="{FF2B5EF4-FFF2-40B4-BE49-F238E27FC236}">
-                <a16:creationId xmlns:a16="http://schemas.microsoft.com/office/drawing/2014/main" id="{51B4C58A-8D30-4C1E-9FC6-4C817528D677}"/>
-              </a:ext>
-            </a:extLst>
-          </p:cNvPr>
+          <p:cNvPr id="5" name="Date Placeholder 4"/>
           <p:cNvSpPr>
             <a:spLocks noGrp="1"/>
           </p:cNvSpPr>
@@ -2388,13 +2106,7 @@
       </p:sp>
       <p:sp>
         <p:nvSpPr>
-          <p:cNvPr id="6" name="Footer Placeholder 5">
-            <a:extLst>
-              <a:ext uri="{FF2B5EF4-FFF2-40B4-BE49-F238E27FC236}">
-                <a16:creationId xmlns:a16="http://schemas.microsoft.com/office/drawing/2014/main" id="{92B7638B-BB61-4383-A4A4-0BDECF75A640}"/>
-              </a:ext>
-            </a:extLst>
-          </p:cNvPr>
+          <p:cNvPr id="6" name="Footer Placeholder 5"/>
           <p:cNvSpPr>
             <a:spLocks noGrp="1"/>
           </p:cNvSpPr>
@@ -2413,13 +2125,7 @@
       </p:sp>
       <p:sp>
         <p:nvSpPr>
-          <p:cNvPr id="7" name="Slide Number Placeholder 6">
-            <a:extLst>
-              <a:ext uri="{FF2B5EF4-FFF2-40B4-BE49-F238E27FC236}">
-                <a16:creationId xmlns:a16="http://schemas.microsoft.com/office/drawing/2014/main" id="{52CE1F80-5075-42B4-B394-4103E40597F7}"/>
-              </a:ext>
-            </a:extLst>
-          </p:cNvPr>
+          <p:cNvPr id="7" name="Slide Number Placeholder 6"/>
           <p:cNvSpPr>
             <a:spLocks noGrp="1"/>
           </p:cNvSpPr>
@@ -2443,7 +2149,7 @@
     </p:spTree>
     <p:extLst>
       <p:ext uri="{BB962C8B-B14F-4D97-AF65-F5344CB8AC3E}">
-        <p14:creationId xmlns:p14="http://schemas.microsoft.com/office/powerpoint/2010/main" val="2199798235"/>
+        <p14:creationId xmlns:p14="http://schemas.microsoft.com/office/powerpoint/2010/main" val="2771446864"/>
       </p:ext>
     </p:extLst>
   </p:cSld>
@@ -2472,13 +2178,7 @@
       </p:grpSpPr>
       <p:sp>
         <p:nvSpPr>
-          <p:cNvPr id="2" name="Title 1">
-            <a:extLst>
-              <a:ext uri="{FF2B5EF4-FFF2-40B4-BE49-F238E27FC236}">
-                <a16:creationId xmlns:a16="http://schemas.microsoft.com/office/drawing/2014/main" id="{070783DD-FE16-46D1-A3C8-4A4830001F92}"/>
-              </a:ext>
-            </a:extLst>
-          </p:cNvPr>
+          <p:cNvPr id="2" name="Title 1"/>
           <p:cNvSpPr>
             <a:spLocks noGrp="1"/>
           </p:cNvSpPr>
@@ -2488,15 +2188,15 @@
         </p:nvSpPr>
         <p:spPr>
           <a:xfrm>
-            <a:off x="839788" y="457200"/>
-            <a:ext cx="3932237" cy="1600200"/>
+            <a:off x="2015492" y="1097280"/>
+            <a:ext cx="9437369" cy="3840480"/>
           </a:xfrm>
         </p:spPr>
         <p:txBody>
           <a:bodyPr anchor="b"/>
           <a:lstStyle>
             <a:lvl1pPr>
-              <a:defRPr sz="3200"/>
+              <a:defRPr sz="7680"/>
             </a:lvl1pPr>
           </a:lstStyle>
           <a:p>
@@ -2504,20 +2204,15 @@
               <a:rPr lang="en-US"/>
               <a:t>Click to edit Master title style</a:t>
             </a:r>
-          </a:p>
-        </p:txBody>
-      </p:sp>
-      <p:sp>
-        <p:nvSpPr>
-          <p:cNvPr id="3" name="Picture Placeholder 2">
-            <a:extLst>
-              <a:ext uri="{FF2B5EF4-FFF2-40B4-BE49-F238E27FC236}">
-                <a16:creationId xmlns:a16="http://schemas.microsoft.com/office/drawing/2014/main" id="{CFB11639-06F4-4170-9287-8313F80FD6AE}"/>
-              </a:ext>
-            </a:extLst>
-          </p:cNvPr>
+            <a:endParaRPr lang="en-US" dirty="0"/>
+          </a:p>
+        </p:txBody>
+      </p:sp>
+      <p:sp>
+        <p:nvSpPr>
+          <p:cNvPr id="3" name="Picture Placeholder 2"/>
           <p:cNvSpPr>
-            <a:spLocks noGrp="1"/>
+            <a:spLocks noGrp="1" noChangeAspect="1"/>
           </p:cNvSpPr>
           <p:nvPr>
             <p:ph type="pic" idx="1"/>
@@ -2525,64 +2220,62 @@
         </p:nvSpPr>
         <p:spPr>
           <a:xfrm>
-            <a:off x="5183188" y="987425"/>
-            <a:ext cx="6172200" cy="4873625"/>
-          </a:xfrm>
-        </p:spPr>
-        <p:txBody>
-          <a:bodyPr/>
+            <a:off x="12439651" y="2369821"/>
+            <a:ext cx="14813280" cy="11696700"/>
+          </a:xfrm>
+        </p:spPr>
+        <p:txBody>
+          <a:bodyPr anchor="t"/>
           <a:lstStyle>
             <a:lvl1pPr marL="0" indent="0">
               <a:buNone/>
-              <a:defRPr sz="3200"/>
+              <a:defRPr sz="7680"/>
             </a:lvl1pPr>
-            <a:lvl2pPr marL="457200" indent="0">
+            <a:lvl2pPr marL="1097280" indent="0">
               <a:buNone/>
-              <a:defRPr sz="2800"/>
+              <a:defRPr sz="6720"/>
             </a:lvl2pPr>
-            <a:lvl3pPr marL="914400" indent="0">
+            <a:lvl3pPr marL="2194560" indent="0">
               <a:buNone/>
-              <a:defRPr sz="2400"/>
+              <a:defRPr sz="5760"/>
             </a:lvl3pPr>
-            <a:lvl4pPr marL="1371600" indent="0">
+            <a:lvl4pPr marL="3291840" indent="0">
               <a:buNone/>
-              <a:defRPr sz="2000"/>
+              <a:defRPr sz="4800"/>
             </a:lvl4pPr>
-            <a:lvl5pPr marL="1828800" indent="0">
+            <a:lvl5pPr marL="4389120" indent="0">
               <a:buNone/>
-              <a:defRPr sz="2000"/>
+              <a:defRPr sz="4800"/>
             </a:lvl5pPr>
-            <a:lvl6pPr marL="2286000" indent="0">
+            <a:lvl6pPr marL="5486400" indent="0">
               <a:buNone/>
-              <a:defRPr sz="2000"/>
+              <a:defRPr sz="4800"/>
             </a:lvl6pPr>
-            <a:lvl7pPr marL="2743200" indent="0">
+            <a:lvl7pPr marL="6583680" indent="0">
               <a:buNone/>
-              <a:defRPr sz="2000"/>
+              <a:defRPr sz="4800"/>
             </a:lvl7pPr>
-            <a:lvl8pPr marL="3200400" indent="0">
+            <a:lvl8pPr marL="7680960" indent="0">
               <a:buNone/>
-              <a:defRPr sz="2000"/>
+              <a:defRPr sz="4800"/>
             </a:lvl8pPr>
-            <a:lvl9pPr marL="3657600" indent="0">
+            <a:lvl9pPr marL="8778240" indent="0">
               <a:buNone/>
-              <a:defRPr sz="2000"/>
+              <a:defRPr sz="4800"/>
             </a:lvl9pPr>
           </a:lstStyle>
           <a:p>
-            <a:endParaRPr lang="en-US"/>
-          </a:p>
-        </p:txBody>
-      </p:sp>
-      <p:sp>
-        <p:nvSpPr>
-          <p:cNvPr id="4" name="Text Placeholder 3">
-            <a:extLst>
-              <a:ext uri="{FF2B5EF4-FFF2-40B4-BE49-F238E27FC236}">
-                <a16:creationId xmlns:a16="http://schemas.microsoft.com/office/drawing/2014/main" id="{C45DA9AE-E8D3-4763-8057-653424D9BADF}"/>
-              </a:ext>
-            </a:extLst>
-          </p:cNvPr>
+            <a:r>
+              <a:rPr lang="en-US"/>
+              <a:t>Click icon to add picture</a:t>
+            </a:r>
+            <a:endParaRPr lang="en-US" dirty="0"/>
+          </a:p>
+        </p:txBody>
+      </p:sp>
+      <p:sp>
+        <p:nvSpPr>
+          <p:cNvPr id="4" name="Text Placeholder 3"/>
           <p:cNvSpPr>
             <a:spLocks noGrp="1"/>
           </p:cNvSpPr>
@@ -2592,8 +2285,8 @@
         </p:nvSpPr>
         <p:spPr>
           <a:xfrm>
-            <a:off x="839788" y="2057400"/>
-            <a:ext cx="3932237" cy="3811588"/>
+            <a:off x="2015492" y="4937760"/>
+            <a:ext cx="9437369" cy="9147811"/>
           </a:xfrm>
         </p:spPr>
         <p:txBody>
@@ -2601,39 +2294,39 @@
           <a:lstStyle>
             <a:lvl1pPr marL="0" indent="0">
               <a:buNone/>
-              <a:defRPr sz="1600"/>
+              <a:defRPr sz="3840"/>
             </a:lvl1pPr>
-            <a:lvl2pPr marL="457200" indent="0">
+            <a:lvl2pPr marL="1097280" indent="0">
               <a:buNone/>
-              <a:defRPr sz="1400"/>
+              <a:defRPr sz="3360"/>
             </a:lvl2pPr>
-            <a:lvl3pPr marL="914400" indent="0">
+            <a:lvl3pPr marL="2194560" indent="0">
               <a:buNone/>
-              <a:defRPr sz="1200"/>
+              <a:defRPr sz="2880"/>
             </a:lvl3pPr>
-            <a:lvl4pPr marL="1371600" indent="0">
+            <a:lvl4pPr marL="3291840" indent="0">
               <a:buNone/>
-              <a:defRPr sz="1000"/>
+              <a:defRPr sz="2400"/>
             </a:lvl4pPr>
-            <a:lvl5pPr marL="1828800" indent="0">
+            <a:lvl5pPr marL="4389120" indent="0">
               <a:buNone/>
-              <a:defRPr sz="1000"/>
+              <a:defRPr sz="2400"/>
             </a:lvl5pPr>
-            <a:lvl6pPr marL="2286000" indent="0">
+            <a:lvl6pPr marL="5486400" indent="0">
               <a:buNone/>
-              <a:defRPr sz="1000"/>
+              <a:defRPr sz="2400"/>
             </a:lvl6pPr>
-            <a:lvl7pPr marL="2743200" indent="0">
+            <a:lvl7pPr marL="6583680" indent="0">
               <a:buNone/>
-              <a:defRPr sz="1000"/>
+              <a:defRPr sz="2400"/>
             </a:lvl7pPr>
-            <a:lvl8pPr marL="3200400" indent="0">
+            <a:lvl8pPr marL="7680960" indent="0">
               <a:buNone/>
-              <a:defRPr sz="1000"/>
+              <a:defRPr sz="2400"/>
             </a:lvl8pPr>
-            <a:lvl9pPr marL="3657600" indent="0">
+            <a:lvl9pPr marL="8778240" indent="0">
               <a:buNone/>
-              <a:defRPr sz="1000"/>
+              <a:defRPr sz="2400"/>
             </a:lvl9pPr>
           </a:lstStyle>
           <a:p>
@@ -2647,13 +2340,7 @@
       </p:sp>
       <p:sp>
         <p:nvSpPr>
-          <p:cNvPr id="5" name="Date Placeholder 4">
-            <a:extLst>
-              <a:ext uri="{FF2B5EF4-FFF2-40B4-BE49-F238E27FC236}">
-                <a16:creationId xmlns:a16="http://schemas.microsoft.com/office/drawing/2014/main" id="{2E4127CD-9BD2-48C9-8CDB-EBD57172FCCF}"/>
-              </a:ext>
-            </a:extLst>
-          </p:cNvPr>
+          <p:cNvPr id="5" name="Date Placeholder 4"/>
           <p:cNvSpPr>
             <a:spLocks noGrp="1"/>
           </p:cNvSpPr>
@@ -2676,13 +2363,7 @@
       </p:sp>
       <p:sp>
         <p:nvSpPr>
-          <p:cNvPr id="6" name="Footer Placeholder 5">
-            <a:extLst>
-              <a:ext uri="{FF2B5EF4-FFF2-40B4-BE49-F238E27FC236}">
-                <a16:creationId xmlns:a16="http://schemas.microsoft.com/office/drawing/2014/main" id="{CACA9027-3C76-4724-BE68-513BD27E8439}"/>
-              </a:ext>
-            </a:extLst>
-          </p:cNvPr>
+          <p:cNvPr id="6" name="Footer Placeholder 5"/>
           <p:cNvSpPr>
             <a:spLocks noGrp="1"/>
           </p:cNvSpPr>
@@ -2701,13 +2382,7 @@
       </p:sp>
       <p:sp>
         <p:nvSpPr>
-          <p:cNvPr id="7" name="Slide Number Placeholder 6">
-            <a:extLst>
-              <a:ext uri="{FF2B5EF4-FFF2-40B4-BE49-F238E27FC236}">
-                <a16:creationId xmlns:a16="http://schemas.microsoft.com/office/drawing/2014/main" id="{B523FB36-A7E1-4A6C-85B0-DA84A520234B}"/>
-              </a:ext>
-            </a:extLst>
-          </p:cNvPr>
+          <p:cNvPr id="7" name="Slide Number Placeholder 6"/>
           <p:cNvSpPr>
             <a:spLocks noGrp="1"/>
           </p:cNvSpPr>
@@ -2731,7 +2406,7 @@
     </p:spTree>
     <p:extLst>
       <p:ext uri="{BB962C8B-B14F-4D97-AF65-F5344CB8AC3E}">
-        <p14:creationId xmlns:p14="http://schemas.microsoft.com/office/powerpoint/2010/main" val="201735534"/>
+        <p14:creationId xmlns:p14="http://schemas.microsoft.com/office/powerpoint/2010/main" val="652136437"/>
       </p:ext>
     </p:extLst>
   </p:cSld>
@@ -2765,13 +2440,7 @@
       </p:grpSpPr>
       <p:sp>
         <p:nvSpPr>
-          <p:cNvPr id="2" name="Title Placeholder 1">
-            <a:extLst>
-              <a:ext uri="{FF2B5EF4-FFF2-40B4-BE49-F238E27FC236}">
-                <a16:creationId xmlns:a16="http://schemas.microsoft.com/office/drawing/2014/main" id="{30B1C63C-5718-401A-BFAA-D85D2A3EDD45}"/>
-              </a:ext>
-            </a:extLst>
-          </p:cNvPr>
+          <p:cNvPr id="2" name="Title Placeholder 1"/>
           <p:cNvSpPr>
             <a:spLocks noGrp="1"/>
           </p:cNvSpPr>
@@ -2781,8 +2450,8 @@
         </p:nvSpPr>
         <p:spPr>
           <a:xfrm>
-            <a:off x="838200" y="365125"/>
-            <a:ext cx="10515600" cy="1325563"/>
+            <a:off x="2011680" y="876301"/>
+            <a:ext cx="25237440" cy="3181351"/>
           </a:xfrm>
           <a:prstGeom prst="rect">
             <a:avLst/>
@@ -2798,18 +2467,13 @@
               <a:rPr lang="en-US"/>
               <a:t>Click to edit Master title style</a:t>
             </a:r>
-          </a:p>
-        </p:txBody>
-      </p:sp>
-      <p:sp>
-        <p:nvSpPr>
-          <p:cNvPr id="3" name="Text Placeholder 2">
-            <a:extLst>
-              <a:ext uri="{FF2B5EF4-FFF2-40B4-BE49-F238E27FC236}">
-                <a16:creationId xmlns:a16="http://schemas.microsoft.com/office/drawing/2014/main" id="{1EDB1D7A-A75E-464D-819F-0CF03E0145C2}"/>
-              </a:ext>
-            </a:extLst>
-          </p:cNvPr>
+            <a:endParaRPr lang="en-US" dirty="0"/>
+          </a:p>
+        </p:txBody>
+      </p:sp>
+      <p:sp>
+        <p:nvSpPr>
+          <p:cNvPr id="3" name="Text Placeholder 2"/>
           <p:cNvSpPr>
             <a:spLocks noGrp="1"/>
           </p:cNvSpPr>
@@ -2819,8 +2483,8 @@
         </p:nvSpPr>
         <p:spPr>
           <a:xfrm>
-            <a:off x="838200" y="1825625"/>
-            <a:ext cx="10515600" cy="4351338"/>
+            <a:off x="2011680" y="4381500"/>
+            <a:ext cx="25237440" cy="10443211"/>
           </a:xfrm>
           <a:prstGeom prst="rect">
             <a:avLst/>
@@ -2865,18 +2529,13 @@
               <a:rPr lang="en-US"/>
               <a:t>Fifth level</a:t>
             </a:r>
-          </a:p>
-        </p:txBody>
-      </p:sp>
-      <p:sp>
-        <p:nvSpPr>
-          <p:cNvPr id="4" name="Date Placeholder 3">
-            <a:extLst>
-              <a:ext uri="{FF2B5EF4-FFF2-40B4-BE49-F238E27FC236}">
-                <a16:creationId xmlns:a16="http://schemas.microsoft.com/office/drawing/2014/main" id="{5F98899A-92CC-4559-9B62-370A2CBE035A}"/>
-              </a:ext>
-            </a:extLst>
-          </p:cNvPr>
+            <a:endParaRPr lang="en-US" dirty="0"/>
+          </a:p>
+        </p:txBody>
+      </p:sp>
+      <p:sp>
+        <p:nvSpPr>
+          <p:cNvPr id="4" name="Date Placeholder 3"/>
           <p:cNvSpPr>
             <a:spLocks noGrp="1"/>
           </p:cNvSpPr>
@@ -2886,8 +2545,8 @@
         </p:nvSpPr>
         <p:spPr>
           <a:xfrm>
-            <a:off x="838200" y="6356350"/>
-            <a:ext cx="2743200" cy="365125"/>
+            <a:off x="2011680" y="15255241"/>
+            <a:ext cx="6583680" cy="876300"/>
           </a:xfrm>
           <a:prstGeom prst="rect">
             <a:avLst/>
@@ -2897,7 +2556,7 @@
           <a:bodyPr vert="horz" lIns="91440" tIns="45720" rIns="91440" bIns="45720" rtlCol="0" anchor="ctr"/>
           <a:lstStyle>
             <a:lvl1pPr algn="l">
-              <a:defRPr sz="1200">
+              <a:defRPr sz="2880">
                 <a:solidFill>
                   <a:schemeClr val="tx1">
                     <a:tint val="75000"/>
@@ -2917,13 +2576,7 @@
       </p:sp>
       <p:sp>
         <p:nvSpPr>
-          <p:cNvPr id="5" name="Footer Placeholder 4">
-            <a:extLst>
-              <a:ext uri="{FF2B5EF4-FFF2-40B4-BE49-F238E27FC236}">
-                <a16:creationId xmlns:a16="http://schemas.microsoft.com/office/drawing/2014/main" id="{B432E1F3-23EF-4A90-997E-1473D5830F0E}"/>
-              </a:ext>
-            </a:extLst>
-          </p:cNvPr>
+          <p:cNvPr id="5" name="Footer Placeholder 4"/>
           <p:cNvSpPr>
             <a:spLocks noGrp="1"/>
           </p:cNvSpPr>
@@ -2933,8 +2586,8 @@
         </p:nvSpPr>
         <p:spPr>
           <a:xfrm>
-            <a:off x="4038600" y="6356350"/>
-            <a:ext cx="4114800" cy="365125"/>
+            <a:off x="9692640" y="15255241"/>
+            <a:ext cx="9875520" cy="876300"/>
           </a:xfrm>
           <a:prstGeom prst="rect">
             <a:avLst/>
@@ -2944,7 +2597,7 @@
           <a:bodyPr vert="horz" lIns="91440" tIns="45720" rIns="91440" bIns="45720" rtlCol="0" anchor="ctr"/>
           <a:lstStyle>
             <a:lvl1pPr algn="ctr">
-              <a:defRPr sz="1200">
+              <a:defRPr sz="2880">
                 <a:solidFill>
                   <a:schemeClr val="tx1">
                     <a:tint val="75000"/>
@@ -2960,13 +2613,7 @@
       </p:sp>
       <p:sp>
         <p:nvSpPr>
-          <p:cNvPr id="6" name="Slide Number Placeholder 5">
-            <a:extLst>
-              <a:ext uri="{FF2B5EF4-FFF2-40B4-BE49-F238E27FC236}">
-                <a16:creationId xmlns:a16="http://schemas.microsoft.com/office/drawing/2014/main" id="{32E87863-941D-41C6-BB96-84D24EAFBF4C}"/>
-              </a:ext>
-            </a:extLst>
-          </p:cNvPr>
+          <p:cNvPr id="6" name="Slide Number Placeholder 5"/>
           <p:cNvSpPr>
             <a:spLocks noGrp="1"/>
           </p:cNvSpPr>
@@ -2976,8 +2623,8 @@
         </p:nvSpPr>
         <p:spPr>
           <a:xfrm>
-            <a:off x="8610600" y="6356350"/>
-            <a:ext cx="2743200" cy="365125"/>
+            <a:off x="20665440" y="15255241"/>
+            <a:ext cx="6583680" cy="876300"/>
           </a:xfrm>
           <a:prstGeom prst="rect">
             <a:avLst/>
@@ -2987,7 +2634,7 @@
           <a:bodyPr vert="horz" lIns="91440" tIns="45720" rIns="91440" bIns="45720" rtlCol="0" anchor="ctr"/>
           <a:lstStyle>
             <a:lvl1pPr algn="r">
-              <a:defRPr sz="1200">
+              <a:defRPr sz="2880">
                 <a:solidFill>
                   <a:schemeClr val="tx1">
                     <a:tint val="75000"/>
@@ -3008,27 +2655,27 @@
     </p:spTree>
     <p:extLst>
       <p:ext uri="{BB962C8B-B14F-4D97-AF65-F5344CB8AC3E}">
-        <p14:creationId xmlns:p14="http://schemas.microsoft.com/office/powerpoint/2010/main" val="3662079535"/>
+        <p14:creationId xmlns:p14="http://schemas.microsoft.com/office/powerpoint/2010/main" val="2759864538"/>
       </p:ext>
     </p:extLst>
   </p:cSld>
   <p:clrMap bg1="lt1" tx1="dk1" bg2="lt2" tx2="dk2" accent1="accent1" accent2="accent2" accent3="accent3" accent4="accent4" accent5="accent5" accent6="accent6" hlink="hlink" folHlink="folHlink"/>
   <p:sldLayoutIdLst>
-    <p:sldLayoutId id="2147483649" r:id="rId1"/>
-    <p:sldLayoutId id="2147483650" r:id="rId2"/>
-    <p:sldLayoutId id="2147483651" r:id="rId3"/>
-    <p:sldLayoutId id="2147483652" r:id="rId4"/>
-    <p:sldLayoutId id="2147483653" r:id="rId5"/>
-    <p:sldLayoutId id="2147483654" r:id="rId6"/>
-    <p:sldLayoutId id="2147483655" r:id="rId7"/>
-    <p:sldLayoutId id="2147483656" r:id="rId8"/>
-    <p:sldLayoutId id="2147483657" r:id="rId9"/>
-    <p:sldLayoutId id="2147483658" r:id="rId10"/>
-    <p:sldLayoutId id="2147483659" r:id="rId11"/>
+    <p:sldLayoutId id="2147483661" r:id="rId1"/>
+    <p:sldLayoutId id="2147483662" r:id="rId2"/>
+    <p:sldLayoutId id="2147483663" r:id="rId3"/>
+    <p:sldLayoutId id="2147483664" r:id="rId4"/>
+    <p:sldLayoutId id="2147483665" r:id="rId5"/>
+    <p:sldLayoutId id="2147483666" r:id="rId6"/>
+    <p:sldLayoutId id="2147483667" r:id="rId7"/>
+    <p:sldLayoutId id="2147483668" r:id="rId8"/>
+    <p:sldLayoutId id="2147483669" r:id="rId9"/>
+    <p:sldLayoutId id="2147483670" r:id="rId10"/>
+    <p:sldLayoutId id="2147483671" r:id="rId11"/>
   </p:sldLayoutIdLst>
   <p:txStyles>
     <p:titleStyle>
-      <a:lvl1pPr algn="l" defTabSz="914400" rtl="0" eaLnBrk="1" latinLnBrk="0" hangingPunct="1">
+      <a:lvl1pPr algn="l" defTabSz="2194560" rtl="0" eaLnBrk="1" latinLnBrk="0" hangingPunct="1">
         <a:lnSpc>
           <a:spcPct val="90000"/>
         </a:lnSpc>
@@ -3036,7 +2683,7 @@
           <a:spcPct val="0"/>
         </a:spcBef>
         <a:buNone/>
-        <a:defRPr sz="4400" kern="1200">
+        <a:defRPr sz="10560" kern="1200">
           <a:solidFill>
             <a:schemeClr val="tx1"/>
           </a:solidFill>
@@ -3047,16 +2694,16 @@
       </a:lvl1pPr>
     </p:titleStyle>
     <p:bodyStyle>
-      <a:lvl1pPr marL="228600" indent="-228600" algn="l" defTabSz="914400" rtl="0" eaLnBrk="1" latinLnBrk="0" hangingPunct="1">
+      <a:lvl1pPr marL="548640" indent="-548640" algn="l" defTabSz="2194560" rtl="0" eaLnBrk="1" latinLnBrk="0" hangingPunct="1">
         <a:lnSpc>
           <a:spcPct val="90000"/>
         </a:lnSpc>
         <a:spcBef>
-          <a:spcPts val="1000"/>
+          <a:spcPts val="2400"/>
         </a:spcBef>
         <a:buFont typeface="Arial" panose="020B0604020202020204" pitchFamily="34" charset="0"/>
         <a:buChar char="•"/>
-        <a:defRPr sz="2800" kern="1200">
+        <a:defRPr sz="6720" kern="1200">
           <a:solidFill>
             <a:schemeClr val="tx1"/>
           </a:solidFill>
@@ -3065,16 +2712,16 @@
           <a:cs typeface="+mn-cs"/>
         </a:defRPr>
       </a:lvl1pPr>
-      <a:lvl2pPr marL="685800" indent="-228600" algn="l" defTabSz="914400" rtl="0" eaLnBrk="1" latinLnBrk="0" hangingPunct="1">
+      <a:lvl2pPr marL="1645920" indent="-548640" algn="l" defTabSz="2194560" rtl="0" eaLnBrk="1" latinLnBrk="0" hangingPunct="1">
         <a:lnSpc>
           <a:spcPct val="90000"/>
         </a:lnSpc>
         <a:spcBef>
-          <a:spcPts val="500"/>
+          <a:spcPts val="1200"/>
         </a:spcBef>
         <a:buFont typeface="Arial" panose="020B0604020202020204" pitchFamily="34" charset="0"/>
         <a:buChar char="•"/>
-        <a:defRPr sz="2400" kern="1200">
+        <a:defRPr sz="5760" kern="1200">
           <a:solidFill>
             <a:schemeClr val="tx1"/>
           </a:solidFill>
@@ -3083,16 +2730,16 @@
           <a:cs typeface="+mn-cs"/>
         </a:defRPr>
       </a:lvl2pPr>
-      <a:lvl3pPr marL="1143000" indent="-228600" algn="l" defTabSz="914400" rtl="0" eaLnBrk="1" latinLnBrk="0" hangingPunct="1">
+      <a:lvl3pPr marL="2743200" indent="-548640" algn="l" defTabSz="2194560" rtl="0" eaLnBrk="1" latinLnBrk="0" hangingPunct="1">
         <a:lnSpc>
           <a:spcPct val="90000"/>
         </a:lnSpc>
         <a:spcBef>
-          <a:spcPts val="500"/>
+          <a:spcPts val="1200"/>
         </a:spcBef>
         <a:buFont typeface="Arial" panose="020B0604020202020204" pitchFamily="34" charset="0"/>
         <a:buChar char="•"/>
-        <a:defRPr sz="2000" kern="1200">
+        <a:defRPr sz="4800" kern="1200">
           <a:solidFill>
             <a:schemeClr val="tx1"/>
           </a:solidFill>
@@ -3101,16 +2748,16 @@
           <a:cs typeface="+mn-cs"/>
         </a:defRPr>
       </a:lvl3pPr>
-      <a:lvl4pPr marL="1600200" indent="-228600" algn="l" defTabSz="914400" rtl="0" eaLnBrk="1" latinLnBrk="0" hangingPunct="1">
+      <a:lvl4pPr marL="3840480" indent="-548640" algn="l" defTabSz="2194560" rtl="0" eaLnBrk="1" latinLnBrk="0" hangingPunct="1">
         <a:lnSpc>
           <a:spcPct val="90000"/>
         </a:lnSpc>
         <a:spcBef>
-          <a:spcPts val="500"/>
+          <a:spcPts val="1200"/>
         </a:spcBef>
         <a:buFont typeface="Arial" panose="020B0604020202020204" pitchFamily="34" charset="0"/>
         <a:buChar char="•"/>
-        <a:defRPr sz="1800" kern="1200">
+        <a:defRPr sz="4320" kern="1200">
           <a:solidFill>
             <a:schemeClr val="tx1"/>
           </a:solidFill>
@@ -3119,16 +2766,16 @@
           <a:cs typeface="+mn-cs"/>
         </a:defRPr>
       </a:lvl4pPr>
-      <a:lvl5pPr marL="2057400" indent="-228600" algn="l" defTabSz="914400" rtl="0" eaLnBrk="1" latinLnBrk="0" hangingPunct="1">
+      <a:lvl5pPr marL="4937760" indent="-548640" algn="l" defTabSz="2194560" rtl="0" eaLnBrk="1" latinLnBrk="0" hangingPunct="1">
         <a:lnSpc>
           <a:spcPct val="90000"/>
         </a:lnSpc>
         <a:spcBef>
-          <a:spcPts val="500"/>
+          <a:spcPts val="1200"/>
         </a:spcBef>
         <a:buFont typeface="Arial" panose="020B0604020202020204" pitchFamily="34" charset="0"/>
         <a:buChar char="•"/>
-        <a:defRPr sz="1800" kern="1200">
+        <a:defRPr sz="4320" kern="1200">
           <a:solidFill>
             <a:schemeClr val="tx1"/>
           </a:solidFill>
@@ -3137,16 +2784,16 @@
           <a:cs typeface="+mn-cs"/>
         </a:defRPr>
       </a:lvl5pPr>
-      <a:lvl6pPr marL="2514600" indent="-228600" algn="l" defTabSz="914400" rtl="0" eaLnBrk="1" latinLnBrk="0" hangingPunct="1">
+      <a:lvl6pPr marL="6035040" indent="-548640" algn="l" defTabSz="2194560" rtl="0" eaLnBrk="1" latinLnBrk="0" hangingPunct="1">
         <a:lnSpc>
           <a:spcPct val="90000"/>
         </a:lnSpc>
         <a:spcBef>
-          <a:spcPts val="500"/>
+          <a:spcPts val="1200"/>
         </a:spcBef>
         <a:buFont typeface="Arial" panose="020B0604020202020204" pitchFamily="34" charset="0"/>
         <a:buChar char="•"/>
-        <a:defRPr sz="1800" kern="1200">
+        <a:defRPr sz="4320" kern="1200">
           <a:solidFill>
             <a:schemeClr val="tx1"/>
           </a:solidFill>
@@ -3155,16 +2802,16 @@
           <a:cs typeface="+mn-cs"/>
         </a:defRPr>
       </a:lvl6pPr>
-      <a:lvl7pPr marL="2971800" indent="-228600" algn="l" defTabSz="914400" rtl="0" eaLnBrk="1" latinLnBrk="0" hangingPunct="1">
+      <a:lvl7pPr marL="7132320" indent="-548640" algn="l" defTabSz="2194560" rtl="0" eaLnBrk="1" latinLnBrk="0" hangingPunct="1">
         <a:lnSpc>
           <a:spcPct val="90000"/>
         </a:lnSpc>
         <a:spcBef>
-          <a:spcPts val="500"/>
+          <a:spcPts val="1200"/>
         </a:spcBef>
         <a:buFont typeface="Arial" panose="020B0604020202020204" pitchFamily="34" charset="0"/>
         <a:buChar char="•"/>
-        <a:defRPr sz="1800" kern="1200">
+        <a:defRPr sz="4320" kern="1200">
           <a:solidFill>
             <a:schemeClr val="tx1"/>
           </a:solidFill>
@@ -3173,16 +2820,16 @@
           <a:cs typeface="+mn-cs"/>
         </a:defRPr>
       </a:lvl7pPr>
-      <a:lvl8pPr marL="3429000" indent="-228600" algn="l" defTabSz="914400" rtl="0" eaLnBrk="1" latinLnBrk="0" hangingPunct="1">
+      <a:lvl8pPr marL="8229600" indent="-548640" algn="l" defTabSz="2194560" rtl="0" eaLnBrk="1" latinLnBrk="0" hangingPunct="1">
         <a:lnSpc>
           <a:spcPct val="90000"/>
         </a:lnSpc>
         <a:spcBef>
-          <a:spcPts val="500"/>
+          <a:spcPts val="1200"/>
         </a:spcBef>
         <a:buFont typeface="Arial" panose="020B0604020202020204" pitchFamily="34" charset="0"/>
         <a:buChar char="•"/>
-        <a:defRPr sz="1800" kern="1200">
+        <a:defRPr sz="4320" kern="1200">
           <a:solidFill>
             <a:schemeClr val="tx1"/>
           </a:solidFill>
@@ -3191,16 +2838,16 @@
           <a:cs typeface="+mn-cs"/>
         </a:defRPr>
       </a:lvl8pPr>
-      <a:lvl9pPr marL="3886200" indent="-228600" algn="l" defTabSz="914400" rtl="0" eaLnBrk="1" latinLnBrk="0" hangingPunct="1">
+      <a:lvl9pPr marL="9326880" indent="-548640" algn="l" defTabSz="2194560" rtl="0" eaLnBrk="1" latinLnBrk="0" hangingPunct="1">
         <a:lnSpc>
           <a:spcPct val="90000"/>
         </a:lnSpc>
         <a:spcBef>
-          <a:spcPts val="500"/>
+          <a:spcPts val="1200"/>
         </a:spcBef>
         <a:buFont typeface="Arial" panose="020B0604020202020204" pitchFamily="34" charset="0"/>
         <a:buChar char="•"/>
-        <a:defRPr sz="1800" kern="1200">
+        <a:defRPr sz="4320" kern="1200">
           <a:solidFill>
             <a:schemeClr val="tx1"/>
           </a:solidFill>
@@ -3214,8 +2861,8 @@
       <a:defPPr>
         <a:defRPr lang="en-US"/>
       </a:defPPr>
-      <a:lvl1pPr marL="0" algn="l" defTabSz="914400" rtl="0" eaLnBrk="1" latinLnBrk="0" hangingPunct="1">
-        <a:defRPr sz="1800" kern="1200">
+      <a:lvl1pPr marL="0" algn="l" defTabSz="2194560" rtl="0" eaLnBrk="1" latinLnBrk="0" hangingPunct="1">
+        <a:defRPr sz="4320" kern="1200">
           <a:solidFill>
             <a:schemeClr val="tx1"/>
           </a:solidFill>
@@ -3224,8 +2871,8 @@
           <a:cs typeface="+mn-cs"/>
         </a:defRPr>
       </a:lvl1pPr>
-      <a:lvl2pPr marL="457200" algn="l" defTabSz="914400" rtl="0" eaLnBrk="1" latinLnBrk="0" hangingPunct="1">
-        <a:defRPr sz="1800" kern="1200">
+      <a:lvl2pPr marL="1097280" algn="l" defTabSz="2194560" rtl="0" eaLnBrk="1" latinLnBrk="0" hangingPunct="1">
+        <a:defRPr sz="4320" kern="1200">
           <a:solidFill>
             <a:schemeClr val="tx1"/>
           </a:solidFill>
@@ -3234,8 +2881,8 @@
           <a:cs typeface="+mn-cs"/>
         </a:defRPr>
       </a:lvl2pPr>
-      <a:lvl3pPr marL="914400" algn="l" defTabSz="914400" rtl="0" eaLnBrk="1" latinLnBrk="0" hangingPunct="1">
-        <a:defRPr sz="1800" kern="1200">
+      <a:lvl3pPr marL="2194560" algn="l" defTabSz="2194560" rtl="0" eaLnBrk="1" latinLnBrk="0" hangingPunct="1">
+        <a:defRPr sz="4320" kern="1200">
           <a:solidFill>
             <a:schemeClr val="tx1"/>
           </a:solidFill>
@@ -3244,8 +2891,8 @@
           <a:cs typeface="+mn-cs"/>
         </a:defRPr>
       </a:lvl3pPr>
-      <a:lvl4pPr marL="1371600" algn="l" defTabSz="914400" rtl="0" eaLnBrk="1" latinLnBrk="0" hangingPunct="1">
-        <a:defRPr sz="1800" kern="1200">
+      <a:lvl4pPr marL="3291840" algn="l" defTabSz="2194560" rtl="0" eaLnBrk="1" latinLnBrk="0" hangingPunct="1">
+        <a:defRPr sz="4320" kern="1200">
           <a:solidFill>
             <a:schemeClr val="tx1"/>
           </a:solidFill>
@@ -3254,8 +2901,8 @@
           <a:cs typeface="+mn-cs"/>
         </a:defRPr>
       </a:lvl4pPr>
-      <a:lvl5pPr marL="1828800" algn="l" defTabSz="914400" rtl="0" eaLnBrk="1" latinLnBrk="0" hangingPunct="1">
-        <a:defRPr sz="1800" kern="1200">
+      <a:lvl5pPr marL="4389120" algn="l" defTabSz="2194560" rtl="0" eaLnBrk="1" latinLnBrk="0" hangingPunct="1">
+        <a:defRPr sz="4320" kern="1200">
           <a:solidFill>
             <a:schemeClr val="tx1"/>
           </a:solidFill>
@@ -3264,8 +2911,8 @@
           <a:cs typeface="+mn-cs"/>
         </a:defRPr>
       </a:lvl5pPr>
-      <a:lvl6pPr marL="2286000" algn="l" defTabSz="914400" rtl="0" eaLnBrk="1" latinLnBrk="0" hangingPunct="1">
-        <a:defRPr sz="1800" kern="1200">
+      <a:lvl6pPr marL="5486400" algn="l" defTabSz="2194560" rtl="0" eaLnBrk="1" latinLnBrk="0" hangingPunct="1">
+        <a:defRPr sz="4320" kern="1200">
           <a:solidFill>
             <a:schemeClr val="tx1"/>
           </a:solidFill>
@@ -3274,8 +2921,8 @@
           <a:cs typeface="+mn-cs"/>
         </a:defRPr>
       </a:lvl6pPr>
-      <a:lvl7pPr marL="2743200" algn="l" defTabSz="914400" rtl="0" eaLnBrk="1" latinLnBrk="0" hangingPunct="1">
-        <a:defRPr sz="1800" kern="1200">
+      <a:lvl7pPr marL="6583680" algn="l" defTabSz="2194560" rtl="0" eaLnBrk="1" latinLnBrk="0" hangingPunct="1">
+        <a:defRPr sz="4320" kern="1200">
           <a:solidFill>
             <a:schemeClr val="tx1"/>
           </a:solidFill>
@@ -3284,8 +2931,8 @@
           <a:cs typeface="+mn-cs"/>
         </a:defRPr>
       </a:lvl7pPr>
-      <a:lvl8pPr marL="3200400" algn="l" defTabSz="914400" rtl="0" eaLnBrk="1" latinLnBrk="0" hangingPunct="1">
-        <a:defRPr sz="1800" kern="1200">
+      <a:lvl8pPr marL="7680960" algn="l" defTabSz="2194560" rtl="0" eaLnBrk="1" latinLnBrk="0" hangingPunct="1">
+        <a:defRPr sz="4320" kern="1200">
           <a:solidFill>
             <a:schemeClr val="tx1"/>
           </a:solidFill>
@@ -3294,8 +2941,8 @@
           <a:cs typeface="+mn-cs"/>
         </a:defRPr>
       </a:lvl8pPr>
-      <a:lvl9pPr marL="3657600" algn="l" defTabSz="914400" rtl="0" eaLnBrk="1" latinLnBrk="0" hangingPunct="1">
-        <a:defRPr sz="1800" kern="1200">
+      <a:lvl9pPr marL="8778240" algn="l" defTabSz="2194560" rtl="0" eaLnBrk="1" latinLnBrk="0" hangingPunct="1">
+        <a:defRPr sz="4320" kern="1200">
           <a:solidFill>
             <a:schemeClr val="tx1"/>
           </a:solidFill>
@@ -3340,8 +2987,8 @@
         </p:nvSpPr>
         <p:spPr>
           <a:xfrm>
-            <a:off x="5478234" y="4278085"/>
-            <a:ext cx="693965" cy="246221"/>
+            <a:off x="12348042" y="9099093"/>
+            <a:ext cx="1284820" cy="400110"/>
           </a:xfrm>
           <a:prstGeom prst="rect">
             <a:avLst/>
@@ -3360,7 +3007,7 @@
           <a:lstStyle/>
           <a:p>
             <a:r>
-              <a:rPr lang="en-US" sz="1000" dirty="0"/>
+              <a:rPr lang="en-US" sz="2000" dirty="0"/>
               <a:t>Main Hall</a:t>
             </a:r>
           </a:p>
@@ -3380,8 +3027,8 @@
         </p:nvSpPr>
         <p:spPr>
           <a:xfrm>
-            <a:off x="5505448" y="3765096"/>
-            <a:ext cx="693965" cy="246221"/>
+            <a:off x="12398426" y="8183187"/>
+            <a:ext cx="1284820" cy="400110"/>
           </a:xfrm>
           <a:prstGeom prst="rect">
             <a:avLst/>
@@ -3400,7 +3047,7 @@
           <a:lstStyle/>
           <a:p>
             <a:r>
-              <a:rPr lang="en-US" sz="1000" dirty="0"/>
+              <a:rPr lang="en-US" sz="2000" dirty="0"/>
               <a:t>Upstairs</a:t>
             </a:r>
           </a:p>
@@ -3420,8 +3067,8 @@
         </p:nvSpPr>
         <p:spPr>
           <a:xfrm>
-            <a:off x="7956092" y="3767817"/>
-            <a:ext cx="693965" cy="246221"/>
+            <a:off x="16935597" y="8188045"/>
+            <a:ext cx="1284820" cy="400110"/>
           </a:xfrm>
           <a:prstGeom prst="rect">
             <a:avLst/>
@@ -3440,7 +3087,7 @@
           <a:lstStyle/>
           <a:p>
             <a:r>
-              <a:rPr lang="en-US" sz="1000" dirty="0"/>
+              <a:rPr lang="en-US" sz="2000" dirty="0"/>
               <a:t>Corridor</a:t>
             </a:r>
           </a:p>
@@ -3460,8 +3107,8 @@
         </p:nvSpPr>
         <p:spPr>
           <a:xfrm>
-            <a:off x="5630629" y="2517610"/>
-            <a:ext cx="1145721" cy="246221"/>
+            <a:off x="12630189" y="5955888"/>
+            <a:ext cx="2121210" cy="400110"/>
           </a:xfrm>
           <a:prstGeom prst="rect">
             <a:avLst/>
@@ -3480,7 +3127,7 @@
           <a:lstStyle/>
           <a:p>
             <a:r>
-              <a:rPr lang="en-US" sz="1000" dirty="0"/>
+              <a:rPr lang="en-US" sz="2000" dirty="0"/>
               <a:t>Tentacles corridor</a:t>
             </a:r>
           </a:p>
@@ -3500,8 +3147,8 @@
         </p:nvSpPr>
         <p:spPr>
           <a:xfrm>
-            <a:off x="7736114" y="1661586"/>
-            <a:ext cx="1055915" cy="246221"/>
+            <a:off x="16528325" y="4427518"/>
+            <a:ext cx="1954942" cy="400110"/>
           </a:xfrm>
           <a:prstGeom prst="rect">
             <a:avLst/>
@@ -3520,7 +3167,7 @@
           <a:lstStyle/>
           <a:p>
             <a:r>
-              <a:rPr lang="en-US" sz="1000" dirty="0"/>
+              <a:rPr lang="en-US" sz="2000" dirty="0"/>
               <a:t>Humans corridor</a:t>
             </a:r>
           </a:p>
@@ -3540,8 +3187,8 @@
         </p:nvSpPr>
         <p:spPr>
           <a:xfrm>
-            <a:off x="5421085" y="4835978"/>
-            <a:ext cx="751114" cy="246221"/>
+            <a:off x="12242234" y="10095171"/>
+            <a:ext cx="1390628" cy="400110"/>
           </a:xfrm>
           <a:prstGeom prst="rect">
             <a:avLst/>
@@ -3560,7 +3207,7 @@
           <a:lstStyle/>
           <a:p>
             <a:r>
-              <a:rPr lang="en-US" sz="1000" dirty="0"/>
+              <a:rPr lang="en-US" sz="2000" dirty="0"/>
               <a:t>Front door</a:t>
             </a:r>
           </a:p>
@@ -3580,8 +3227,8 @@
         </p:nvSpPr>
         <p:spPr>
           <a:xfrm>
-            <a:off x="6701516" y="4835978"/>
-            <a:ext cx="693965" cy="246221"/>
+            <a:off x="14612850" y="10095171"/>
+            <a:ext cx="1284820" cy="400110"/>
           </a:xfrm>
           <a:prstGeom prst="rect">
             <a:avLst/>
@@ -3600,7 +3247,7 @@
           <a:lstStyle/>
           <a:p>
             <a:r>
-              <a:rPr lang="en-US" sz="1000" dirty="0"/>
+              <a:rPr lang="en-US" sz="2000" dirty="0"/>
               <a:t>Start area</a:t>
             </a:r>
           </a:p>
@@ -3623,8 +3270,8 @@
         </p:nvCxnSpPr>
         <p:spPr>
           <a:xfrm rot="10800000">
-            <a:off x="6203490" y="2763832"/>
-            <a:ext cx="1752602" cy="1127097"/>
+            <a:off x="13690795" y="6355998"/>
+            <a:ext cx="3244803" cy="2032102"/>
           </a:xfrm>
           <a:prstGeom prst="curvedConnector2">
             <a:avLst/>
@@ -3663,12 +3310,12 @@
         </p:nvCxnSpPr>
         <p:spPr>
           <a:xfrm rot="16200000" flipH="1">
-            <a:off x="7076392" y="2541134"/>
-            <a:ext cx="2721" cy="2450644"/>
+            <a:off x="15306992" y="5917031"/>
+            <a:ext cx="4858" cy="4537171"/>
           </a:xfrm>
           <a:prstGeom prst="curvedConnector3">
             <a:avLst>
-              <a:gd name="adj1" fmla="val -8401323"/>
+              <a:gd name="adj1" fmla="val -4705640"/>
             </a:avLst>
           </a:prstGeom>
         </p:spPr>
@@ -3704,8 +3351,8 @@
         </p:nvCxnSpPr>
         <p:spPr>
           <a:xfrm flipV="1">
-            <a:off x="5825217" y="4011317"/>
-            <a:ext cx="27214" cy="266768"/>
+            <a:off x="12990452" y="8583297"/>
+            <a:ext cx="50384" cy="515796"/>
           </a:xfrm>
           <a:prstGeom prst="line">
             <a:avLst/>
@@ -3743,8 +3390,8 @@
         </p:nvCxnSpPr>
         <p:spPr>
           <a:xfrm flipH="1">
-            <a:off x="6172199" y="4959089"/>
-            <a:ext cx="529317" cy="0"/>
+            <a:off x="13632862" y="10295225"/>
+            <a:ext cx="979988" cy="0"/>
           </a:xfrm>
           <a:prstGeom prst="line">
             <a:avLst/>
@@ -3782,8 +3429,8 @@
         </p:nvCxnSpPr>
         <p:spPr>
           <a:xfrm flipV="1">
-            <a:off x="5796642" y="4524306"/>
-            <a:ext cx="28575" cy="311672"/>
+            <a:off x="12937548" y="9499203"/>
+            <a:ext cx="52904" cy="595968"/>
           </a:xfrm>
           <a:prstGeom prst="line">
             <a:avLst/>
@@ -3818,8 +3465,8 @@
         </p:nvSpPr>
         <p:spPr>
           <a:xfrm>
-            <a:off x="8740308" y="2539313"/>
-            <a:ext cx="1055915" cy="246221"/>
+            <a:off x="18387509" y="5994638"/>
+            <a:ext cx="1954942" cy="400110"/>
           </a:xfrm>
           <a:prstGeom prst="rect">
             <a:avLst/>
@@ -3838,7 +3485,7 @@
           <a:lstStyle/>
           <a:p>
             <a:r>
-              <a:rPr lang="en-US" sz="1000" dirty="0"/>
+              <a:rPr lang="en-US" sz="2000" dirty="0"/>
               <a:t>Suites corridor</a:t>
             </a:r>
           </a:p>
@@ -3861,8 +3508,8 @@
         </p:nvCxnSpPr>
         <p:spPr>
           <a:xfrm flipV="1">
-            <a:off x="8650057" y="2785534"/>
-            <a:ext cx="618209" cy="1105394"/>
+            <a:off x="18220417" y="6394748"/>
+            <a:ext cx="1144563" cy="1993352"/>
           </a:xfrm>
           <a:prstGeom prst="line">
             <a:avLst/>
@@ -3912,8 +3559,8 @@
         </p:blipFill>
         <p:spPr bwMode="auto">
           <a:xfrm>
-            <a:off x="9585244" y="2561016"/>
-            <a:ext cx="202815" cy="202815"/>
+            <a:off x="19951841" y="6033388"/>
+            <a:ext cx="375496" cy="362112"/>
           </a:xfrm>
           <a:prstGeom prst="rect">
             <a:avLst/>
@@ -3948,8 +3595,8 @@
         </p:nvCxnSpPr>
         <p:spPr>
           <a:xfrm flipH="1" flipV="1">
-            <a:off x="8264072" y="1907807"/>
-            <a:ext cx="476236" cy="754617"/>
+            <a:off x="17505796" y="4827628"/>
+            <a:ext cx="881713" cy="1367065"/>
           </a:xfrm>
           <a:prstGeom prst="line">
             <a:avLst/>
@@ -3984,8 +3631,8 @@
         </p:nvSpPr>
         <p:spPr>
           <a:xfrm>
-            <a:off x="4444091" y="4278085"/>
-            <a:ext cx="693965" cy="246221"/>
+            <a:off x="10433409" y="9099093"/>
+            <a:ext cx="1284820" cy="400110"/>
           </a:xfrm>
           <a:prstGeom prst="rect">
             <a:avLst/>
@@ -4004,7 +3651,7 @@
           <a:lstStyle/>
           <a:p>
             <a:r>
-              <a:rPr lang="en-US" sz="1000" dirty="0"/>
+              <a:rPr lang="en-US" sz="2000" dirty="0"/>
               <a:t>Kitchen</a:t>
             </a:r>
           </a:p>
@@ -4027,8 +3674,8 @@
         </p:nvCxnSpPr>
         <p:spPr>
           <a:xfrm flipH="1">
-            <a:off x="5138056" y="4401196"/>
-            <a:ext cx="340178" cy="0"/>
+            <a:off x="11718229" y="9299148"/>
+            <a:ext cx="629813" cy="0"/>
           </a:xfrm>
           <a:prstGeom prst="line">
             <a:avLst/>
@@ -4063,8 +3710,8 @@
         </p:nvSpPr>
         <p:spPr>
           <a:xfrm>
-            <a:off x="3690259" y="1947333"/>
-            <a:ext cx="693965" cy="246221"/>
+            <a:off x="9037749" y="4937699"/>
+            <a:ext cx="1284820" cy="400110"/>
           </a:xfrm>
           <a:prstGeom prst="rect">
             <a:avLst/>
@@ -4083,7 +3730,7 @@
           <a:lstStyle/>
           <a:p>
             <a:r>
-              <a:rPr lang="en-US" sz="1000" dirty="0"/>
+              <a:rPr lang="en-US" sz="2000" dirty="0"/>
               <a:t>Green</a:t>
             </a:r>
           </a:p>
@@ -4103,8 +3750,8 @@
         </p:nvSpPr>
         <p:spPr>
           <a:xfrm>
-            <a:off x="5278212" y="1934153"/>
-            <a:ext cx="693965" cy="246221"/>
+            <a:off x="11977717" y="4914168"/>
+            <a:ext cx="1284820" cy="400110"/>
           </a:xfrm>
           <a:prstGeom prst="rect">
             <a:avLst/>
@@ -4123,7 +3770,7 @@
           <a:lstStyle/>
           <a:p>
             <a:r>
-              <a:rPr lang="en-US" sz="1000" dirty="0"/>
+              <a:rPr lang="en-US" sz="2000" dirty="0"/>
               <a:t>Blue</a:t>
             </a:r>
           </a:p>
@@ -4143,8 +3790,8 @@
         </p:nvSpPr>
         <p:spPr>
           <a:xfrm>
-            <a:off x="4517573" y="1943678"/>
-            <a:ext cx="693965" cy="246221"/>
+            <a:off x="10569454" y="4931174"/>
+            <a:ext cx="1284820" cy="400110"/>
           </a:xfrm>
           <a:prstGeom prst="rect">
             <a:avLst/>
@@ -4163,7 +3810,7 @@
           <a:lstStyle/>
           <a:p>
             <a:r>
-              <a:rPr lang="en-US" sz="1000" dirty="0"/>
+              <a:rPr lang="en-US" sz="2000" dirty="0"/>
               <a:t>Purple</a:t>
             </a:r>
           </a:p>
@@ -4187,8 +3834,8 @@
         </p:nvCxnSpPr>
         <p:spPr>
           <a:xfrm flipH="1" flipV="1">
-            <a:off x="4037242" y="2193554"/>
-            <a:ext cx="2166248" cy="324056"/>
+            <a:off x="9680159" y="5337809"/>
+            <a:ext cx="4010635" cy="618079"/>
           </a:xfrm>
           <a:prstGeom prst="line">
             <a:avLst/>
@@ -4226,8 +3873,8 @@
         </p:nvCxnSpPr>
         <p:spPr>
           <a:xfrm flipH="1" flipV="1">
-            <a:off x="4864556" y="2189899"/>
-            <a:ext cx="1338934" cy="327711"/>
+            <a:off x="11211864" y="5331284"/>
+            <a:ext cx="2478930" cy="624604"/>
           </a:xfrm>
           <a:prstGeom prst="line">
             <a:avLst/>
@@ -4266,8 +3913,8 @@
         </p:nvCxnSpPr>
         <p:spPr>
           <a:xfrm flipH="1" flipV="1">
-            <a:off x="5625195" y="2180374"/>
-            <a:ext cx="578295" cy="337236"/>
+            <a:off x="12620127" y="5314278"/>
+            <a:ext cx="1070667" cy="641610"/>
           </a:xfrm>
           <a:prstGeom prst="line">
             <a:avLst/>
@@ -4302,8 +3949,8 @@
         </p:nvSpPr>
         <p:spPr>
           <a:xfrm>
-            <a:off x="3254828" y="4278085"/>
-            <a:ext cx="853168" cy="246221"/>
+            <a:off x="8231583" y="9099093"/>
+            <a:ext cx="1579572" cy="400110"/>
           </a:xfrm>
           <a:prstGeom prst="rect">
             <a:avLst/>
@@ -4322,7 +3969,7 @@
           <a:lstStyle/>
           <a:p>
             <a:r>
-              <a:rPr lang="en-US" sz="1000" dirty="0"/>
+              <a:rPr lang="en-US" sz="2000" dirty="0"/>
               <a:t>Dining room</a:t>
             </a:r>
           </a:p>
@@ -4345,8 +3992,8 @@
         </p:nvCxnSpPr>
         <p:spPr>
           <a:xfrm flipH="1">
-            <a:off x="4107996" y="4401196"/>
-            <a:ext cx="336095" cy="0"/>
+            <a:off x="9811155" y="9299148"/>
+            <a:ext cx="622254" cy="0"/>
           </a:xfrm>
           <a:prstGeom prst="line">
             <a:avLst/>
@@ -4381,8 +4028,8 @@
         </p:nvSpPr>
         <p:spPr>
           <a:xfrm>
-            <a:off x="2095498" y="4278084"/>
-            <a:ext cx="930729" cy="246221"/>
+            <a:off x="6085177" y="9099091"/>
+            <a:ext cx="1723170" cy="400110"/>
           </a:xfrm>
           <a:prstGeom prst="rect">
             <a:avLst/>
@@ -4401,7 +4048,7 @@
           <a:lstStyle/>
           <a:p>
             <a:r>
-              <a:rPr lang="en-US" sz="1000" dirty="0"/>
+              <a:rPr lang="en-US" sz="2000" dirty="0"/>
               <a:t>Service room</a:t>
             </a:r>
           </a:p>
@@ -4424,8 +4071,8 @@
         </p:nvCxnSpPr>
         <p:spPr>
           <a:xfrm flipH="1" flipV="1">
-            <a:off x="3026227" y="4401195"/>
-            <a:ext cx="228601" cy="1"/>
+            <a:off x="7808347" y="9299146"/>
+            <a:ext cx="423236" cy="2"/>
           </a:xfrm>
           <a:prstGeom prst="line">
             <a:avLst/>
@@ -4460,8 +4107,8 @@
         </p:nvSpPr>
         <p:spPr>
           <a:xfrm>
-            <a:off x="7173228" y="1006727"/>
-            <a:ext cx="693964" cy="246221"/>
+            <a:off x="15486186" y="3258314"/>
+            <a:ext cx="1284819" cy="400110"/>
           </a:xfrm>
           <a:prstGeom prst="rect">
             <a:avLst/>
@@ -4480,7 +4127,7 @@
           <a:lstStyle/>
           <a:p>
             <a:r>
-              <a:rPr lang="en-US" sz="1000" dirty="0"/>
+              <a:rPr lang="en-US" sz="2000" dirty="0"/>
               <a:t>Ed Room</a:t>
             </a:r>
           </a:p>
@@ -4503,8 +4150,8 @@
         </p:nvCxnSpPr>
         <p:spPr>
           <a:xfrm>
-            <a:off x="7520210" y="1252948"/>
-            <a:ext cx="709841" cy="404657"/>
+            <a:off x="16128596" y="3658424"/>
+            <a:ext cx="1314213" cy="761987"/>
           </a:xfrm>
           <a:prstGeom prst="line">
             <a:avLst/>
@@ -4553,8 +4200,8 @@
         </p:blipFill>
         <p:spPr>
           <a:xfrm>
-            <a:off x="7708671" y="1044336"/>
-            <a:ext cx="158521" cy="158521"/>
+            <a:off x="16477517" y="3325463"/>
+            <a:ext cx="293489" cy="283028"/>
           </a:xfrm>
           <a:prstGeom prst="rect">
             <a:avLst/>
@@ -4575,8 +4222,8 @@
         </p:nvSpPr>
         <p:spPr>
           <a:xfrm>
-            <a:off x="3492951" y="5401319"/>
-            <a:ext cx="951140" cy="246221"/>
+            <a:off x="8672448" y="11104548"/>
+            <a:ext cx="1760959" cy="400110"/>
           </a:xfrm>
           <a:prstGeom prst="rect">
             <a:avLst/>
@@ -4595,10 +4242,10 @@
           <a:lstStyle/>
           <a:p>
             <a:r>
-              <a:rPr lang="en-US" sz="1000" dirty="0" err="1"/>
+              <a:rPr lang="en-US" sz="2000" dirty="0" err="1"/>
               <a:t>Underpassage</a:t>
             </a:r>
-            <a:endParaRPr lang="en-US" sz="1000" dirty="0"/>
+            <a:endParaRPr lang="en-US" sz="2000" dirty="0"/>
           </a:p>
         </p:txBody>
       </p:sp>
@@ -4616,8 +4263,8 @@
         </p:nvSpPr>
         <p:spPr>
           <a:xfrm>
-            <a:off x="6199413" y="5401320"/>
-            <a:ext cx="751114" cy="246221"/>
+            <a:off x="13683245" y="11104549"/>
+            <a:ext cx="1390628" cy="400110"/>
           </a:xfrm>
           <a:prstGeom prst="rect">
             <a:avLst/>
@@ -4636,7 +4283,7 @@
           <a:lstStyle/>
           <a:p>
             <a:r>
-              <a:rPr lang="en-US" sz="1000" dirty="0"/>
+              <a:rPr lang="en-US" sz="2000" dirty="0"/>
               <a:t>Basement</a:t>
             </a:r>
           </a:p>
@@ -4656,8 +4303,8 @@
         </p:nvSpPr>
         <p:spPr>
           <a:xfrm>
-            <a:off x="5138056" y="5391861"/>
-            <a:ext cx="751114" cy="246221"/>
+            <a:off x="11718228" y="11087661"/>
+            <a:ext cx="1390628" cy="400110"/>
           </a:xfrm>
           <a:prstGeom prst="rect">
             <a:avLst/>
@@ -4676,7 +4323,7 @@
           <a:lstStyle/>
           <a:p>
             <a:r>
-              <a:rPr lang="en-US" sz="1000" dirty="0"/>
+              <a:rPr lang="en-US" sz="2000" dirty="0"/>
               <a:t>Dungeon</a:t>
             </a:r>
           </a:p>
@@ -4700,8 +4347,8 @@
         </p:nvCxnSpPr>
         <p:spPr>
           <a:xfrm flipV="1">
-            <a:off x="3968521" y="4959089"/>
-            <a:ext cx="1452564" cy="442230"/>
+            <a:off x="9552928" y="10295225"/>
+            <a:ext cx="2689306" cy="809322"/>
           </a:xfrm>
           <a:prstGeom prst="line">
             <a:avLst/>
@@ -4740,8 +4387,8 @@
         </p:nvCxnSpPr>
         <p:spPr>
           <a:xfrm flipH="1" flipV="1">
-            <a:off x="5889170" y="5514972"/>
-            <a:ext cx="310243" cy="9459"/>
+            <a:off x="13108856" y="11287716"/>
+            <a:ext cx="574389" cy="16889"/>
           </a:xfrm>
           <a:prstGeom prst="line">
             <a:avLst/>
@@ -4776,8 +4423,8 @@
         </p:nvSpPr>
         <p:spPr>
           <a:xfrm>
-            <a:off x="8045445" y="996002"/>
-            <a:ext cx="789213" cy="246221"/>
+            <a:off x="17101026" y="3239165"/>
+            <a:ext cx="1461164" cy="400110"/>
           </a:xfrm>
           <a:prstGeom prst="rect">
             <a:avLst/>
@@ -4796,11 +4443,11 @@
           <a:lstStyle/>
           <a:p>
             <a:r>
-              <a:rPr lang="en-US" sz="1000" dirty="0" err="1"/>
+              <a:rPr lang="en-US" sz="2000" dirty="0" err="1"/>
               <a:t>Tmp</a:t>
             </a:r>
             <a:r>
-              <a:rPr lang="en-US" sz="1000" dirty="0"/>
+              <a:rPr lang="en-US" sz="2000" dirty="0"/>
               <a:t> Room</a:t>
             </a:r>
           </a:p>
@@ -4824,8 +4471,8 @@
         </p:nvCxnSpPr>
         <p:spPr>
           <a:xfrm flipH="1">
-            <a:off x="8264072" y="1242223"/>
-            <a:ext cx="175980" cy="419363"/>
+            <a:off x="17505796" y="3639275"/>
+            <a:ext cx="325812" cy="788243"/>
           </a:xfrm>
           <a:prstGeom prst="line">
             <a:avLst/>
@@ -4864,12 +4511,12 @@
         </p:nvCxnSpPr>
         <p:spPr>
           <a:xfrm rot="16200000" flipH="1">
-            <a:off x="5761586" y="4587936"/>
-            <a:ext cx="877014" cy="749753"/>
+            <a:off x="12881832" y="9607822"/>
+            <a:ext cx="1605347" cy="1388107"/>
           </a:xfrm>
           <a:prstGeom prst="curvedConnector3">
             <a:avLst>
-              <a:gd name="adj1" fmla="val 20211"/>
+              <a:gd name="adj1" fmla="val 50000"/>
             </a:avLst>
           </a:prstGeom>
         </p:spPr>
@@ -4902,8 +4549,8 @@
         </p:nvSpPr>
         <p:spPr>
           <a:xfrm>
-            <a:off x="5555122" y="3190191"/>
-            <a:ext cx="693965" cy="246221"/>
+            <a:off x="12490393" y="7156735"/>
+            <a:ext cx="1284820" cy="400110"/>
           </a:xfrm>
           <a:prstGeom prst="rect">
             <a:avLst/>
@@ -4922,7 +4569,7 @@
           <a:lstStyle/>
           <a:p>
             <a:r>
-              <a:rPr lang="en-US" sz="1000" dirty="0"/>
+              <a:rPr lang="en-US" sz="2000" dirty="0"/>
               <a:t>?</a:t>
             </a:r>
           </a:p>
@@ -4942,8 +4589,8 @@
         </p:nvSpPr>
         <p:spPr>
           <a:xfrm>
-            <a:off x="4450276" y="3190191"/>
-            <a:ext cx="693965" cy="246221"/>
+            <a:off x="10444860" y="7156735"/>
+            <a:ext cx="1284820" cy="400110"/>
           </a:xfrm>
           <a:prstGeom prst="rect">
             <a:avLst/>
@@ -4962,7 +4609,7 @@
           <a:lstStyle/>
           <a:p>
             <a:r>
-              <a:rPr lang="en-US" sz="1000" dirty="0"/>
+              <a:rPr lang="en-US" sz="2000" dirty="0"/>
               <a:t>Art Room</a:t>
             </a:r>
           </a:p>
@@ -4982,8 +4629,8 @@
         </p:nvSpPr>
         <p:spPr>
           <a:xfrm>
-            <a:off x="3313679" y="3190191"/>
-            <a:ext cx="789212" cy="246221"/>
+            <a:off x="8340541" y="7156735"/>
+            <a:ext cx="1461163" cy="400110"/>
           </a:xfrm>
           <a:prstGeom prst="rect">
             <a:avLst/>
@@ -5002,7 +4649,7 @@
           <a:lstStyle/>
           <a:p>
             <a:r>
-              <a:rPr lang="en-US" sz="1000" dirty="0"/>
+              <a:rPr lang="en-US" sz="2000" dirty="0"/>
               <a:t>Tech Room</a:t>
             </a:r>
           </a:p>
@@ -5026,8 +4673,8 @@
         </p:nvCxnSpPr>
         <p:spPr>
           <a:xfrm>
-            <a:off x="4797259" y="3436412"/>
-            <a:ext cx="1055172" cy="328684"/>
+            <a:off x="11087270" y="7556845"/>
+            <a:ext cx="1953566" cy="626342"/>
           </a:xfrm>
           <a:prstGeom prst="line">
             <a:avLst/>
@@ -5065,8 +4712,8 @@
         </p:nvCxnSpPr>
         <p:spPr>
           <a:xfrm>
-            <a:off x="5902105" y="3436412"/>
-            <a:ext cx="135468" cy="325165"/>
+            <a:off x="13132803" y="7556845"/>
+            <a:ext cx="250809" cy="620059"/>
           </a:xfrm>
           <a:prstGeom prst="line">
             <a:avLst/>
@@ -5104,8 +4751,8 @@
         </p:nvCxnSpPr>
         <p:spPr>
           <a:xfrm flipH="1" flipV="1">
-            <a:off x="3708285" y="3436412"/>
-            <a:ext cx="1844306" cy="328686"/>
+            <a:off x="9071123" y="7556845"/>
+            <a:ext cx="3414584" cy="626346"/>
           </a:xfrm>
           <a:prstGeom prst="line">
             <a:avLst/>
@@ -5140,8 +4787,8 @@
         </p:nvSpPr>
         <p:spPr>
           <a:xfrm>
-            <a:off x="7071554" y="4283523"/>
-            <a:ext cx="749754" cy="246221"/>
+            <a:off x="15297944" y="9108802"/>
+            <a:ext cx="1388110" cy="400110"/>
           </a:xfrm>
           <a:prstGeom prst="rect">
             <a:avLst/>
@@ -5160,7 +4807,7 @@
           <a:lstStyle/>
           <a:p>
             <a:r>
-              <a:rPr lang="en-US" sz="1000" dirty="0"/>
+              <a:rPr lang="en-US" sz="2000" dirty="0"/>
               <a:t>Music Hall</a:t>
             </a:r>
           </a:p>
@@ -5184,8 +4831,8 @@
         </p:nvCxnSpPr>
         <p:spPr>
           <a:xfrm flipH="1" flipV="1">
-            <a:off x="6172199" y="4401196"/>
-            <a:ext cx="899355" cy="5438"/>
+            <a:off x="13632862" y="9299148"/>
+            <a:ext cx="1665082" cy="9709"/>
           </a:xfrm>
           <a:prstGeom prst="line">
             <a:avLst/>
@@ -5220,8 +4867,8 @@
         </p:nvSpPr>
         <p:spPr>
           <a:xfrm>
-            <a:off x="8715676" y="4281189"/>
-            <a:ext cx="693965" cy="246221"/>
+            <a:off x="18341906" y="9104635"/>
+            <a:ext cx="1284820" cy="400110"/>
           </a:xfrm>
           <a:prstGeom prst="rect">
             <a:avLst/>
@@ -5240,7 +4887,7 @@
           <a:lstStyle/>
           <a:p>
             <a:r>
-              <a:rPr lang="en-US" sz="1000" dirty="0"/>
+              <a:rPr lang="en-US" sz="2000" dirty="0"/>
               <a:t>Library</a:t>
             </a:r>
           </a:p>
@@ -5264,8 +4911,8 @@
         </p:nvCxnSpPr>
         <p:spPr>
           <a:xfrm flipH="1">
-            <a:off x="7821308" y="4404300"/>
-            <a:ext cx="894368" cy="2334"/>
+            <a:off x="16686054" y="9304690"/>
+            <a:ext cx="1655852" cy="4167"/>
           </a:xfrm>
           <a:prstGeom prst="line">
             <a:avLst/>
@@ -5300,8 +4947,8 @@
         </p:nvSpPr>
         <p:spPr>
           <a:xfrm>
-            <a:off x="9357406" y="3190191"/>
-            <a:ext cx="876525" cy="246221"/>
+            <a:off x="19530017" y="7156735"/>
+            <a:ext cx="1622816" cy="400110"/>
           </a:xfrm>
           <a:prstGeom prst="rect">
             <a:avLst/>
@@ -5320,7 +4967,7 @@
           <a:lstStyle/>
           <a:p>
             <a:r>
-              <a:rPr lang="en-US" sz="1000" dirty="0"/>
+              <a:rPr lang="en-US" sz="2000" dirty="0"/>
               <a:t>Living room</a:t>
             </a:r>
           </a:p>
@@ -5344,8 +4991,8 @@
         </p:nvCxnSpPr>
         <p:spPr>
           <a:xfrm flipV="1">
-            <a:off x="9062659" y="3436412"/>
-            <a:ext cx="733010" cy="844777"/>
+            <a:off x="18984316" y="7556845"/>
+            <a:ext cx="1357109" cy="1547790"/>
           </a:xfrm>
           <a:prstGeom prst="line">
             <a:avLst/>
@@ -5380,8 +5027,8 @@
         </p:nvSpPr>
         <p:spPr>
           <a:xfrm>
-            <a:off x="6841842" y="3190191"/>
-            <a:ext cx="1008117" cy="246221"/>
+            <a:off x="14872652" y="7156735"/>
+            <a:ext cx="1866448" cy="400110"/>
           </a:xfrm>
           <a:prstGeom prst="rect">
             <a:avLst/>
@@ -5400,7 +5047,7 @@
           <a:lstStyle/>
           <a:p>
             <a:r>
-              <a:rPr lang="en-US" sz="1000" dirty="0"/>
+              <a:rPr lang="en-US" sz="2000" dirty="0"/>
               <a:t>Arcade Room</a:t>
             </a:r>
           </a:p>
@@ -5420,8 +5067,8 @@
         </p:nvSpPr>
         <p:spPr>
           <a:xfrm>
-            <a:off x="8057302" y="3190191"/>
-            <a:ext cx="693965" cy="246221"/>
+            <a:off x="17122979" y="7156735"/>
+            <a:ext cx="1284820" cy="400110"/>
           </a:xfrm>
           <a:prstGeom prst="rect">
             <a:avLst/>
@@ -5440,7 +5087,7 @@
           <a:lstStyle/>
           <a:p>
             <a:r>
-              <a:rPr lang="en-US" sz="1000" dirty="0"/>
+              <a:rPr lang="en-US" sz="2000" dirty="0"/>
               <a:t>Gym</a:t>
             </a:r>
           </a:p>
@@ -5463,8 +5110,8 @@
         </p:nvCxnSpPr>
         <p:spPr>
           <a:xfrm>
-            <a:off x="7345901" y="3436412"/>
-            <a:ext cx="795333" cy="328683"/>
+            <a:off x="15805876" y="7556845"/>
+            <a:ext cx="1472496" cy="626341"/>
           </a:xfrm>
           <a:prstGeom prst="line">
             <a:avLst/>
@@ -5502,8 +5149,8 @@
         </p:nvCxnSpPr>
         <p:spPr>
           <a:xfrm>
-            <a:off x="8404285" y="3436412"/>
-            <a:ext cx="34751" cy="325165"/>
+            <a:off x="17765389" y="7556845"/>
+            <a:ext cx="64339" cy="620059"/>
           </a:xfrm>
           <a:prstGeom prst="line">
             <a:avLst/>
@@ -5541,8 +5188,8 @@
         </p:nvCxnSpPr>
         <p:spPr>
           <a:xfrm flipH="1">
-            <a:off x="8573256" y="3313302"/>
-            <a:ext cx="784150" cy="448275"/>
+            <a:off x="18078225" y="7356790"/>
+            <a:ext cx="1451792" cy="820114"/>
           </a:xfrm>
           <a:prstGeom prst="line">
             <a:avLst/>
@@ -5577,8 +5224,8 @@
         </p:nvSpPr>
         <p:spPr>
           <a:xfrm>
-            <a:off x="9966772" y="996000"/>
-            <a:ext cx="789213" cy="246221"/>
+            <a:off x="20658209" y="3239161"/>
+            <a:ext cx="1461164" cy="400110"/>
           </a:xfrm>
           <a:prstGeom prst="rect">
             <a:avLst/>
@@ -5597,7 +5244,7 @@
           <a:lstStyle/>
           <a:p>
             <a:r>
-              <a:rPr lang="en-US" sz="1000" dirty="0"/>
+              <a:rPr lang="en-US" sz="2000" dirty="0"/>
               <a:t>Edna Room</a:t>
             </a:r>
           </a:p>
@@ -5617,8 +5264,8 @@
         </p:nvSpPr>
         <p:spPr>
           <a:xfrm>
-            <a:off x="8935351" y="996001"/>
-            <a:ext cx="891728" cy="246221"/>
+            <a:off x="18748615" y="3239162"/>
+            <a:ext cx="1650963" cy="400110"/>
           </a:xfrm>
           <a:prstGeom prst="rect">
             <a:avLst/>
@@ -5637,11 +5284,11 @@
           <a:lstStyle/>
           <a:p>
             <a:r>
-              <a:rPr lang="en-US" sz="1000" dirty="0" err="1"/>
+              <a:rPr lang="en-US" sz="2000" dirty="0" err="1"/>
               <a:t>Edwige</a:t>
             </a:r>
             <a:r>
-              <a:rPr lang="en-US" sz="1000" dirty="0"/>
+              <a:rPr lang="en-US" sz="2000" dirty="0"/>
               <a:t> Room</a:t>
             </a:r>
           </a:p>
@@ -5661,8 +5308,8 @@
         </p:nvSpPr>
         <p:spPr>
           <a:xfrm>
-            <a:off x="9975236" y="1415365"/>
-            <a:ext cx="789213" cy="246221"/>
+            <a:off x="20673880" y="3987908"/>
+            <a:ext cx="1461164" cy="400110"/>
           </a:xfrm>
           <a:prstGeom prst="rect">
             <a:avLst/>
@@ -5681,7 +5328,7 @@
           <a:lstStyle/>
           <a:p>
             <a:r>
-              <a:rPr lang="en-US" sz="1000" dirty="0"/>
+              <a:rPr lang="en-US" sz="2000" dirty="0"/>
               <a:t>Bathroom</a:t>
             </a:r>
           </a:p>
@@ -5705,8 +5352,8 @@
         </p:nvCxnSpPr>
         <p:spPr>
           <a:xfrm flipH="1">
-            <a:off x="8264072" y="1242222"/>
-            <a:ext cx="1117143" cy="419364"/>
+            <a:off x="17505796" y="3639272"/>
+            <a:ext cx="2068301" cy="788246"/>
           </a:xfrm>
           <a:prstGeom prst="line">
             <a:avLst/>
@@ -5744,8 +5391,8 @@
         </p:nvCxnSpPr>
         <p:spPr>
           <a:xfrm flipH="1">
-            <a:off x="8650057" y="1242221"/>
-            <a:ext cx="1711322" cy="423871"/>
+            <a:off x="18220418" y="3639271"/>
+            <a:ext cx="3168373" cy="796293"/>
           </a:xfrm>
           <a:prstGeom prst="line">
             <a:avLst/>
@@ -5784,8 +5431,8 @@
         </p:nvCxnSpPr>
         <p:spPr>
           <a:xfrm flipH="1">
-            <a:off x="8792029" y="1538476"/>
-            <a:ext cx="1183207" cy="246221"/>
+            <a:off x="18483267" y="4187963"/>
+            <a:ext cx="2190613" cy="439610"/>
           </a:xfrm>
           <a:prstGeom prst="line">
             <a:avLst/>
@@ -5820,8 +5467,8 @@
         </p:nvSpPr>
         <p:spPr>
           <a:xfrm>
-            <a:off x="6129943" y="1934016"/>
-            <a:ext cx="693965" cy="246221"/>
+            <a:off x="13554628" y="4913924"/>
+            <a:ext cx="1284820" cy="400110"/>
           </a:xfrm>
           <a:prstGeom prst="rect">
             <a:avLst/>
@@ -5840,7 +5487,7 @@
           <a:lstStyle/>
           <a:p>
             <a:r>
-              <a:rPr lang="en-US" sz="1000" dirty="0"/>
+              <a:rPr lang="en-US" sz="2000" dirty="0"/>
               <a:t>Study</a:t>
             </a:r>
           </a:p>
@@ -5860,8 +5507,8 @@
         </p:nvSpPr>
         <p:spPr>
           <a:xfrm>
-            <a:off x="2554064" y="1934016"/>
-            <a:ext cx="789213" cy="246221"/>
+            <a:off x="6934176" y="4913923"/>
+            <a:ext cx="1461164" cy="400110"/>
           </a:xfrm>
           <a:prstGeom prst="rect">
             <a:avLst/>
@@ -5880,7 +5527,7 @@
           <a:lstStyle/>
           <a:p>
             <a:r>
-              <a:rPr lang="en-US" sz="1000" dirty="0"/>
+              <a:rPr lang="en-US" sz="2000" dirty="0"/>
               <a:t>Bathroom</a:t>
             </a:r>
           </a:p>
@@ -5904,8 +5551,8 @@
         </p:nvCxnSpPr>
         <p:spPr>
           <a:xfrm flipH="1" flipV="1">
-            <a:off x="2948671" y="2180237"/>
-            <a:ext cx="2681958" cy="460484"/>
+            <a:off x="7664758" y="5314033"/>
+            <a:ext cx="4965431" cy="841910"/>
           </a:xfrm>
           <a:prstGeom prst="line">
             <a:avLst/>
@@ -5944,8 +5591,8 @@
         </p:nvCxnSpPr>
         <p:spPr>
           <a:xfrm flipV="1">
-            <a:off x="6203490" y="2180237"/>
-            <a:ext cx="273436" cy="337373"/>
+            <a:off x="13690794" y="5314034"/>
+            <a:ext cx="506244" cy="641854"/>
           </a:xfrm>
           <a:prstGeom prst="line">
             <a:avLst/>
@@ -5980,8 +5627,8 @@
         </p:nvSpPr>
         <p:spPr>
           <a:xfrm>
-            <a:off x="5972177" y="1271926"/>
-            <a:ext cx="693965" cy="246221"/>
+            <a:off x="13262537" y="3731809"/>
+            <a:ext cx="1284820" cy="400110"/>
           </a:xfrm>
           <a:prstGeom prst="rect">
             <a:avLst/>
@@ -6000,7 +5647,7 @@
           <a:lstStyle/>
           <a:p>
             <a:r>
-              <a:rPr lang="en-US" sz="1000" dirty="0"/>
+              <a:rPr lang="en-US" sz="2000" dirty="0"/>
               <a:t>?</a:t>
             </a:r>
           </a:p>
@@ -6020,8 +5667,8 @@
         </p:nvSpPr>
         <p:spPr>
           <a:xfrm>
-            <a:off x="4786994" y="1268113"/>
-            <a:ext cx="693965" cy="246221"/>
+            <a:off x="11068266" y="3725000"/>
+            <a:ext cx="1284820" cy="400110"/>
           </a:xfrm>
           <a:prstGeom prst="rect">
             <a:avLst/>
@@ -6040,7 +5687,7 @@
           <a:lstStyle/>
           <a:p>
             <a:r>
-              <a:rPr lang="en-US" sz="1000" dirty="0"/>
+              <a:rPr lang="en-US" sz="2000" dirty="0"/>
               <a:t>?</a:t>
             </a:r>
           </a:p>
@@ -6060,8 +5707,8 @@
         </p:nvSpPr>
         <p:spPr>
           <a:xfrm>
-            <a:off x="8061321" y="351909"/>
-            <a:ext cx="693965" cy="246221"/>
+            <a:off x="17130420" y="2089183"/>
+            <a:ext cx="1284820" cy="400110"/>
           </a:xfrm>
           <a:prstGeom prst="rect">
             <a:avLst/>
@@ -6080,7 +5727,7 @@
           <a:lstStyle/>
           <a:p>
             <a:r>
-              <a:rPr lang="en-US" sz="1000" dirty="0"/>
+              <a:rPr lang="en-US" sz="2000" dirty="0"/>
               <a:t>?</a:t>
             </a:r>
           </a:p>
@@ -6100,8 +5747,8 @@
         </p:nvSpPr>
         <p:spPr>
           <a:xfrm>
-            <a:off x="6890653" y="424215"/>
-            <a:ext cx="693965" cy="246221"/>
+            <a:off x="14963021" y="2218280"/>
+            <a:ext cx="1284820" cy="400110"/>
           </a:xfrm>
           <a:prstGeom prst="rect">
             <a:avLst/>
@@ -6120,7 +5767,7 @@
           <a:lstStyle/>
           <a:p>
             <a:r>
-              <a:rPr lang="en-US" sz="1000" dirty="0"/>
+              <a:rPr lang="en-US" sz="2000" dirty="0"/>
               <a:t>?</a:t>
             </a:r>
           </a:p>
@@ -6140,8 +5787,8 @@
         </p:nvSpPr>
         <p:spPr>
           <a:xfrm>
-            <a:off x="9480848" y="2047383"/>
-            <a:ext cx="693965" cy="246221"/>
+            <a:off x="19758560" y="5116332"/>
+            <a:ext cx="1284820" cy="400110"/>
           </a:xfrm>
           <a:prstGeom prst="rect">
             <a:avLst/>
@@ -6160,7 +5807,7 @@
           <a:lstStyle/>
           <a:p>
             <a:r>
-              <a:rPr lang="en-US" sz="1000" dirty="0"/>
+              <a:rPr lang="en-US" sz="2000" dirty="0"/>
               <a:t>?</a:t>
             </a:r>
           </a:p>
@@ -6180,8 +5827,8 @@
         </p:nvSpPr>
         <p:spPr>
           <a:xfrm>
-            <a:off x="8598578" y="2048489"/>
-            <a:ext cx="693965" cy="246221"/>
+            <a:off x="18125107" y="5118307"/>
+            <a:ext cx="1284820" cy="400110"/>
           </a:xfrm>
           <a:prstGeom prst="rect">
             <a:avLst/>
@@ -6200,7 +5847,7 @@
           <a:lstStyle/>
           <a:p>
             <a:r>
-              <a:rPr lang="en-US" sz="1000" dirty="0"/>
+              <a:rPr lang="en-US" sz="2000" dirty="0"/>
               <a:t>?</a:t>
             </a:r>
           </a:p>
@@ -6220,8 +5867,8 @@
         </p:nvSpPr>
         <p:spPr>
           <a:xfrm>
-            <a:off x="7263418" y="2044895"/>
-            <a:ext cx="693965" cy="246221"/>
+            <a:off x="15653166" y="5111890"/>
+            <a:ext cx="1284820" cy="400110"/>
           </a:xfrm>
           <a:prstGeom prst="rect">
             <a:avLst/>
@@ -6240,7 +5887,7 @@
           <a:lstStyle/>
           <a:p>
             <a:r>
-              <a:rPr lang="en-US" sz="1000" dirty="0"/>
+              <a:rPr lang="en-US" sz="2000" dirty="0"/>
               <a:t>?</a:t>
             </a:r>
           </a:p>
@@ -6264,8 +5911,8 @@
         </p:nvCxnSpPr>
         <p:spPr>
           <a:xfrm flipV="1">
-            <a:off x="9268266" y="2293604"/>
-            <a:ext cx="559565" cy="245709"/>
+            <a:off x="19364980" y="5516442"/>
+            <a:ext cx="1035990" cy="478196"/>
           </a:xfrm>
           <a:prstGeom prst="line">
             <a:avLst/>
@@ -6304,8 +5951,8 @@
         </p:nvCxnSpPr>
         <p:spPr>
           <a:xfrm>
-            <a:off x="8945561" y="2294710"/>
-            <a:ext cx="322705" cy="244603"/>
+            <a:off x="18767517" y="5518417"/>
+            <a:ext cx="597463" cy="476221"/>
           </a:xfrm>
           <a:prstGeom prst="line">
             <a:avLst/>
@@ -6344,8 +5991,8 @@
         </p:nvCxnSpPr>
         <p:spPr>
           <a:xfrm>
-            <a:off x="7610401" y="2291116"/>
-            <a:ext cx="1657865" cy="248197"/>
+            <a:off x="16295576" y="5512000"/>
+            <a:ext cx="3069404" cy="482638"/>
           </a:xfrm>
           <a:prstGeom prst="line">
             <a:avLst/>
@@ -6380,8 +6027,8 @@
         </p:nvSpPr>
         <p:spPr>
           <a:xfrm>
-            <a:off x="10612963" y="2044894"/>
-            <a:ext cx="693965" cy="246221"/>
+            <a:off x="21854580" y="5111888"/>
+            <a:ext cx="1284820" cy="400110"/>
           </a:xfrm>
           <a:prstGeom prst="rect">
             <a:avLst/>
@@ -6400,7 +6047,7 @@
           <a:lstStyle/>
           <a:p>
             <a:r>
-              <a:rPr lang="en-US" sz="1000" dirty="0"/>
+              <a:rPr lang="en-US" sz="2000" dirty="0"/>
               <a:t>Infirmary</a:t>
             </a:r>
           </a:p>
@@ -6424,8 +6071,8 @@
         </p:nvCxnSpPr>
         <p:spPr>
           <a:xfrm flipV="1">
-            <a:off x="10174813" y="2168005"/>
-            <a:ext cx="438150" cy="2489"/>
+            <a:off x="21043380" y="5311943"/>
+            <a:ext cx="811200" cy="4444"/>
           </a:xfrm>
           <a:prstGeom prst="line">
             <a:avLst/>
@@ -6464,8 +6111,8 @@
         </p:nvCxnSpPr>
         <p:spPr>
           <a:xfrm flipH="1" flipV="1">
-            <a:off x="6319160" y="1518147"/>
-            <a:ext cx="157766" cy="415869"/>
+            <a:off x="13904947" y="4131919"/>
+            <a:ext cx="292091" cy="782005"/>
           </a:xfrm>
           <a:prstGeom prst="line">
             <a:avLst/>
@@ -6504,8 +6151,8 @@
         </p:nvCxnSpPr>
         <p:spPr>
           <a:xfrm flipV="1">
-            <a:off x="4864556" y="1514334"/>
-            <a:ext cx="269421" cy="429344"/>
+            <a:off x="11211864" y="4125110"/>
+            <a:ext cx="498812" cy="806064"/>
           </a:xfrm>
           <a:prstGeom prst="line">
             <a:avLst/>
@@ -6540,8 +6187,8 @@
         </p:nvSpPr>
         <p:spPr>
           <a:xfrm>
-            <a:off x="1384534" y="1936471"/>
-            <a:ext cx="789213" cy="246221"/>
+            <a:off x="4768885" y="4918307"/>
+            <a:ext cx="1461164" cy="400110"/>
           </a:xfrm>
           <a:prstGeom prst="rect">
             <a:avLst/>
@@ -6560,7 +6207,7 @@
           <a:lstStyle/>
           <a:p>
             <a:r>
-              <a:rPr lang="en-US" sz="1000" dirty="0"/>
+              <a:rPr lang="en-US" sz="2000" dirty="0"/>
               <a:t>Laundry</a:t>
             </a:r>
           </a:p>
@@ -6584,8 +6231,8 @@
         </p:nvCxnSpPr>
         <p:spPr>
           <a:xfrm flipH="1">
-            <a:off x="2173747" y="2057127"/>
-            <a:ext cx="380317" cy="2455"/>
+            <a:off x="6230049" y="5113978"/>
+            <a:ext cx="704127" cy="4384"/>
           </a:xfrm>
           <a:prstGeom prst="line">
             <a:avLst/>
@@ -6620,8 +6267,8 @@
         </p:nvSpPr>
         <p:spPr>
           <a:xfrm>
-            <a:off x="5180323" y="5825142"/>
-            <a:ext cx="857250" cy="246221"/>
+            <a:off x="11796482" y="11861254"/>
+            <a:ext cx="1587130" cy="400110"/>
           </a:xfrm>
           <a:prstGeom prst="rect">
             <a:avLst/>
@@ -6640,7 +6287,7 @@
           <a:lstStyle/>
           <a:p>
             <a:r>
-              <a:rPr lang="en-US" sz="1000" dirty="0"/>
+              <a:rPr lang="en-US" sz="2000" dirty="0"/>
               <a:t>Lab Entrance</a:t>
             </a:r>
           </a:p>
@@ -6660,8 +6307,8 @@
         </p:nvSpPr>
         <p:spPr>
           <a:xfrm>
-            <a:off x="6533473" y="5825142"/>
-            <a:ext cx="751114" cy="246221"/>
+            <a:off x="14301731" y="11861254"/>
+            <a:ext cx="1390628" cy="400110"/>
           </a:xfrm>
           <a:prstGeom prst="rect">
             <a:avLst/>
@@ -6680,7 +6327,7 @@
           <a:lstStyle/>
           <a:p>
             <a:r>
-              <a:rPr lang="en-US" sz="1000" dirty="0"/>
+              <a:rPr lang="en-US" sz="2000" dirty="0"/>
               <a:t>Secret Lab</a:t>
             </a:r>
           </a:p>
@@ -6700,8 +6347,8 @@
         </p:nvSpPr>
         <p:spPr>
           <a:xfrm>
-            <a:off x="7749098" y="5810171"/>
-            <a:ext cx="616408" cy="246221"/>
+            <a:off x="16552363" y="11834524"/>
+            <a:ext cx="1141230" cy="400110"/>
           </a:xfrm>
           <a:prstGeom prst="rect">
             <a:avLst/>
@@ -6720,7 +6367,7 @@
           <a:lstStyle/>
           <a:p>
             <a:r>
-              <a:rPr lang="en-US" sz="1000" dirty="0"/>
+              <a:rPr lang="en-US" sz="2000" dirty="0"/>
               <a:t>Meteor</a:t>
             </a:r>
           </a:p>
@@ -6744,8 +6391,8 @@
         </p:nvCxnSpPr>
         <p:spPr>
           <a:xfrm flipH="1" flipV="1">
-            <a:off x="5513613" y="5638082"/>
-            <a:ext cx="95335" cy="187060"/>
+            <a:off x="12413542" y="11487771"/>
+            <a:ext cx="176505" cy="373483"/>
           </a:xfrm>
           <a:prstGeom prst="line">
             <a:avLst/>
@@ -6784,8 +6431,8 @@
         </p:nvCxnSpPr>
         <p:spPr>
           <a:xfrm>
-            <a:off x="6037573" y="5948253"/>
-            <a:ext cx="495900" cy="0"/>
+            <a:off x="13383612" y="12061309"/>
+            <a:ext cx="918119" cy="0"/>
           </a:xfrm>
           <a:prstGeom prst="line">
             <a:avLst/>
@@ -6824,8 +6471,8 @@
         </p:nvCxnSpPr>
         <p:spPr>
           <a:xfrm flipV="1">
-            <a:off x="7284587" y="5933282"/>
-            <a:ext cx="464511" cy="14971"/>
+            <a:off x="15692359" y="12034579"/>
+            <a:ext cx="860004" cy="26730"/>
           </a:xfrm>
           <a:prstGeom prst="line">
             <a:avLst/>
@@ -6860,8 +6507,8 @@
         </p:nvSpPr>
         <p:spPr>
           <a:xfrm>
-            <a:off x="3471937" y="4843425"/>
-            <a:ext cx="751114" cy="246221"/>
+            <a:off x="8633543" y="10108467"/>
+            <a:ext cx="1390628" cy="400110"/>
           </a:xfrm>
           <a:prstGeom prst="rect">
             <a:avLst/>
@@ -6880,7 +6527,7 @@
           <a:lstStyle/>
           <a:p>
             <a:r>
-              <a:rPr lang="en-US" sz="1000" dirty="0"/>
+              <a:rPr lang="en-US" sz="2000" dirty="0"/>
               <a:t>Backyard</a:t>
             </a:r>
           </a:p>
@@ -6904,8 +6551,8 @@
         </p:nvCxnSpPr>
         <p:spPr>
           <a:xfrm flipH="1">
-            <a:off x="4223051" y="4959089"/>
-            <a:ext cx="1198034" cy="7447"/>
+            <a:off x="10024171" y="10295226"/>
+            <a:ext cx="2218063" cy="13296"/>
           </a:xfrm>
           <a:prstGeom prst="line">
             <a:avLst/>
@@ -6940,8 +6587,8 @@
         </p:nvSpPr>
         <p:spPr>
           <a:xfrm>
-            <a:off x="2334685" y="4843425"/>
-            <a:ext cx="693965" cy="246221"/>
+            <a:off x="6528013" y="10108467"/>
+            <a:ext cx="1284820" cy="400110"/>
           </a:xfrm>
           <a:prstGeom prst="rect">
             <a:avLst/>
@@ -6960,7 +6607,7 @@
           <a:lstStyle/>
           <a:p>
             <a:r>
-              <a:rPr lang="en-US" sz="1000" dirty="0"/>
+              <a:rPr lang="en-US" sz="2000" dirty="0"/>
               <a:t>?</a:t>
             </a:r>
           </a:p>
@@ -6980,8 +6627,8 @@
         </p:nvSpPr>
         <p:spPr>
           <a:xfrm>
-            <a:off x="2370361" y="5411615"/>
-            <a:ext cx="693965" cy="246221"/>
+            <a:off x="6594064" y="11122930"/>
+            <a:ext cx="1284820" cy="400110"/>
           </a:xfrm>
           <a:prstGeom prst="rect">
             <a:avLst/>
@@ -7000,7 +6647,7 @@
           <a:lstStyle/>
           <a:p>
             <a:r>
-              <a:rPr lang="en-US" sz="1000" dirty="0"/>
+              <a:rPr lang="en-US" sz="2000" dirty="0"/>
               <a:t>?</a:t>
             </a:r>
           </a:p>
@@ -7020,8 +6667,8 @@
         </p:nvSpPr>
         <p:spPr>
           <a:xfrm>
-            <a:off x="1337578" y="5411615"/>
-            <a:ext cx="693965" cy="246221"/>
+            <a:off x="4681949" y="11122930"/>
+            <a:ext cx="1284820" cy="400110"/>
           </a:xfrm>
           <a:prstGeom prst="rect">
             <a:avLst/>
@@ -7040,7 +6687,7 @@
           <a:lstStyle/>
           <a:p>
             <a:r>
-              <a:rPr lang="en-US" sz="1000" dirty="0"/>
+              <a:rPr lang="en-US" sz="2000" dirty="0"/>
               <a:t>?</a:t>
             </a:r>
           </a:p>
@@ -7060,8 +6707,8 @@
         </p:nvSpPr>
         <p:spPr>
           <a:xfrm>
-            <a:off x="1921742" y="3709894"/>
-            <a:ext cx="693965" cy="246221"/>
+            <a:off x="5763482" y="8084628"/>
+            <a:ext cx="1284820" cy="400110"/>
           </a:xfrm>
           <a:prstGeom prst="rect">
             <a:avLst/>
@@ -7080,7 +6727,7 @@
           <a:lstStyle/>
           <a:p>
             <a:r>
-              <a:rPr lang="en-US" sz="1000" dirty="0"/>
+              <a:rPr lang="en-US" sz="2000" dirty="0"/>
               <a:t>Pool</a:t>
             </a:r>
           </a:p>
@@ -7100,8 +6747,8 @@
         </p:nvSpPr>
         <p:spPr>
           <a:xfrm>
-            <a:off x="2744139" y="3709894"/>
-            <a:ext cx="693965" cy="246221"/>
+            <a:off x="7286084" y="8084628"/>
+            <a:ext cx="1284820" cy="400110"/>
           </a:xfrm>
           <a:prstGeom prst="rect">
             <a:avLst/>
@@ -7120,7 +6767,7 @@
           <a:lstStyle/>
           <a:p>
             <a:r>
-              <a:rPr lang="en-US" sz="1000" dirty="0"/>
+              <a:rPr lang="en-US" sz="2000" dirty="0"/>
               <a:t>Garage</a:t>
             </a:r>
           </a:p>
@@ -7140,8 +6787,8 @@
         </p:nvSpPr>
         <p:spPr>
           <a:xfrm>
-            <a:off x="1311804" y="4843424"/>
-            <a:ext cx="819073" cy="246221"/>
+            <a:off x="4634231" y="10108466"/>
+            <a:ext cx="1516448" cy="400110"/>
           </a:xfrm>
           <a:prstGeom prst="rect">
             <a:avLst/>
@@ -7160,7 +6807,7 @@
           <a:lstStyle/>
           <a:p>
             <a:r>
-              <a:rPr lang="en-US" sz="1000" dirty="0"/>
+              <a:rPr lang="en-US" sz="2000" dirty="0"/>
               <a:t>Greenhouse</a:t>
             </a:r>
           </a:p>
@@ -7182,7 +6829,7 @@
 <file path=ppt/theme/theme1.xml><?xml version="1.0" encoding="utf-8"?>
 <a:theme xmlns:a="http://schemas.openxmlformats.org/drawingml/2006/main" name="Office Theme">
   <a:themeElements>
-    <a:clrScheme name="Office">
+    <a:clrScheme name="Office Theme">
       <a:dk1>
         <a:sysClr val="windowText" lastClr="000000"/>
       </a:dk1>
@@ -7220,7 +6867,7 @@
         <a:srgbClr val="954F72"/>
       </a:folHlink>
     </a:clrScheme>
-    <a:fontScheme name="Office">
+    <a:fontScheme name="Office Theme">
       <a:majorFont>
         <a:latin typeface="Calibri Light" panose="020F0302020204030204"/>
         <a:ea typeface=""/>
@@ -7255,23 +6902,6 @@
         <a:font script="Viet" typeface="Times New Roman"/>
         <a:font script="Uigh" typeface="Microsoft Uighur"/>
         <a:font script="Geor" typeface="Sylfaen"/>
-        <a:font script="Armn" typeface="Arial"/>
-        <a:font script="Bugi" typeface="Leelawadee UI"/>
-        <a:font script="Bopo" typeface="Microsoft JhengHei"/>
-        <a:font script="Java" typeface="Javanese Text"/>
-        <a:font script="Lisu" typeface="Segoe UI"/>
-        <a:font script="Mymr" typeface="Myanmar Text"/>
-        <a:font script="Nkoo" typeface="Ebrima"/>
-        <a:font script="Olck" typeface="Nirmala UI"/>
-        <a:font script="Osma" typeface="Ebrima"/>
-        <a:font script="Phag" typeface="Phagspa"/>
-        <a:font script="Syrn" typeface="Estrangelo Edessa"/>
-        <a:font script="Syrj" typeface="Estrangelo Edessa"/>
-        <a:font script="Syre" typeface="Estrangelo Edessa"/>
-        <a:font script="Sora" typeface="Nirmala UI"/>
-        <a:font script="Tale" typeface="Microsoft Tai Le"/>
-        <a:font script="Talu" typeface="Microsoft New Tai Lue"/>
-        <a:font script="Tfng" typeface="Ebrima"/>
       </a:majorFont>
       <a:minorFont>
         <a:latin typeface="Calibri" panose="020F0502020204030204"/>
@@ -7307,26 +6937,9 @@
         <a:font script="Viet" typeface="Arial"/>
         <a:font script="Uigh" typeface="Microsoft Uighur"/>
         <a:font script="Geor" typeface="Sylfaen"/>
-        <a:font script="Armn" typeface="Arial"/>
-        <a:font script="Bugi" typeface="Leelawadee UI"/>
-        <a:font script="Bopo" typeface="Microsoft JhengHei"/>
-        <a:font script="Java" typeface="Javanese Text"/>
-        <a:font script="Lisu" typeface="Segoe UI"/>
-        <a:font script="Mymr" typeface="Myanmar Text"/>
-        <a:font script="Nkoo" typeface="Ebrima"/>
-        <a:font script="Olck" typeface="Nirmala UI"/>
-        <a:font script="Osma" typeface="Ebrima"/>
-        <a:font script="Phag" typeface="Phagspa"/>
-        <a:font script="Syrn" typeface="Estrangelo Edessa"/>
-        <a:font script="Syrj" typeface="Estrangelo Edessa"/>
-        <a:font script="Syre" typeface="Estrangelo Edessa"/>
-        <a:font script="Sora" typeface="Nirmala UI"/>
-        <a:font script="Tale" typeface="Microsoft Tai Le"/>
-        <a:font script="Talu" typeface="Microsoft New Tai Lue"/>
-        <a:font script="Tfng" typeface="Ebrima"/>
       </a:minorFont>
     </a:fontScheme>
-    <a:fmtScheme name="Office">
+    <a:fmtScheme name="Office Theme">
       <a:fillStyleLst>
         <a:solidFill>
           <a:schemeClr val="phClr"/>

</xml_diff>

<commit_message>
Completed Sam and started Backyard
</commit_message>
<xml_diff>
--- a/Logic/MM Rooms.pptx
+++ b/Logic/MM Rooms.pptx
@@ -243,7 +243,7 @@
           <a:p>
             <a:fld id="{F507AA02-389D-4D6E-9F55-4109D7FF027D}" type="datetimeFigureOut">
               <a:rPr lang="en-US" smtClean="0"/>
-              <a:t>11/11/2020</a:t>
+              <a:t>11/14/2020</a:t>
             </a:fld>
             <a:endParaRPr lang="en-US"/>
           </a:p>
@@ -413,7 +413,7 @@
           <a:p>
             <a:fld id="{F507AA02-389D-4D6E-9F55-4109D7FF027D}" type="datetimeFigureOut">
               <a:rPr lang="en-US" smtClean="0"/>
-              <a:t>11/11/2020</a:t>
+              <a:t>11/14/2020</a:t>
             </a:fld>
             <a:endParaRPr lang="en-US"/>
           </a:p>
@@ -593,7 +593,7 @@
           <a:p>
             <a:fld id="{F507AA02-389D-4D6E-9F55-4109D7FF027D}" type="datetimeFigureOut">
               <a:rPr lang="en-US" smtClean="0"/>
-              <a:t>11/11/2020</a:t>
+              <a:t>11/14/2020</a:t>
             </a:fld>
             <a:endParaRPr lang="en-US"/>
           </a:p>
@@ -763,7 +763,7 @@
           <a:p>
             <a:fld id="{F507AA02-389D-4D6E-9F55-4109D7FF027D}" type="datetimeFigureOut">
               <a:rPr lang="en-US" smtClean="0"/>
-              <a:t>11/11/2020</a:t>
+              <a:t>11/14/2020</a:t>
             </a:fld>
             <a:endParaRPr lang="en-US"/>
           </a:p>
@@ -1009,7 +1009,7 @@
           <a:p>
             <a:fld id="{F507AA02-389D-4D6E-9F55-4109D7FF027D}" type="datetimeFigureOut">
               <a:rPr lang="en-US" smtClean="0"/>
-              <a:t>11/11/2020</a:t>
+              <a:t>11/14/2020</a:t>
             </a:fld>
             <a:endParaRPr lang="en-US"/>
           </a:p>
@@ -1241,7 +1241,7 @@
           <a:p>
             <a:fld id="{F507AA02-389D-4D6E-9F55-4109D7FF027D}" type="datetimeFigureOut">
               <a:rPr lang="en-US" smtClean="0"/>
-              <a:t>11/11/2020</a:t>
+              <a:t>11/14/2020</a:t>
             </a:fld>
             <a:endParaRPr lang="en-US"/>
           </a:p>
@@ -1608,7 +1608,7 @@
           <a:p>
             <a:fld id="{F507AA02-389D-4D6E-9F55-4109D7FF027D}" type="datetimeFigureOut">
               <a:rPr lang="en-US" smtClean="0"/>
-              <a:t>11/11/2020</a:t>
+              <a:t>11/14/2020</a:t>
             </a:fld>
             <a:endParaRPr lang="en-US"/>
           </a:p>
@@ -1726,7 +1726,7 @@
           <a:p>
             <a:fld id="{F507AA02-389D-4D6E-9F55-4109D7FF027D}" type="datetimeFigureOut">
               <a:rPr lang="en-US" smtClean="0"/>
-              <a:t>11/11/2020</a:t>
+              <a:t>11/14/2020</a:t>
             </a:fld>
             <a:endParaRPr lang="en-US"/>
           </a:p>
@@ -1821,7 +1821,7 @@
           <a:p>
             <a:fld id="{F507AA02-389D-4D6E-9F55-4109D7FF027D}" type="datetimeFigureOut">
               <a:rPr lang="en-US" smtClean="0"/>
-              <a:t>11/11/2020</a:t>
+              <a:t>11/14/2020</a:t>
             </a:fld>
             <a:endParaRPr lang="en-US"/>
           </a:p>
@@ -2098,7 +2098,7 @@
           <a:p>
             <a:fld id="{F507AA02-389D-4D6E-9F55-4109D7FF027D}" type="datetimeFigureOut">
               <a:rPr lang="en-US" smtClean="0"/>
-              <a:t>11/11/2020</a:t>
+              <a:t>11/14/2020</a:t>
             </a:fld>
             <a:endParaRPr lang="en-US"/>
           </a:p>
@@ -2355,7 +2355,7 @@
           <a:p>
             <a:fld id="{F507AA02-389D-4D6E-9F55-4109D7FF027D}" type="datetimeFigureOut">
               <a:rPr lang="en-US" smtClean="0"/>
-              <a:t>11/11/2020</a:t>
+              <a:t>11/14/2020</a:t>
             </a:fld>
             <a:endParaRPr lang="en-US"/>
           </a:p>
@@ -2568,7 +2568,7 @@
           <a:p>
             <a:fld id="{F507AA02-389D-4D6E-9F55-4109D7FF027D}" type="datetimeFigureOut">
               <a:rPr lang="en-US" smtClean="0"/>
-              <a:t>11/11/2020</a:t>
+              <a:t>11/14/2020</a:t>
             </a:fld>
             <a:endParaRPr lang="en-US"/>
           </a:p>
@@ -6507,7 +6507,7 @@
         </p:nvSpPr>
         <p:spPr>
           <a:xfrm>
-            <a:off x="8633543" y="10108467"/>
+            <a:off x="7928494" y="14736614"/>
             <a:ext cx="1390628" cy="400110"/>
           </a:xfrm>
           <a:prstGeom prst="rect">
@@ -6551,8 +6551,8 @@
         </p:nvCxnSpPr>
         <p:spPr>
           <a:xfrm flipH="1">
-            <a:off x="10024171" y="10295226"/>
-            <a:ext cx="2218063" cy="13296"/>
+            <a:off x="9319122" y="10295226"/>
+            <a:ext cx="2923112" cy="4641443"/>
           </a:xfrm>
           <a:prstGeom prst="line">
             <a:avLst/>
@@ -6667,7 +6667,7 @@
         </p:nvSpPr>
         <p:spPr>
           <a:xfrm>
-            <a:off x="4681949" y="11122930"/>
+            <a:off x="2640359" y="14833968"/>
             <a:ext cx="1284820" cy="400110"/>
           </a:xfrm>
           <a:prstGeom prst="rect">
@@ -6688,7 +6688,7 @@
           <a:p>
             <a:r>
               <a:rPr lang="en-US" sz="2000" dirty="0"/>
-              <a:t>?</a:t>
+              <a:t>Shelter</a:t>
             </a:r>
           </a:p>
         </p:txBody>
@@ -6707,7 +6707,7 @@
         </p:nvSpPr>
         <p:spPr>
           <a:xfrm>
-            <a:off x="5763482" y="8084628"/>
+            <a:off x="2995529" y="14114271"/>
             <a:ext cx="1284820" cy="400110"/>
           </a:xfrm>
           <a:prstGeom prst="rect">
@@ -6747,7 +6747,7 @@
         </p:nvSpPr>
         <p:spPr>
           <a:xfrm>
-            <a:off x="7286084" y="8084628"/>
+            <a:off x="1314844" y="14114271"/>
             <a:ext cx="1284820" cy="400110"/>
           </a:xfrm>
           <a:prstGeom prst="rect">
@@ -6787,7 +6787,7 @@
         </p:nvSpPr>
         <p:spPr>
           <a:xfrm>
-            <a:off x="4634231" y="10108466"/>
+            <a:off x="6230049" y="15554676"/>
             <a:ext cx="1516448" cy="400110"/>
           </a:xfrm>
           <a:prstGeom prst="rect">
@@ -6809,6 +6809,246 @@
             <a:r>
               <a:rPr lang="en-US" sz="2000" dirty="0"/>
               <a:t>Greenhouse</a:t>
+            </a:r>
+          </a:p>
+        </p:txBody>
+      </p:sp>
+      <p:sp>
+        <p:nvSpPr>
+          <p:cNvPr id="29" name="TextBox 28">
+            <a:extLst>
+              <a:ext uri="{FF2B5EF4-FFF2-40B4-BE49-F238E27FC236}">
+                <a16:creationId xmlns:a16="http://schemas.microsoft.com/office/drawing/2014/main" id="{EED36C25-A08B-425E-B674-088EDE6CDC70}"/>
+              </a:ext>
+            </a:extLst>
+          </p:cNvPr>
+          <p:cNvSpPr txBox="1"/>
+          <p:nvPr/>
+        </p:nvSpPr>
+        <p:spPr>
+          <a:xfrm>
+            <a:off x="1957254" y="15555688"/>
+            <a:ext cx="1284820" cy="400110"/>
+          </a:xfrm>
+          <a:prstGeom prst="rect">
+            <a:avLst/>
+          </a:prstGeom>
+          <a:noFill/>
+          <a:ln>
+            <a:solidFill>
+              <a:schemeClr val="accent1"/>
+            </a:solidFill>
+          </a:ln>
+        </p:spPr>
+        <p:txBody>
+          <a:bodyPr wrap="square" rtlCol="0">
+            <a:spAutoFit/>
+          </a:bodyPr>
+          <a:lstStyle/>
+          <a:p>
+            <a:r>
+              <a:rPr lang="en-US" sz="2000" dirty="0"/>
+              <a:t>Woods</a:t>
+            </a:r>
+          </a:p>
+        </p:txBody>
+      </p:sp>
+      <p:sp>
+        <p:nvSpPr>
+          <p:cNvPr id="31" name="TextBox 30">
+            <a:extLst>
+              <a:ext uri="{FF2B5EF4-FFF2-40B4-BE49-F238E27FC236}">
+                <a16:creationId xmlns:a16="http://schemas.microsoft.com/office/drawing/2014/main" id="{53DA565B-26FC-4986-AEBF-A12FD238BE43}"/>
+              </a:ext>
+            </a:extLst>
+          </p:cNvPr>
+          <p:cNvSpPr txBox="1"/>
+          <p:nvPr/>
+        </p:nvSpPr>
+        <p:spPr>
+          <a:xfrm>
+            <a:off x="4475419" y="14736614"/>
+            <a:ext cx="1284820" cy="400110"/>
+          </a:xfrm>
+          <a:prstGeom prst="rect">
+            <a:avLst/>
+          </a:prstGeom>
+          <a:noFill/>
+          <a:ln>
+            <a:solidFill>
+              <a:schemeClr val="accent1"/>
+            </a:solidFill>
+          </a:ln>
+        </p:spPr>
+        <p:txBody>
+          <a:bodyPr wrap="square" rtlCol="0">
+            <a:spAutoFit/>
+          </a:bodyPr>
+          <a:lstStyle/>
+          <a:p>
+            <a:r>
+              <a:rPr lang="en-US" sz="2000" dirty="0"/>
+              <a:t>Court</a:t>
+            </a:r>
+          </a:p>
+        </p:txBody>
+      </p:sp>
+      <p:sp>
+        <p:nvSpPr>
+          <p:cNvPr id="38" name="TextBox 37">
+            <a:extLst>
+              <a:ext uri="{FF2B5EF4-FFF2-40B4-BE49-F238E27FC236}">
+                <a16:creationId xmlns:a16="http://schemas.microsoft.com/office/drawing/2014/main" id="{44CFCC2E-6DB1-48EE-AB57-FA8CC400A80A}"/>
+              </a:ext>
+            </a:extLst>
+          </p:cNvPr>
+          <p:cNvSpPr txBox="1"/>
+          <p:nvPr/>
+        </p:nvSpPr>
+        <p:spPr>
+          <a:xfrm>
+            <a:off x="6291476" y="13920986"/>
+            <a:ext cx="1284820" cy="400110"/>
+          </a:xfrm>
+          <a:prstGeom prst="rect">
+            <a:avLst/>
+          </a:prstGeom>
+          <a:noFill/>
+          <a:ln>
+            <a:solidFill>
+              <a:schemeClr val="accent1"/>
+            </a:solidFill>
+          </a:ln>
+        </p:spPr>
+        <p:txBody>
+          <a:bodyPr wrap="square" rtlCol="0">
+            <a:spAutoFit/>
+          </a:bodyPr>
+          <a:lstStyle/>
+          <a:p>
+            <a:r>
+              <a:rPr lang="en-US" sz="2000" dirty="0"/>
+              <a:t>Look up</a:t>
+            </a:r>
+          </a:p>
+        </p:txBody>
+      </p:sp>
+      <p:sp>
+        <p:nvSpPr>
+          <p:cNvPr id="44" name="TextBox 43">
+            <a:extLst>
+              <a:ext uri="{FF2B5EF4-FFF2-40B4-BE49-F238E27FC236}">
+                <a16:creationId xmlns:a16="http://schemas.microsoft.com/office/drawing/2014/main" id="{54EA6DEA-5355-4A41-A7B9-F0FCD1F43486}"/>
+              </a:ext>
+            </a:extLst>
+          </p:cNvPr>
+          <p:cNvSpPr txBox="1"/>
+          <p:nvPr/>
+        </p:nvSpPr>
+        <p:spPr>
+          <a:xfrm>
+            <a:off x="3884484" y="15554676"/>
+            <a:ext cx="1284820" cy="400110"/>
+          </a:xfrm>
+          <a:prstGeom prst="rect">
+            <a:avLst/>
+          </a:prstGeom>
+          <a:noFill/>
+          <a:ln>
+            <a:solidFill>
+              <a:schemeClr val="accent1"/>
+            </a:solidFill>
+          </a:ln>
+        </p:spPr>
+        <p:txBody>
+          <a:bodyPr wrap="square" rtlCol="0">
+            <a:spAutoFit/>
+          </a:bodyPr>
+          <a:lstStyle/>
+          <a:p>
+            <a:r>
+              <a:rPr lang="en-US" sz="2000" dirty="0"/>
+              <a:t>Barbecue</a:t>
+            </a:r>
+          </a:p>
+        </p:txBody>
+      </p:sp>
+      <p:sp>
+        <p:nvSpPr>
+          <p:cNvPr id="46" name="TextBox 45">
+            <a:extLst>
+              <a:ext uri="{FF2B5EF4-FFF2-40B4-BE49-F238E27FC236}">
+                <a16:creationId xmlns:a16="http://schemas.microsoft.com/office/drawing/2014/main" id="{3909C7F9-DD1D-4797-A543-59BA1D6D78C0}"/>
+              </a:ext>
+            </a:extLst>
+          </p:cNvPr>
+          <p:cNvSpPr txBox="1"/>
+          <p:nvPr/>
+        </p:nvSpPr>
+        <p:spPr>
+          <a:xfrm>
+            <a:off x="254099" y="15554676"/>
+            <a:ext cx="1284820" cy="400110"/>
+          </a:xfrm>
+          <a:prstGeom prst="rect">
+            <a:avLst/>
+          </a:prstGeom>
+          <a:noFill/>
+          <a:ln>
+            <a:solidFill>
+              <a:schemeClr val="accent1"/>
+            </a:solidFill>
+          </a:ln>
+        </p:spPr>
+        <p:txBody>
+          <a:bodyPr wrap="square" rtlCol="0">
+            <a:spAutoFit/>
+          </a:bodyPr>
+          <a:lstStyle/>
+          <a:p>
+            <a:r>
+              <a:rPr lang="en-US" sz="2000" dirty="0"/>
+              <a:t>Cemetery</a:t>
+            </a:r>
+          </a:p>
+        </p:txBody>
+      </p:sp>
+      <p:sp>
+        <p:nvSpPr>
+          <p:cNvPr id="47" name="TextBox 46">
+            <a:extLst>
+              <a:ext uri="{FF2B5EF4-FFF2-40B4-BE49-F238E27FC236}">
+                <a16:creationId xmlns:a16="http://schemas.microsoft.com/office/drawing/2014/main" id="{C885771D-2EF6-4648-8932-BD1B64226C2B}"/>
+              </a:ext>
+            </a:extLst>
+          </p:cNvPr>
+          <p:cNvSpPr txBox="1"/>
+          <p:nvPr/>
+        </p:nvSpPr>
+        <p:spPr>
+          <a:xfrm>
+            <a:off x="6291766" y="14736614"/>
+            <a:ext cx="1284820" cy="400110"/>
+          </a:xfrm>
+          <a:prstGeom prst="rect">
+            <a:avLst/>
+          </a:prstGeom>
+          <a:noFill/>
+          <a:ln>
+            <a:solidFill>
+              <a:schemeClr val="accent1"/>
+            </a:solidFill>
+          </a:ln>
+        </p:spPr>
+        <p:txBody>
+          <a:bodyPr wrap="square" rtlCol="0">
+            <a:spAutoFit/>
+          </a:bodyPr>
+          <a:lstStyle/>
+          <a:p>
+            <a:r>
+              <a:rPr lang="en-US" sz="2000" dirty="0"/>
+              <a:t>Patio</a:t>
             </a:r>
           </a:p>
         </p:txBody>

</xml_diff>

<commit_message>
Minor fixes on Dining room
</commit_message>
<xml_diff>
--- a/Logic/MM Rooms.pptx
+++ b/Logic/MM Rooms.pptx
@@ -243,7 +243,7 @@
           <a:p>
             <a:fld id="{F507AA02-389D-4D6E-9F55-4109D7FF027D}" type="datetimeFigureOut">
               <a:rPr lang="en-US" smtClean="0"/>
-              <a:t>11/14/2020</a:t>
+              <a:t>11/20/2020</a:t>
             </a:fld>
             <a:endParaRPr lang="en-US"/>
           </a:p>
@@ -413,7 +413,7 @@
           <a:p>
             <a:fld id="{F507AA02-389D-4D6E-9F55-4109D7FF027D}" type="datetimeFigureOut">
               <a:rPr lang="en-US" smtClean="0"/>
-              <a:t>11/14/2020</a:t>
+              <a:t>11/20/2020</a:t>
             </a:fld>
             <a:endParaRPr lang="en-US"/>
           </a:p>
@@ -593,7 +593,7 @@
           <a:p>
             <a:fld id="{F507AA02-389D-4D6E-9F55-4109D7FF027D}" type="datetimeFigureOut">
               <a:rPr lang="en-US" smtClean="0"/>
-              <a:t>11/14/2020</a:t>
+              <a:t>11/20/2020</a:t>
             </a:fld>
             <a:endParaRPr lang="en-US"/>
           </a:p>
@@ -763,7 +763,7 @@
           <a:p>
             <a:fld id="{F507AA02-389D-4D6E-9F55-4109D7FF027D}" type="datetimeFigureOut">
               <a:rPr lang="en-US" smtClean="0"/>
-              <a:t>11/14/2020</a:t>
+              <a:t>11/20/2020</a:t>
             </a:fld>
             <a:endParaRPr lang="en-US"/>
           </a:p>
@@ -1009,7 +1009,7 @@
           <a:p>
             <a:fld id="{F507AA02-389D-4D6E-9F55-4109D7FF027D}" type="datetimeFigureOut">
               <a:rPr lang="en-US" smtClean="0"/>
-              <a:t>11/14/2020</a:t>
+              <a:t>11/20/2020</a:t>
             </a:fld>
             <a:endParaRPr lang="en-US"/>
           </a:p>
@@ -1241,7 +1241,7 @@
           <a:p>
             <a:fld id="{F507AA02-389D-4D6E-9F55-4109D7FF027D}" type="datetimeFigureOut">
               <a:rPr lang="en-US" smtClean="0"/>
-              <a:t>11/14/2020</a:t>
+              <a:t>11/20/2020</a:t>
             </a:fld>
             <a:endParaRPr lang="en-US"/>
           </a:p>
@@ -1608,7 +1608,7 @@
           <a:p>
             <a:fld id="{F507AA02-389D-4D6E-9F55-4109D7FF027D}" type="datetimeFigureOut">
               <a:rPr lang="en-US" smtClean="0"/>
-              <a:t>11/14/2020</a:t>
+              <a:t>11/20/2020</a:t>
             </a:fld>
             <a:endParaRPr lang="en-US"/>
           </a:p>
@@ -1726,7 +1726,7 @@
           <a:p>
             <a:fld id="{F507AA02-389D-4D6E-9F55-4109D7FF027D}" type="datetimeFigureOut">
               <a:rPr lang="en-US" smtClean="0"/>
-              <a:t>11/14/2020</a:t>
+              <a:t>11/20/2020</a:t>
             </a:fld>
             <a:endParaRPr lang="en-US"/>
           </a:p>
@@ -1821,7 +1821,7 @@
           <a:p>
             <a:fld id="{F507AA02-389D-4D6E-9F55-4109D7FF027D}" type="datetimeFigureOut">
               <a:rPr lang="en-US" smtClean="0"/>
-              <a:t>11/14/2020</a:t>
+              <a:t>11/20/2020</a:t>
             </a:fld>
             <a:endParaRPr lang="en-US"/>
           </a:p>
@@ -2098,7 +2098,7 @@
           <a:p>
             <a:fld id="{F507AA02-389D-4D6E-9F55-4109D7FF027D}" type="datetimeFigureOut">
               <a:rPr lang="en-US" smtClean="0"/>
-              <a:t>11/14/2020</a:t>
+              <a:t>11/20/2020</a:t>
             </a:fld>
             <a:endParaRPr lang="en-US"/>
           </a:p>
@@ -2355,7 +2355,7 @@
           <a:p>
             <a:fld id="{F507AA02-389D-4D6E-9F55-4109D7FF027D}" type="datetimeFigureOut">
               <a:rPr lang="en-US" smtClean="0"/>
-              <a:t>11/14/2020</a:t>
+              <a:t>11/20/2020</a:t>
             </a:fld>
             <a:endParaRPr lang="en-US"/>
           </a:p>
@@ -2568,7 +2568,7 @@
           <a:p>
             <a:fld id="{F507AA02-389D-4D6E-9F55-4109D7FF027D}" type="datetimeFigureOut">
               <a:rPr lang="en-US" smtClean="0"/>
-              <a:t>11/14/2020</a:t>
+              <a:t>11/20/2020</a:t>
             </a:fld>
             <a:endParaRPr lang="en-US"/>
           </a:p>
@@ -4570,7 +4570,7 @@
           <a:p>
             <a:r>
               <a:rPr lang="en-US" sz="2000" dirty="0"/>
-              <a:t>?</a:t>
+              <a:t>Music Hall</a:t>
             </a:r>
           </a:p>
         </p:txBody>
@@ -4808,7 +4808,7 @@
           <a:p>
             <a:r>
               <a:rPr lang="en-US" sz="2000" dirty="0"/>
-              <a:t>Music Hall</a:t>
+              <a:t>Longue</a:t>
             </a:r>
           </a:p>
         </p:txBody>

</xml_diff>

<commit_message>
Court, and removed old cursors
</commit_message>
<xml_diff>
--- a/Logic/MM Rooms.pptx
+++ b/Logic/MM Rooms.pptx
@@ -243,7 +243,7 @@
           <a:p>
             <a:fld id="{F507AA02-389D-4D6E-9F55-4109D7FF027D}" type="datetimeFigureOut">
               <a:rPr lang="en-US" smtClean="0"/>
-              <a:t>11/20/2020</a:t>
+              <a:t>11/23/2020</a:t>
             </a:fld>
             <a:endParaRPr lang="en-US"/>
           </a:p>
@@ -413,7 +413,7 @@
           <a:p>
             <a:fld id="{F507AA02-389D-4D6E-9F55-4109D7FF027D}" type="datetimeFigureOut">
               <a:rPr lang="en-US" smtClean="0"/>
-              <a:t>11/20/2020</a:t>
+              <a:t>11/23/2020</a:t>
             </a:fld>
             <a:endParaRPr lang="en-US"/>
           </a:p>
@@ -593,7 +593,7 @@
           <a:p>
             <a:fld id="{F507AA02-389D-4D6E-9F55-4109D7FF027D}" type="datetimeFigureOut">
               <a:rPr lang="en-US" smtClean="0"/>
-              <a:t>11/20/2020</a:t>
+              <a:t>11/23/2020</a:t>
             </a:fld>
             <a:endParaRPr lang="en-US"/>
           </a:p>
@@ -763,7 +763,7 @@
           <a:p>
             <a:fld id="{F507AA02-389D-4D6E-9F55-4109D7FF027D}" type="datetimeFigureOut">
               <a:rPr lang="en-US" smtClean="0"/>
-              <a:t>11/20/2020</a:t>
+              <a:t>11/23/2020</a:t>
             </a:fld>
             <a:endParaRPr lang="en-US"/>
           </a:p>
@@ -1009,7 +1009,7 @@
           <a:p>
             <a:fld id="{F507AA02-389D-4D6E-9F55-4109D7FF027D}" type="datetimeFigureOut">
               <a:rPr lang="en-US" smtClean="0"/>
-              <a:t>11/20/2020</a:t>
+              <a:t>11/23/2020</a:t>
             </a:fld>
             <a:endParaRPr lang="en-US"/>
           </a:p>
@@ -1241,7 +1241,7 @@
           <a:p>
             <a:fld id="{F507AA02-389D-4D6E-9F55-4109D7FF027D}" type="datetimeFigureOut">
               <a:rPr lang="en-US" smtClean="0"/>
-              <a:t>11/20/2020</a:t>
+              <a:t>11/23/2020</a:t>
             </a:fld>
             <a:endParaRPr lang="en-US"/>
           </a:p>
@@ -1608,7 +1608,7 @@
           <a:p>
             <a:fld id="{F507AA02-389D-4D6E-9F55-4109D7FF027D}" type="datetimeFigureOut">
               <a:rPr lang="en-US" smtClean="0"/>
-              <a:t>11/20/2020</a:t>
+              <a:t>11/23/2020</a:t>
             </a:fld>
             <a:endParaRPr lang="en-US"/>
           </a:p>
@@ -1726,7 +1726,7 @@
           <a:p>
             <a:fld id="{F507AA02-389D-4D6E-9F55-4109D7FF027D}" type="datetimeFigureOut">
               <a:rPr lang="en-US" smtClean="0"/>
-              <a:t>11/20/2020</a:t>
+              <a:t>11/23/2020</a:t>
             </a:fld>
             <a:endParaRPr lang="en-US"/>
           </a:p>
@@ -1821,7 +1821,7 @@
           <a:p>
             <a:fld id="{F507AA02-389D-4D6E-9F55-4109D7FF027D}" type="datetimeFigureOut">
               <a:rPr lang="en-US" smtClean="0"/>
-              <a:t>11/20/2020</a:t>
+              <a:t>11/23/2020</a:t>
             </a:fld>
             <a:endParaRPr lang="en-US"/>
           </a:p>
@@ -2098,7 +2098,7 @@
           <a:p>
             <a:fld id="{F507AA02-389D-4D6E-9F55-4109D7FF027D}" type="datetimeFigureOut">
               <a:rPr lang="en-US" smtClean="0"/>
-              <a:t>11/20/2020</a:t>
+              <a:t>11/23/2020</a:t>
             </a:fld>
             <a:endParaRPr lang="en-US"/>
           </a:p>
@@ -2355,7 +2355,7 @@
           <a:p>
             <a:fld id="{F507AA02-389D-4D6E-9F55-4109D7FF027D}" type="datetimeFigureOut">
               <a:rPr lang="en-US" smtClean="0"/>
-              <a:t>11/20/2020</a:t>
+              <a:t>11/23/2020</a:t>
             </a:fld>
             <a:endParaRPr lang="en-US"/>
           </a:p>
@@ -2568,7 +2568,7 @@
           <a:p>
             <a:fld id="{F507AA02-389D-4D6E-9F55-4109D7FF027D}" type="datetimeFigureOut">
               <a:rPr lang="en-US" smtClean="0"/>
-              <a:t>11/20/2020</a:t>
+              <a:t>11/23/2020</a:t>
             </a:fld>
             <a:endParaRPr lang="en-US"/>
           </a:p>
@@ -3187,7 +3187,7 @@
         </p:nvSpPr>
         <p:spPr>
           <a:xfrm>
-            <a:off x="12242234" y="10095171"/>
+            <a:off x="11835831" y="10095171"/>
             <a:ext cx="1390628" cy="400110"/>
           </a:xfrm>
           <a:prstGeom prst="rect">
@@ -3390,8 +3390,8 @@
         </p:nvCxnSpPr>
         <p:spPr>
           <a:xfrm flipH="1">
-            <a:off x="13632862" y="10295225"/>
-            <a:ext cx="979988" cy="0"/>
+            <a:off x="13226459" y="10295226"/>
+            <a:ext cx="1386391" cy="0"/>
           </a:xfrm>
           <a:prstGeom prst="line">
             <a:avLst/>
@@ -3429,8 +3429,8 @@
         </p:nvCxnSpPr>
         <p:spPr>
           <a:xfrm flipV="1">
-            <a:off x="12937548" y="9499203"/>
-            <a:ext cx="52904" cy="595968"/>
+            <a:off x="12531145" y="9499203"/>
+            <a:ext cx="459307" cy="595968"/>
           </a:xfrm>
           <a:prstGeom prst="line">
             <a:avLst/>
@@ -4347,8 +4347,8 @@
         </p:nvCxnSpPr>
         <p:spPr>
           <a:xfrm flipV="1">
-            <a:off x="9552928" y="10295225"/>
-            <a:ext cx="2689306" cy="809322"/>
+            <a:off x="9552928" y="10295226"/>
+            <a:ext cx="2282903" cy="809322"/>
           </a:xfrm>
           <a:prstGeom prst="line">
             <a:avLst/>
@@ -5224,8 +5224,8 @@
         </p:nvSpPr>
         <p:spPr>
           <a:xfrm>
-            <a:off x="20658209" y="3239161"/>
-            <a:ext cx="1461164" cy="400110"/>
+            <a:off x="20888925" y="3239161"/>
+            <a:ext cx="1687441" cy="400110"/>
           </a:xfrm>
           <a:prstGeom prst="rect">
             <a:avLst/>
@@ -5265,7 +5265,7 @@
         <p:spPr>
           <a:xfrm>
             <a:off x="18748615" y="3239162"/>
-            <a:ext cx="1650963" cy="400110"/>
+            <a:ext cx="1982018" cy="400110"/>
           </a:xfrm>
           <a:prstGeom prst="rect">
             <a:avLst/>
@@ -5353,7 +5353,7 @@
         <p:spPr>
           <a:xfrm flipH="1">
             <a:off x="17505796" y="3639272"/>
-            <a:ext cx="2068301" cy="788246"/>
+            <a:ext cx="2233828" cy="788246"/>
           </a:xfrm>
           <a:prstGeom prst="line">
             <a:avLst/>
@@ -5391,8 +5391,8 @@
         </p:nvCxnSpPr>
         <p:spPr>
           <a:xfrm flipH="1">
-            <a:off x="18220418" y="3639271"/>
-            <a:ext cx="3168373" cy="796293"/>
+            <a:off x="18451136" y="3639271"/>
+            <a:ext cx="3281510" cy="796293"/>
           </a:xfrm>
           <a:prstGeom prst="line">
             <a:avLst/>
@@ -5775,10 +5775,10 @@
       </p:sp>
       <p:sp>
         <p:nvSpPr>
-          <p:cNvPr id="1027" name="TextBox 1026">
-            <a:extLst>
-              <a:ext uri="{FF2B5EF4-FFF2-40B4-BE49-F238E27FC236}">
-                <a16:creationId xmlns:a16="http://schemas.microsoft.com/office/drawing/2014/main" id="{9962463D-E69C-4EDA-89CD-107B0CE7CD0E}"/>
+          <p:cNvPr id="1028" name="TextBox 1027">
+            <a:extLst>
+              <a:ext uri="{FF2B5EF4-FFF2-40B4-BE49-F238E27FC236}">
+                <a16:creationId xmlns:a16="http://schemas.microsoft.com/office/drawing/2014/main" id="{89C4362B-A9D4-4F25-97D9-35376BA65D8A}"/>
               </a:ext>
             </a:extLst>
           </p:cNvPr>
@@ -5787,7 +5787,7 @@
         </p:nvSpPr>
         <p:spPr>
           <a:xfrm>
-            <a:off x="19758560" y="5116332"/>
+            <a:off x="18125107" y="5118307"/>
             <a:ext cx="1284820" cy="400110"/>
           </a:xfrm>
           <a:prstGeom prst="rect">
@@ -5815,10 +5815,10 @@
       </p:sp>
       <p:sp>
         <p:nvSpPr>
-          <p:cNvPr id="1028" name="TextBox 1027">
-            <a:extLst>
-              <a:ext uri="{FF2B5EF4-FFF2-40B4-BE49-F238E27FC236}">
-                <a16:creationId xmlns:a16="http://schemas.microsoft.com/office/drawing/2014/main" id="{89C4362B-A9D4-4F25-97D9-35376BA65D8A}"/>
+          <p:cNvPr id="1029" name="TextBox 1028">
+            <a:extLst>
+              <a:ext uri="{FF2B5EF4-FFF2-40B4-BE49-F238E27FC236}">
+                <a16:creationId xmlns:a16="http://schemas.microsoft.com/office/drawing/2014/main" id="{DECA3660-D103-44D7-ADE8-458AE07AF5C8}"/>
               </a:ext>
             </a:extLst>
           </p:cNvPr>
@@ -5827,7 +5827,7 @@
         </p:nvSpPr>
         <p:spPr>
           <a:xfrm>
-            <a:off x="18125107" y="5118307"/>
+            <a:off x="19936566" y="5149253"/>
             <a:ext cx="1284820" cy="400110"/>
           </a:xfrm>
           <a:prstGeom prst="rect">
@@ -5853,46 +5853,6 @@
           </a:p>
         </p:txBody>
       </p:sp>
-      <p:sp>
-        <p:nvSpPr>
-          <p:cNvPr id="1029" name="TextBox 1028">
-            <a:extLst>
-              <a:ext uri="{FF2B5EF4-FFF2-40B4-BE49-F238E27FC236}">
-                <a16:creationId xmlns:a16="http://schemas.microsoft.com/office/drawing/2014/main" id="{DECA3660-D103-44D7-ADE8-458AE07AF5C8}"/>
-              </a:ext>
-            </a:extLst>
-          </p:cNvPr>
-          <p:cNvSpPr txBox="1"/>
-          <p:nvPr/>
-        </p:nvSpPr>
-        <p:spPr>
-          <a:xfrm>
-            <a:off x="15653166" y="5111890"/>
-            <a:ext cx="1284820" cy="400110"/>
-          </a:xfrm>
-          <a:prstGeom prst="rect">
-            <a:avLst/>
-          </a:prstGeom>
-          <a:noFill/>
-          <a:ln>
-            <a:solidFill>
-              <a:schemeClr val="accent1"/>
-            </a:solidFill>
-          </a:ln>
-        </p:spPr>
-        <p:txBody>
-          <a:bodyPr wrap="square" rtlCol="0">
-            <a:spAutoFit/>
-          </a:bodyPr>
-          <a:lstStyle/>
-          <a:p>
-            <a:r>
-              <a:rPr lang="en-US" sz="2000" dirty="0"/>
-              <a:t>?</a:t>
-            </a:r>
-          </a:p>
-        </p:txBody>
-      </p:sp>
       <p:cxnSp>
         <p:nvCxnSpPr>
           <p:cNvPr id="139" name="Straight Connector 138">
@@ -5905,14 +5865,14 @@
           <p:cNvCxnSpPr>
             <a:cxnSpLocks/>
             <a:stCxn id="30" idx="0"/>
-            <a:endCxn id="1027" idx="2"/>
+            <a:endCxn id="1036" idx="2"/>
           </p:cNvCxnSpPr>
           <p:nvPr/>
         </p:nvCxnSpPr>
         <p:spPr>
           <a:xfrm flipV="1">
-            <a:off x="19364980" y="5516442"/>
-            <a:ext cx="1035990" cy="478196"/>
+            <a:off x="19364980" y="5558165"/>
+            <a:ext cx="2973697" cy="436473"/>
           </a:xfrm>
           <a:prstGeom prst="line">
             <a:avLst/>
@@ -5990,9 +5950,9 @@
           <p:nvPr/>
         </p:nvCxnSpPr>
         <p:spPr>
-          <a:xfrm>
-            <a:off x="16295576" y="5512000"/>
-            <a:ext cx="3069404" cy="482638"/>
+          <a:xfrm flipH="1">
+            <a:off x="19364980" y="5549363"/>
+            <a:ext cx="1213996" cy="445275"/>
           </a:xfrm>
           <a:prstGeom prst="line">
             <a:avLst/>
@@ -6027,7 +5987,7 @@
         </p:nvSpPr>
         <p:spPr>
           <a:xfrm>
-            <a:off x="21854580" y="5111888"/>
+            <a:off x="21696267" y="5158055"/>
             <a:ext cx="1284820" cy="400110"/>
           </a:xfrm>
           <a:prstGeom prst="rect">
@@ -6053,46 +6013,6 @@
           </a:p>
         </p:txBody>
       </p:sp>
-      <p:cxnSp>
-        <p:nvCxnSpPr>
-          <p:cNvPr id="150" name="Straight Connector 149">
-            <a:extLst>
-              <a:ext uri="{FF2B5EF4-FFF2-40B4-BE49-F238E27FC236}">
-                <a16:creationId xmlns:a16="http://schemas.microsoft.com/office/drawing/2014/main" id="{7A6EEAEB-BB29-40F6-90A1-10B2BBB90BDD}"/>
-              </a:ext>
-            </a:extLst>
-          </p:cNvPr>
-          <p:cNvCxnSpPr>
-            <a:cxnSpLocks/>
-            <a:stCxn id="1027" idx="3"/>
-            <a:endCxn id="1036" idx="1"/>
-          </p:cNvCxnSpPr>
-          <p:nvPr/>
-        </p:nvCxnSpPr>
-        <p:spPr>
-          <a:xfrm flipV="1">
-            <a:off x="21043380" y="5311943"/>
-            <a:ext cx="811200" cy="4444"/>
-          </a:xfrm>
-          <a:prstGeom prst="line">
-            <a:avLst/>
-          </a:prstGeom>
-        </p:spPr>
-        <p:style>
-          <a:lnRef idx="1">
-            <a:schemeClr val="accent1"/>
-          </a:lnRef>
-          <a:fillRef idx="0">
-            <a:schemeClr val="accent1"/>
-          </a:fillRef>
-          <a:effectRef idx="0">
-            <a:schemeClr val="accent1"/>
-          </a:effectRef>
-          <a:fontRef idx="minor">
-            <a:schemeClr val="tx1"/>
-          </a:fontRef>
-        </p:style>
-      </p:cxnSp>
       <p:cxnSp>
         <p:nvCxnSpPr>
           <p:cNvPr id="153" name="Straight Connector 152">
@@ -6507,7 +6427,7 @@
         </p:nvSpPr>
         <p:spPr>
           <a:xfrm>
-            <a:off x="7665172" y="14162450"/>
+            <a:off x="8266306" y="14162450"/>
             <a:ext cx="1390628" cy="400110"/>
           </a:xfrm>
           <a:prstGeom prst="rect">
@@ -6551,8 +6471,8 @@
         </p:nvCxnSpPr>
         <p:spPr>
           <a:xfrm flipH="1">
-            <a:off x="8360486" y="10295226"/>
-            <a:ext cx="3881748" cy="3867224"/>
+            <a:off x="8961620" y="10295226"/>
+            <a:ext cx="2874211" cy="3867224"/>
           </a:xfrm>
           <a:prstGeom prst="line">
             <a:avLst/>
@@ -6587,7 +6507,7 @@
         </p:nvSpPr>
         <p:spPr>
           <a:xfrm>
-            <a:off x="6528013" y="10108467"/>
+            <a:off x="7636477" y="10108468"/>
             <a:ext cx="1284820" cy="400110"/>
           </a:xfrm>
           <a:prstGeom prst="rect">
@@ -6667,7 +6587,7 @@
         </p:nvSpPr>
         <p:spPr>
           <a:xfrm>
-            <a:off x="2377037" y="14259804"/>
+            <a:off x="2330231" y="14720578"/>
             <a:ext cx="1284820" cy="400110"/>
           </a:xfrm>
           <a:prstGeom prst="rect">
@@ -6707,7 +6627,7 @@
         </p:nvSpPr>
         <p:spPr>
           <a:xfrm>
-            <a:off x="2732207" y="13540107"/>
+            <a:off x="2579620" y="13662313"/>
             <a:ext cx="1284820" cy="400110"/>
           </a:xfrm>
           <a:prstGeom prst="rect">
@@ -6747,7 +6667,7 @@
         </p:nvSpPr>
         <p:spPr>
           <a:xfrm>
-            <a:off x="1051522" y="13540107"/>
+            <a:off x="535527" y="13238503"/>
             <a:ext cx="1284820" cy="400110"/>
           </a:xfrm>
           <a:prstGeom prst="rect">
@@ -6787,7 +6707,7 @@
         </p:nvSpPr>
         <p:spPr>
           <a:xfrm>
-            <a:off x="5966727" y="14980512"/>
+            <a:off x="1618813" y="15499664"/>
             <a:ext cx="1516448" cy="400110"/>
           </a:xfrm>
           <a:prstGeom prst="rect">
@@ -6827,7 +6747,7 @@
         </p:nvSpPr>
         <p:spPr>
           <a:xfrm>
-            <a:off x="9380179" y="15299609"/>
+            <a:off x="10074448" y="15265741"/>
             <a:ext cx="1284820" cy="400110"/>
           </a:xfrm>
           <a:prstGeom prst="rect">
@@ -6867,7 +6787,7 @@
         </p:nvSpPr>
         <p:spPr>
           <a:xfrm>
-            <a:off x="4212097" y="14162450"/>
+            <a:off x="4322168" y="14162450"/>
             <a:ext cx="1284820" cy="400110"/>
           </a:xfrm>
           <a:prstGeom prst="rect">
@@ -6907,7 +6827,7 @@
         </p:nvSpPr>
         <p:spPr>
           <a:xfrm>
-            <a:off x="6028154" y="13346822"/>
+            <a:off x="6375288" y="13346822"/>
             <a:ext cx="1284820" cy="400110"/>
           </a:xfrm>
           <a:prstGeom prst="rect">
@@ -6947,7 +6867,7 @@
         </p:nvSpPr>
         <p:spPr>
           <a:xfrm>
-            <a:off x="3621162" y="14980512"/>
+            <a:off x="535527" y="14319830"/>
             <a:ext cx="1284820" cy="400110"/>
           </a:xfrm>
           <a:prstGeom prst="rect">
@@ -6987,7 +6907,7 @@
         </p:nvSpPr>
         <p:spPr>
           <a:xfrm>
-            <a:off x="11500131" y="15299860"/>
+            <a:off x="12194400" y="15265992"/>
             <a:ext cx="1284820" cy="400110"/>
           </a:xfrm>
           <a:prstGeom prst="rect">
@@ -7027,7 +6947,7 @@
         </p:nvSpPr>
         <p:spPr>
           <a:xfrm>
-            <a:off x="6028444" y="14162450"/>
+            <a:off x="6375578" y="14162450"/>
             <a:ext cx="1284820" cy="400110"/>
           </a:xfrm>
           <a:prstGeom prst="rect">
@@ -7071,8 +6991,8 @@
         </p:nvCxnSpPr>
         <p:spPr>
           <a:xfrm flipH="1" flipV="1">
-            <a:off x="8360486" y="14562560"/>
-            <a:ext cx="1019693" cy="937104"/>
+            <a:off x="8961620" y="14562560"/>
+            <a:ext cx="1112828" cy="903236"/>
           </a:xfrm>
           <a:prstGeom prst="line">
             <a:avLst/>
@@ -7111,7 +7031,7 @@
         </p:nvCxnSpPr>
         <p:spPr>
           <a:xfrm flipH="1" flipV="1">
-            <a:off x="10664999" y="15499664"/>
+            <a:off x="11359268" y="15465796"/>
             <a:ext cx="835132" cy="251"/>
           </a:xfrm>
           <a:prstGeom prst="line">
@@ -7151,8 +7071,8 @@
         </p:nvCxnSpPr>
         <p:spPr>
           <a:xfrm flipH="1">
-            <a:off x="7313264" y="14362505"/>
-            <a:ext cx="351908" cy="0"/>
+            <a:off x="7660398" y="14362505"/>
+            <a:ext cx="605908" cy="0"/>
           </a:xfrm>
           <a:prstGeom prst="line">
             <a:avLst/>
@@ -7191,13 +7111,13 @@
         </p:nvCxnSpPr>
         <p:spPr>
           <a:xfrm rot="10800000" flipH="1">
-            <a:off x="9380179" y="15299610"/>
+            <a:off x="10074448" y="15265742"/>
             <a:ext cx="642410" cy="200055"/>
           </a:xfrm>
           <a:prstGeom prst="curvedConnector4">
             <a:avLst>
               <a:gd name="adj1" fmla="val -35585"/>
-              <a:gd name="adj2" fmla="val 329741"/>
+              <a:gd name="adj2" fmla="val 214269"/>
             </a:avLst>
           </a:prstGeom>
         </p:spPr>
@@ -7216,6 +7136,440 @@
           </a:fontRef>
         </p:style>
       </p:cxnSp>
+      <p:cxnSp>
+        <p:nvCxnSpPr>
+          <p:cNvPr id="108" name="Straight Connector 107">
+            <a:extLst>
+              <a:ext uri="{FF2B5EF4-FFF2-40B4-BE49-F238E27FC236}">
+                <a16:creationId xmlns:a16="http://schemas.microsoft.com/office/drawing/2014/main" id="{8E169FB3-4990-411D-A1C0-250306F635F7}"/>
+              </a:ext>
+            </a:extLst>
+          </p:cNvPr>
+          <p:cNvCxnSpPr>
+            <a:cxnSpLocks/>
+            <a:stCxn id="47" idx="0"/>
+            <a:endCxn id="38" idx="2"/>
+          </p:cNvCxnSpPr>
+          <p:nvPr/>
+        </p:nvCxnSpPr>
+        <p:spPr>
+          <a:xfrm flipH="1" flipV="1">
+            <a:off x="7017698" y="13746932"/>
+            <a:ext cx="290" cy="415518"/>
+          </a:xfrm>
+          <a:prstGeom prst="line">
+            <a:avLst/>
+          </a:prstGeom>
+        </p:spPr>
+        <p:style>
+          <a:lnRef idx="1">
+            <a:schemeClr val="accent1"/>
+          </a:lnRef>
+          <a:fillRef idx="0">
+            <a:schemeClr val="accent1"/>
+          </a:fillRef>
+          <a:effectRef idx="0">
+            <a:schemeClr val="accent1"/>
+          </a:effectRef>
+          <a:fontRef idx="minor">
+            <a:schemeClr val="tx1"/>
+          </a:fontRef>
+        </p:style>
+      </p:cxnSp>
+      <p:cxnSp>
+        <p:nvCxnSpPr>
+          <p:cNvPr id="111" name="Straight Connector 110">
+            <a:extLst>
+              <a:ext uri="{FF2B5EF4-FFF2-40B4-BE49-F238E27FC236}">
+                <a16:creationId xmlns:a16="http://schemas.microsoft.com/office/drawing/2014/main" id="{71B93253-224F-4205-B4E4-FF9F311A9025}"/>
+              </a:ext>
+            </a:extLst>
+          </p:cNvPr>
+          <p:cNvCxnSpPr>
+            <a:cxnSpLocks/>
+            <a:stCxn id="47" idx="1"/>
+            <a:endCxn id="31" idx="3"/>
+          </p:cNvCxnSpPr>
+          <p:nvPr/>
+        </p:nvCxnSpPr>
+        <p:spPr>
+          <a:xfrm flipH="1">
+            <a:off x="5606988" y="14362505"/>
+            <a:ext cx="768590" cy="0"/>
+          </a:xfrm>
+          <a:prstGeom prst="line">
+            <a:avLst/>
+          </a:prstGeom>
+        </p:spPr>
+        <p:style>
+          <a:lnRef idx="1">
+            <a:schemeClr val="accent1"/>
+          </a:lnRef>
+          <a:fillRef idx="0">
+            <a:schemeClr val="accent1"/>
+          </a:fillRef>
+          <a:effectRef idx="0">
+            <a:schemeClr val="accent1"/>
+          </a:effectRef>
+          <a:fontRef idx="minor">
+            <a:schemeClr val="tx1"/>
+          </a:fontRef>
+        </p:style>
+      </p:cxnSp>
+      <p:cxnSp>
+        <p:nvCxnSpPr>
+          <p:cNvPr id="116" name="Straight Connector 115">
+            <a:extLst>
+              <a:ext uri="{FF2B5EF4-FFF2-40B4-BE49-F238E27FC236}">
+                <a16:creationId xmlns:a16="http://schemas.microsoft.com/office/drawing/2014/main" id="{990FDD65-3DBF-409E-87FC-349F6E281363}"/>
+              </a:ext>
+            </a:extLst>
+          </p:cNvPr>
+          <p:cNvCxnSpPr>
+            <a:cxnSpLocks/>
+            <a:stCxn id="31" idx="0"/>
+            <a:endCxn id="62" idx="2"/>
+          </p:cNvCxnSpPr>
+          <p:nvPr/>
+        </p:nvCxnSpPr>
+        <p:spPr>
+          <a:xfrm flipV="1">
+            <a:off x="4964578" y="9499201"/>
+            <a:ext cx="1982184" cy="4663249"/>
+          </a:xfrm>
+          <a:prstGeom prst="line">
+            <a:avLst/>
+          </a:prstGeom>
+        </p:spPr>
+        <p:style>
+          <a:lnRef idx="1">
+            <a:schemeClr val="accent1"/>
+          </a:lnRef>
+          <a:fillRef idx="0">
+            <a:schemeClr val="accent1"/>
+          </a:fillRef>
+          <a:effectRef idx="0">
+            <a:schemeClr val="accent1"/>
+          </a:effectRef>
+          <a:fontRef idx="minor">
+            <a:schemeClr val="tx1"/>
+          </a:fontRef>
+        </p:style>
+      </p:cxnSp>
+      <p:cxnSp>
+        <p:nvCxnSpPr>
+          <p:cNvPr id="117" name="Straight Connector 116">
+            <a:extLst>
+              <a:ext uri="{FF2B5EF4-FFF2-40B4-BE49-F238E27FC236}">
+                <a16:creationId xmlns:a16="http://schemas.microsoft.com/office/drawing/2014/main" id="{548FA62F-750B-4D97-969B-97FEA37C7EF0}"/>
+              </a:ext>
+            </a:extLst>
+          </p:cNvPr>
+          <p:cNvCxnSpPr>
+            <a:cxnSpLocks/>
+            <a:stCxn id="31" idx="1"/>
+            <a:endCxn id="21" idx="3"/>
+          </p:cNvCxnSpPr>
+          <p:nvPr/>
+        </p:nvCxnSpPr>
+        <p:spPr>
+          <a:xfrm flipH="1">
+            <a:off x="3615051" y="14362505"/>
+            <a:ext cx="707117" cy="558128"/>
+          </a:xfrm>
+          <a:prstGeom prst="line">
+            <a:avLst/>
+          </a:prstGeom>
+        </p:spPr>
+        <p:style>
+          <a:lnRef idx="1">
+            <a:schemeClr val="accent1"/>
+          </a:lnRef>
+          <a:fillRef idx="0">
+            <a:schemeClr val="accent1"/>
+          </a:fillRef>
+          <a:effectRef idx="0">
+            <a:schemeClr val="accent1"/>
+          </a:effectRef>
+          <a:fontRef idx="minor">
+            <a:schemeClr val="tx1"/>
+          </a:fontRef>
+        </p:style>
+      </p:cxnSp>
+      <p:cxnSp>
+        <p:nvCxnSpPr>
+          <p:cNvPr id="118" name="Straight Connector 117">
+            <a:extLst>
+              <a:ext uri="{FF2B5EF4-FFF2-40B4-BE49-F238E27FC236}">
+                <a16:creationId xmlns:a16="http://schemas.microsoft.com/office/drawing/2014/main" id="{4FBD60D1-731C-4CF0-918A-4821B7EB2A7A}"/>
+              </a:ext>
+            </a:extLst>
+          </p:cNvPr>
+          <p:cNvCxnSpPr>
+            <a:cxnSpLocks/>
+            <a:stCxn id="24" idx="1"/>
+            <a:endCxn id="26" idx="3"/>
+          </p:cNvCxnSpPr>
+          <p:nvPr/>
+        </p:nvCxnSpPr>
+        <p:spPr>
+          <a:xfrm flipH="1" flipV="1">
+            <a:off x="1820347" y="13438558"/>
+            <a:ext cx="759273" cy="423810"/>
+          </a:xfrm>
+          <a:prstGeom prst="line">
+            <a:avLst/>
+          </a:prstGeom>
+        </p:spPr>
+        <p:style>
+          <a:lnRef idx="1">
+            <a:schemeClr val="accent1"/>
+          </a:lnRef>
+          <a:fillRef idx="0">
+            <a:schemeClr val="accent1"/>
+          </a:fillRef>
+          <a:effectRef idx="0">
+            <a:schemeClr val="accent1"/>
+          </a:effectRef>
+          <a:fontRef idx="minor">
+            <a:schemeClr val="tx1"/>
+          </a:fontRef>
+        </p:style>
+      </p:cxnSp>
+      <p:cxnSp>
+        <p:nvCxnSpPr>
+          <p:cNvPr id="120" name="Straight Connector 119">
+            <a:extLst>
+              <a:ext uri="{FF2B5EF4-FFF2-40B4-BE49-F238E27FC236}">
+                <a16:creationId xmlns:a16="http://schemas.microsoft.com/office/drawing/2014/main" id="{9586B510-F507-4A7F-8BE5-F8A8580ACF28}"/>
+              </a:ext>
+            </a:extLst>
+          </p:cNvPr>
+          <p:cNvCxnSpPr>
+            <a:cxnSpLocks/>
+            <a:stCxn id="24" idx="2"/>
+            <a:endCxn id="44" idx="3"/>
+          </p:cNvCxnSpPr>
+          <p:nvPr/>
+        </p:nvCxnSpPr>
+        <p:spPr>
+          <a:xfrm flipH="1">
+            <a:off x="1820347" y="14062423"/>
+            <a:ext cx="1401683" cy="457462"/>
+          </a:xfrm>
+          <a:prstGeom prst="line">
+            <a:avLst/>
+          </a:prstGeom>
+        </p:spPr>
+        <p:style>
+          <a:lnRef idx="1">
+            <a:schemeClr val="accent1"/>
+          </a:lnRef>
+          <a:fillRef idx="0">
+            <a:schemeClr val="accent1"/>
+          </a:fillRef>
+          <a:effectRef idx="0">
+            <a:schemeClr val="accent1"/>
+          </a:effectRef>
+          <a:fontRef idx="minor">
+            <a:schemeClr val="tx1"/>
+          </a:fontRef>
+        </p:style>
+      </p:cxnSp>
+      <p:cxnSp>
+        <p:nvCxnSpPr>
+          <p:cNvPr id="121" name="Straight Connector 120">
+            <a:extLst>
+              <a:ext uri="{FF2B5EF4-FFF2-40B4-BE49-F238E27FC236}">
+                <a16:creationId xmlns:a16="http://schemas.microsoft.com/office/drawing/2014/main" id="{8C368B07-B13F-4C31-AB25-F574D436F00F}"/>
+              </a:ext>
+            </a:extLst>
+          </p:cNvPr>
+          <p:cNvCxnSpPr>
+            <a:cxnSpLocks/>
+            <a:stCxn id="31" idx="1"/>
+            <a:endCxn id="24" idx="3"/>
+          </p:cNvCxnSpPr>
+          <p:nvPr/>
+        </p:nvCxnSpPr>
+        <p:spPr>
+          <a:xfrm flipH="1" flipV="1">
+            <a:off x="3864440" y="13862368"/>
+            <a:ext cx="457728" cy="500137"/>
+          </a:xfrm>
+          <a:prstGeom prst="line">
+            <a:avLst/>
+          </a:prstGeom>
+        </p:spPr>
+        <p:style>
+          <a:lnRef idx="1">
+            <a:schemeClr val="accent1"/>
+          </a:lnRef>
+          <a:fillRef idx="0">
+            <a:schemeClr val="accent1"/>
+          </a:fillRef>
+          <a:effectRef idx="0">
+            <a:schemeClr val="accent1"/>
+          </a:effectRef>
+          <a:fontRef idx="minor">
+            <a:schemeClr val="tx1"/>
+          </a:fontRef>
+        </p:style>
+      </p:cxnSp>
+      <p:cxnSp>
+        <p:nvCxnSpPr>
+          <p:cNvPr id="130" name="Straight Connector 129">
+            <a:extLst>
+              <a:ext uri="{FF2B5EF4-FFF2-40B4-BE49-F238E27FC236}">
+                <a16:creationId xmlns:a16="http://schemas.microsoft.com/office/drawing/2014/main" id="{206D00F2-A867-4C73-BB13-EE5E2F9C8809}"/>
+              </a:ext>
+            </a:extLst>
+          </p:cNvPr>
+          <p:cNvCxnSpPr>
+            <a:cxnSpLocks/>
+            <a:stCxn id="28" idx="0"/>
+            <a:endCxn id="21" idx="2"/>
+          </p:cNvCxnSpPr>
+          <p:nvPr/>
+        </p:nvCxnSpPr>
+        <p:spPr>
+          <a:xfrm flipV="1">
+            <a:off x="2377037" y="15120688"/>
+            <a:ext cx="595604" cy="378976"/>
+          </a:xfrm>
+          <a:prstGeom prst="line">
+            <a:avLst/>
+          </a:prstGeom>
+        </p:spPr>
+        <p:style>
+          <a:lnRef idx="1">
+            <a:schemeClr val="accent1"/>
+          </a:lnRef>
+          <a:fillRef idx="0">
+            <a:schemeClr val="accent1"/>
+          </a:fillRef>
+          <a:effectRef idx="0">
+            <a:schemeClr val="accent1"/>
+          </a:effectRef>
+          <a:fontRef idx="minor">
+            <a:schemeClr val="tx1"/>
+          </a:fontRef>
+        </p:style>
+      </p:cxnSp>
+      <p:cxnSp>
+        <p:nvCxnSpPr>
+          <p:cNvPr id="142" name="Straight Connector 141">
+            <a:extLst>
+              <a:ext uri="{FF2B5EF4-FFF2-40B4-BE49-F238E27FC236}">
+                <a16:creationId xmlns:a16="http://schemas.microsoft.com/office/drawing/2014/main" id="{BCB78E5B-6C05-4247-A876-60A304E4E896}"/>
+              </a:ext>
+            </a:extLst>
+          </p:cNvPr>
+          <p:cNvCxnSpPr>
+            <a:cxnSpLocks/>
+            <a:stCxn id="26" idx="0"/>
+            <a:endCxn id="1048" idx="2"/>
+          </p:cNvCxnSpPr>
+          <p:nvPr/>
+        </p:nvCxnSpPr>
+        <p:spPr>
+          <a:xfrm rot="5400000" flipH="1" flipV="1">
+            <a:off x="8648523" y="4764049"/>
+            <a:ext cx="1003869" cy="15945041"/>
+          </a:xfrm>
+          <a:prstGeom prst="bentConnector3">
+            <a:avLst>
+              <a:gd name="adj1" fmla="val 50000"/>
+            </a:avLst>
+          </a:prstGeom>
+        </p:spPr>
+        <p:style>
+          <a:lnRef idx="1">
+            <a:schemeClr val="accent1"/>
+          </a:lnRef>
+          <a:fillRef idx="0">
+            <a:schemeClr val="accent1"/>
+          </a:fillRef>
+          <a:effectRef idx="0">
+            <a:schemeClr val="accent1"/>
+          </a:effectRef>
+          <a:fontRef idx="minor">
+            <a:schemeClr val="tx1"/>
+          </a:fontRef>
+        </p:style>
+      </p:cxnSp>
+      <p:pic>
+        <p:nvPicPr>
+          <p:cNvPr id="1049" name="Picture 1048" descr="A mask with a dark background&#10;&#10;Description automatically generated">
+            <a:extLst>
+              <a:ext uri="{FF2B5EF4-FFF2-40B4-BE49-F238E27FC236}">
+                <a16:creationId xmlns:a16="http://schemas.microsoft.com/office/drawing/2014/main" id="{E2853E4A-571C-4BEF-A6F2-E10662193ACE}"/>
+              </a:ext>
+            </a:extLst>
+          </p:cNvPr>
+          <p:cNvPicPr>
+            <a:picLocks noChangeAspect="1"/>
+          </p:cNvPicPr>
+          <p:nvPr/>
+        </p:nvPicPr>
+        <p:blipFill>
+          <a:blip r:embed="rId4">
+            <a:extLst>
+              <a:ext uri="{28A0092B-C50C-407E-A947-70E740481C1C}">
+                <a14:useLocalDpi xmlns:a14="http://schemas.microsoft.com/office/drawing/2010/main" val="0"/>
+              </a:ext>
+            </a:extLst>
+          </a:blip>
+          <a:stretch>
+            <a:fillRect/>
+          </a:stretch>
+        </p:blipFill>
+        <p:spPr>
+          <a:xfrm>
+            <a:off x="20364290" y="3283850"/>
+            <a:ext cx="309590" cy="309590"/>
+          </a:xfrm>
+          <a:prstGeom prst="rect">
+            <a:avLst/>
+          </a:prstGeom>
+        </p:spPr>
+      </p:pic>
+      <p:pic>
+        <p:nvPicPr>
+          <p:cNvPr id="1051" name="Picture 1050" descr="A picture containing toy, cake, person&#10;&#10;Description automatically generated">
+            <a:extLst>
+              <a:ext uri="{FF2B5EF4-FFF2-40B4-BE49-F238E27FC236}">
+                <a16:creationId xmlns:a16="http://schemas.microsoft.com/office/drawing/2014/main" id="{4EDA30B3-2C35-44E9-BDB4-5670E0EE6640}"/>
+              </a:ext>
+            </a:extLst>
+          </p:cNvPr>
+          <p:cNvPicPr>
+            <a:picLocks noChangeAspect="1"/>
+          </p:cNvPicPr>
+          <p:nvPr/>
+        </p:nvPicPr>
+        <p:blipFill>
+          <a:blip r:embed="rId5">
+            <a:extLst>
+              <a:ext uri="{28A0092B-C50C-407E-A947-70E740481C1C}">
+                <a14:useLocalDpi xmlns:a14="http://schemas.microsoft.com/office/drawing/2010/main" val="0"/>
+              </a:ext>
+            </a:extLst>
+          </a:blip>
+          <a:stretch>
+            <a:fillRect/>
+          </a:stretch>
+        </p:blipFill>
+        <p:spPr>
+          <a:xfrm>
+            <a:off x="22225964" y="3290798"/>
+            <a:ext cx="317693" cy="317693"/>
+          </a:xfrm>
+          <a:prstGeom prst="rect">
+            <a:avLst/>
+          </a:prstGeom>
+        </p:spPr>
+      </p:pic>
     </p:spTree>
     <p:extLst>
       <p:ext uri="{BB962C8B-B14F-4D97-AF65-F5344CB8AC3E}">

</xml_diff>

<commit_message>
Bathroom with shower and water handle working
</commit_message>
<xml_diff>
--- a/Logic/MM Rooms.pptx
+++ b/Logic/MM Rooms.pptx
@@ -5399,7 +5399,12 @@
           <a:prstGeom prst="rect">
             <a:avLst/>
           </a:prstGeom>
-          <a:noFill/>
+          <a:solidFill>
+            <a:schemeClr val="accent6">
+              <a:lumMod val="20000"/>
+              <a:lumOff val="80000"/>
+            </a:schemeClr>
+          </a:solidFill>
           <a:ln>
             <a:solidFill>
               <a:schemeClr val="accent1"/>
@@ -5410,10 +5415,17 @@
           <a:bodyPr wrap="square" rtlCol="0">
             <a:spAutoFit/>
           </a:bodyPr>
-          <a:lstStyle/>
-          <a:p>
-            <a:r>
-              <a:rPr lang="en-US" sz="2000" dirty="0"/>
+          <a:lstStyle>
+            <a:defPPr>
+              <a:defRPr lang="en-US"/>
+            </a:defPPr>
+            <a:lvl1pPr>
+              <a:defRPr sz="2000"/>
+            </a:lvl1pPr>
+          </a:lstStyle>
+          <a:p>
+            <a:r>
+              <a:rPr lang="en-US" dirty="0"/>
               <a:t>Bathroom</a:t>
             </a:r>
           </a:p>

</xml_diff>